<commit_message>
Vaccancy is in progress
IT Ad made and posted in fb groups
</commit_message>
<xml_diff>
--- a/Offline/TeacherRecruitment/FaceBookAdForTeacherRecruitments/TeacherVaccancy.pptx
+++ b/Offline/TeacherRecruitment/FaceBookAdForTeacherRecruitments/TeacherVaccancy.pptx
@@ -8,6 +8,7 @@
     <p:sldId id="257" r:id="rId2"/>
     <p:sldId id="258" r:id="rId3"/>
     <p:sldId id="259" r:id="rId4"/>
+    <p:sldId id="260" r:id="rId5"/>
   </p:sldIdLst>
   <p:sldSz cx="6840538" cy="6840538"/>
   <p:notesSz cx="6858000" cy="9144000"/>
@@ -245,7 +246,7 @@
           <a:p>
             <a:fld id="{97D4CEB5-D715-49F4-8146-54BD8651C3AA}" type="datetimeFigureOut">
               <a:rPr lang="en-AU" smtClean="0"/>
-              <a:t>27/07/2023</a:t>
+              <a:t>28/07/2023</a:t>
             </a:fld>
             <a:endParaRPr lang="en-AU"/>
           </a:p>
@@ -415,7 +416,7 @@
           <a:p>
             <a:fld id="{97D4CEB5-D715-49F4-8146-54BD8651C3AA}" type="datetimeFigureOut">
               <a:rPr lang="en-AU" smtClean="0"/>
-              <a:t>27/07/2023</a:t>
+              <a:t>28/07/2023</a:t>
             </a:fld>
             <a:endParaRPr lang="en-AU"/>
           </a:p>
@@ -595,7 +596,7 @@
           <a:p>
             <a:fld id="{97D4CEB5-D715-49F4-8146-54BD8651C3AA}" type="datetimeFigureOut">
               <a:rPr lang="en-AU" smtClean="0"/>
-              <a:t>27/07/2023</a:t>
+              <a:t>28/07/2023</a:t>
             </a:fld>
             <a:endParaRPr lang="en-AU"/>
           </a:p>
@@ -765,7 +766,7 @@
           <a:p>
             <a:fld id="{97D4CEB5-D715-49F4-8146-54BD8651C3AA}" type="datetimeFigureOut">
               <a:rPr lang="en-AU" smtClean="0"/>
-              <a:t>27/07/2023</a:t>
+              <a:t>28/07/2023</a:t>
             </a:fld>
             <a:endParaRPr lang="en-AU"/>
           </a:p>
@@ -1009,7 +1010,7 @@
           <a:p>
             <a:fld id="{97D4CEB5-D715-49F4-8146-54BD8651C3AA}" type="datetimeFigureOut">
               <a:rPr lang="en-AU" smtClean="0"/>
-              <a:t>27/07/2023</a:t>
+              <a:t>28/07/2023</a:t>
             </a:fld>
             <a:endParaRPr lang="en-AU"/>
           </a:p>
@@ -1241,7 +1242,7 @@
           <a:p>
             <a:fld id="{97D4CEB5-D715-49F4-8146-54BD8651C3AA}" type="datetimeFigureOut">
               <a:rPr lang="en-AU" smtClean="0"/>
-              <a:t>27/07/2023</a:t>
+              <a:t>28/07/2023</a:t>
             </a:fld>
             <a:endParaRPr lang="en-AU"/>
           </a:p>
@@ -1608,7 +1609,7 @@
           <a:p>
             <a:fld id="{97D4CEB5-D715-49F4-8146-54BD8651C3AA}" type="datetimeFigureOut">
               <a:rPr lang="en-AU" smtClean="0"/>
-              <a:t>27/07/2023</a:t>
+              <a:t>28/07/2023</a:t>
             </a:fld>
             <a:endParaRPr lang="en-AU"/>
           </a:p>
@@ -1726,7 +1727,7 @@
           <a:p>
             <a:fld id="{97D4CEB5-D715-49F4-8146-54BD8651C3AA}" type="datetimeFigureOut">
               <a:rPr lang="en-AU" smtClean="0"/>
-              <a:t>27/07/2023</a:t>
+              <a:t>28/07/2023</a:t>
             </a:fld>
             <a:endParaRPr lang="en-AU"/>
           </a:p>
@@ -1821,7 +1822,7 @@
           <a:p>
             <a:fld id="{97D4CEB5-D715-49F4-8146-54BD8651C3AA}" type="datetimeFigureOut">
               <a:rPr lang="en-AU" smtClean="0"/>
-              <a:t>27/07/2023</a:t>
+              <a:t>28/07/2023</a:t>
             </a:fld>
             <a:endParaRPr lang="en-AU"/>
           </a:p>
@@ -2098,7 +2099,7 @@
           <a:p>
             <a:fld id="{97D4CEB5-D715-49F4-8146-54BD8651C3AA}" type="datetimeFigureOut">
               <a:rPr lang="en-AU" smtClean="0"/>
-              <a:t>27/07/2023</a:t>
+              <a:t>28/07/2023</a:t>
             </a:fld>
             <a:endParaRPr lang="en-AU"/>
           </a:p>
@@ -2355,7 +2356,7 @@
           <a:p>
             <a:fld id="{97D4CEB5-D715-49F4-8146-54BD8651C3AA}" type="datetimeFigureOut">
               <a:rPr lang="en-AU" smtClean="0"/>
-              <a:t>27/07/2023</a:t>
+              <a:t>28/07/2023</a:t>
             </a:fld>
             <a:endParaRPr lang="en-AU"/>
           </a:p>
@@ -2568,7 +2569,7 @@
           <a:p>
             <a:fld id="{97D4CEB5-D715-49F4-8146-54BD8651C3AA}" type="datetimeFigureOut">
               <a:rPr lang="en-AU" smtClean="0"/>
-              <a:t>27/07/2023</a:t>
+              <a:t>28/07/2023</a:t>
             </a:fld>
             <a:endParaRPr lang="en-AU"/>
           </a:p>
@@ -9508,7 +9509,7 @@
         </p:nvSpPr>
         <p:spPr>
           <a:xfrm>
-            <a:off x="-3440" y="-2533"/>
+            <a:off x="-3440" y="-3853"/>
             <a:ext cx="6843978" cy="6840538"/>
           </a:xfrm>
           <a:prstGeom prst="rect">
@@ -10541,6 +10542,2615 @@
 </p:sld>
 </file>
 
+<file path=ppt/slides/slide4.xml><?xml version="1.0" encoding="utf-8"?>
+<p:sld xmlns:a="http://schemas.openxmlformats.org/drawingml/2006/main" xmlns:r="http://schemas.openxmlformats.org/officeDocument/2006/relationships" xmlns:p="http://schemas.openxmlformats.org/presentationml/2006/main">
+  <p:cSld>
+    <p:spTree>
+      <p:nvGrpSpPr>
+        <p:cNvPr id="1" name=""/>
+        <p:cNvGrpSpPr/>
+        <p:nvPr/>
+      </p:nvGrpSpPr>
+      <p:grpSpPr>
+        <a:xfrm>
+          <a:off x="0" y="0"/>
+          <a:ext cx="0" cy="0"/>
+          <a:chOff x="0" y="0"/>
+          <a:chExt cx="0" cy="0"/>
+        </a:xfrm>
+      </p:grpSpPr>
+      <p:sp>
+        <p:nvSpPr>
+          <p:cNvPr id="2" name="Title 1">
+            <a:extLst>
+              <a:ext uri="{FF2B5EF4-FFF2-40B4-BE49-F238E27FC236}">
+                <a16:creationId xmlns:a16="http://schemas.microsoft.com/office/drawing/2014/main" id="{26BE1386-1BCA-7B0F-B9FC-5AFBF04FB3E7}"/>
+              </a:ext>
+            </a:extLst>
+          </p:cNvPr>
+          <p:cNvSpPr>
+            <a:spLocks noGrp="1"/>
+          </p:cNvSpPr>
+          <p:nvPr>
+            <p:ph type="title"/>
+          </p:nvPr>
+        </p:nvSpPr>
+        <p:spPr/>
+        <p:txBody>
+          <a:bodyPr/>
+          <a:lstStyle/>
+          <a:p>
+            <a:endParaRPr lang="en-IN"/>
+          </a:p>
+        </p:txBody>
+      </p:sp>
+      <p:graphicFrame>
+        <p:nvGraphicFramePr>
+          <p:cNvPr id="14" name="Content Placeholder 13">
+            <a:extLst>
+              <a:ext uri="{FF2B5EF4-FFF2-40B4-BE49-F238E27FC236}">
+                <a16:creationId xmlns:a16="http://schemas.microsoft.com/office/drawing/2014/main" id="{462AD04C-E9A6-5682-A618-202DC5411229}"/>
+              </a:ext>
+            </a:extLst>
+          </p:cNvPr>
+          <p:cNvGraphicFramePr>
+            <a:graphicFrameLocks noGrp="1"/>
+          </p:cNvGraphicFramePr>
+          <p:nvPr>
+            <p:ph idx="1"/>
+          </p:nvPr>
+        </p:nvGraphicFramePr>
+        <p:xfrm>
+          <a:off x="1286986" y="3135184"/>
+          <a:ext cx="4266565" cy="1722438"/>
+        </p:xfrm>
+        <a:graphic>
+          <a:graphicData uri="http://schemas.openxmlformats.org/drawingml/2006/table">
+            <a:tbl>
+              <a:tblPr firstRow="1" firstCol="1" bandRow="1">
+                <a:tableStyleId>{5C22544A-7EE6-4342-B048-85BDC9FD1C3A}</a:tableStyleId>
+              </a:tblPr>
+              <a:tblGrid>
+                <a:gridCol w="455930">
+                  <a:extLst>
+                    <a:ext uri="{9D8B030D-6E8A-4147-A177-3AD203B41FA5}">
+                      <a16:colId xmlns:a16="http://schemas.microsoft.com/office/drawing/2014/main" val="3566507320"/>
+                    </a:ext>
+                  </a:extLst>
+                </a:gridCol>
+                <a:gridCol w="981075">
+                  <a:extLst>
+                    <a:ext uri="{9D8B030D-6E8A-4147-A177-3AD203B41FA5}">
+                      <a16:colId xmlns:a16="http://schemas.microsoft.com/office/drawing/2014/main" val="3757330138"/>
+                    </a:ext>
+                  </a:extLst>
+                </a:gridCol>
+                <a:gridCol w="1350645">
+                  <a:extLst>
+                    <a:ext uri="{9D8B030D-6E8A-4147-A177-3AD203B41FA5}">
+                      <a16:colId xmlns:a16="http://schemas.microsoft.com/office/drawing/2014/main" val="3835889449"/>
+                    </a:ext>
+                  </a:extLst>
+                </a:gridCol>
+                <a:gridCol w="899795">
+                  <a:extLst>
+                    <a:ext uri="{9D8B030D-6E8A-4147-A177-3AD203B41FA5}">
+                      <a16:colId xmlns:a16="http://schemas.microsoft.com/office/drawing/2014/main" val="3953704053"/>
+                    </a:ext>
+                  </a:extLst>
+                </a:gridCol>
+                <a:gridCol w="579120">
+                  <a:extLst>
+                    <a:ext uri="{9D8B030D-6E8A-4147-A177-3AD203B41FA5}">
+                      <a16:colId xmlns:a16="http://schemas.microsoft.com/office/drawing/2014/main" val="1189350803"/>
+                    </a:ext>
+                  </a:extLst>
+                </a:gridCol>
+              </a:tblGrid>
+              <a:tr h="0">
+                <a:tc>
+                  <a:txBody>
+                    <a:bodyPr/>
+                    <a:lstStyle/>
+                    <a:p>
+                      <a:pPr algn="ctr">
+                        <a:lnSpc>
+                          <a:spcPct val="107000"/>
+                        </a:lnSpc>
+                        <a:spcAft>
+                          <a:spcPts val="800"/>
+                        </a:spcAft>
+                      </a:pPr>
+                      <a:r>
+                        <a:rPr lang="en-IN" sz="1100" kern="100">
+                          <a:effectLst/>
+                        </a:rPr>
+                        <a:t> </a:t>
+                      </a:r>
+                      <a:endParaRPr lang="en-IN" sz="1100" kern="100">
+                        <a:effectLst/>
+                        <a:latin typeface="Calibri" panose="020F0502020204030204" pitchFamily="34" charset="0"/>
+                        <a:ea typeface="Calibri" panose="020F0502020204030204" pitchFamily="34" charset="0"/>
+                        <a:cs typeface="Times New Roman" panose="02020603050405020304" pitchFamily="18" charset="0"/>
+                      </a:endParaRPr>
+                    </a:p>
+                  </a:txBody>
+                  <a:tcPr marL="68580" marR="68580" marT="0" marB="0"/>
+                </a:tc>
+                <a:tc>
+                  <a:txBody>
+                    <a:bodyPr/>
+                    <a:lstStyle/>
+                    <a:p>
+                      <a:pPr algn="ctr">
+                        <a:lnSpc>
+                          <a:spcPct val="107000"/>
+                        </a:lnSpc>
+                        <a:spcAft>
+                          <a:spcPts val="800"/>
+                        </a:spcAft>
+                      </a:pPr>
+                      <a:r>
+                        <a:rPr lang="en-IN" sz="1100" kern="100">
+                          <a:effectLst/>
+                        </a:rPr>
+                        <a:t> </a:t>
+                      </a:r>
+                      <a:endParaRPr lang="en-IN" sz="1100" kern="100">
+                        <a:effectLst/>
+                        <a:latin typeface="Calibri" panose="020F0502020204030204" pitchFamily="34" charset="0"/>
+                        <a:ea typeface="Calibri" panose="020F0502020204030204" pitchFamily="34" charset="0"/>
+                        <a:cs typeface="Times New Roman" panose="02020603050405020304" pitchFamily="18" charset="0"/>
+                      </a:endParaRPr>
+                    </a:p>
+                  </a:txBody>
+                  <a:tcPr marL="68580" marR="68580" marT="0" marB="0"/>
+                </a:tc>
+                <a:tc gridSpan="2">
+                  <a:txBody>
+                    <a:bodyPr/>
+                    <a:lstStyle/>
+                    <a:p>
+                      <a:pPr algn="ctr">
+                        <a:lnSpc>
+                          <a:spcPct val="107000"/>
+                        </a:lnSpc>
+                        <a:spcAft>
+                          <a:spcPts val="800"/>
+                        </a:spcAft>
+                      </a:pPr>
+                      <a:r>
+                        <a:rPr lang="en-IN" sz="1100" kern="100">
+                          <a:effectLst/>
+                        </a:rPr>
+                        <a:t>Arts Department</a:t>
+                      </a:r>
+                      <a:endParaRPr lang="en-IN" sz="1100" kern="100">
+                        <a:effectLst/>
+                        <a:latin typeface="Calibri" panose="020F0502020204030204" pitchFamily="34" charset="0"/>
+                        <a:ea typeface="Calibri" panose="020F0502020204030204" pitchFamily="34" charset="0"/>
+                        <a:cs typeface="Times New Roman" panose="02020603050405020304" pitchFamily="18" charset="0"/>
+                      </a:endParaRPr>
+                    </a:p>
+                  </a:txBody>
+                  <a:tcPr marL="68580" marR="68580" marT="0" marB="0"/>
+                </a:tc>
+                <a:tc hMerge="1">
+                  <a:txBody>
+                    <a:bodyPr/>
+                    <a:lstStyle/>
+                    <a:p>
+                      <a:endParaRPr lang="en-IN"/>
+                    </a:p>
+                  </a:txBody>
+                  <a:tcPr/>
+                </a:tc>
+                <a:tc>
+                  <a:txBody>
+                    <a:bodyPr/>
+                    <a:lstStyle/>
+                    <a:p>
+                      <a:pPr algn="ctr">
+                        <a:lnSpc>
+                          <a:spcPct val="107000"/>
+                        </a:lnSpc>
+                        <a:spcAft>
+                          <a:spcPts val="800"/>
+                        </a:spcAft>
+                      </a:pPr>
+                      <a:r>
+                        <a:rPr lang="en-IN" sz="1100" kern="100">
+                          <a:effectLst/>
+                        </a:rPr>
+                        <a:t> </a:t>
+                      </a:r>
+                      <a:endParaRPr lang="en-IN" sz="1100" kern="100">
+                        <a:effectLst/>
+                        <a:latin typeface="Calibri" panose="020F0502020204030204" pitchFamily="34" charset="0"/>
+                        <a:ea typeface="Calibri" panose="020F0502020204030204" pitchFamily="34" charset="0"/>
+                        <a:cs typeface="Times New Roman" panose="02020603050405020304" pitchFamily="18" charset="0"/>
+                      </a:endParaRPr>
+                    </a:p>
+                  </a:txBody>
+                  <a:tcPr marL="68580" marR="68580" marT="0" marB="0"/>
+                </a:tc>
+                <a:extLst>
+                  <a:ext uri="{0D108BD9-81ED-4DB2-BD59-A6C34878D82A}">
+                    <a16:rowId xmlns:a16="http://schemas.microsoft.com/office/drawing/2014/main" val="473810462"/>
+                  </a:ext>
+                </a:extLst>
+              </a:tr>
+              <a:tr h="0">
+                <a:tc>
+                  <a:txBody>
+                    <a:bodyPr/>
+                    <a:lstStyle/>
+                    <a:p>
+                      <a:pPr algn="ctr">
+                        <a:lnSpc>
+                          <a:spcPct val="107000"/>
+                        </a:lnSpc>
+                        <a:spcAft>
+                          <a:spcPts val="800"/>
+                        </a:spcAft>
+                      </a:pPr>
+                      <a:r>
+                        <a:rPr lang="en-IN" sz="1100" kern="100">
+                          <a:effectLst/>
+                        </a:rPr>
+                        <a:t>SlNo</a:t>
+                      </a:r>
+                      <a:endParaRPr lang="en-IN" sz="1100" kern="100">
+                        <a:effectLst/>
+                        <a:latin typeface="Calibri" panose="020F0502020204030204" pitchFamily="34" charset="0"/>
+                        <a:ea typeface="Calibri" panose="020F0502020204030204" pitchFamily="34" charset="0"/>
+                        <a:cs typeface="Times New Roman" panose="02020603050405020304" pitchFamily="18" charset="0"/>
+                      </a:endParaRPr>
+                    </a:p>
+                  </a:txBody>
+                  <a:tcPr marL="68580" marR="68580" marT="0" marB="0"/>
+                </a:tc>
+                <a:tc>
+                  <a:txBody>
+                    <a:bodyPr/>
+                    <a:lstStyle/>
+                    <a:p>
+                      <a:pPr algn="ctr">
+                        <a:lnSpc>
+                          <a:spcPct val="107000"/>
+                        </a:lnSpc>
+                        <a:spcAft>
+                          <a:spcPts val="800"/>
+                        </a:spcAft>
+                      </a:pPr>
+                      <a:r>
+                        <a:rPr lang="en-IN" sz="1100" kern="100">
+                          <a:effectLst/>
+                        </a:rPr>
+                        <a:t>Subject</a:t>
+                      </a:r>
+                      <a:endParaRPr lang="en-IN" sz="1100" kern="100">
+                        <a:effectLst/>
+                        <a:latin typeface="Calibri" panose="020F0502020204030204" pitchFamily="34" charset="0"/>
+                        <a:ea typeface="Calibri" panose="020F0502020204030204" pitchFamily="34" charset="0"/>
+                        <a:cs typeface="Times New Roman" panose="02020603050405020304" pitchFamily="18" charset="0"/>
+                      </a:endParaRPr>
+                    </a:p>
+                  </a:txBody>
+                  <a:tcPr marL="68580" marR="68580" marT="0" marB="0"/>
+                </a:tc>
+                <a:tc>
+                  <a:txBody>
+                    <a:bodyPr/>
+                    <a:lstStyle/>
+                    <a:p>
+                      <a:pPr algn="ctr">
+                        <a:lnSpc>
+                          <a:spcPct val="107000"/>
+                        </a:lnSpc>
+                        <a:spcAft>
+                          <a:spcPts val="800"/>
+                        </a:spcAft>
+                      </a:pPr>
+                      <a:r>
+                        <a:rPr lang="en-IN" sz="1100" kern="100">
+                          <a:effectLst/>
+                        </a:rPr>
+                        <a:t>Board</a:t>
+                      </a:r>
+                      <a:endParaRPr lang="en-IN" sz="1100" kern="100">
+                        <a:effectLst/>
+                        <a:latin typeface="Calibri" panose="020F0502020204030204" pitchFamily="34" charset="0"/>
+                        <a:ea typeface="Calibri" panose="020F0502020204030204" pitchFamily="34" charset="0"/>
+                        <a:cs typeface="Times New Roman" panose="02020603050405020304" pitchFamily="18" charset="0"/>
+                      </a:endParaRPr>
+                    </a:p>
+                  </a:txBody>
+                  <a:tcPr marL="68580" marR="68580" marT="0" marB="0"/>
+                </a:tc>
+                <a:tc>
+                  <a:txBody>
+                    <a:bodyPr/>
+                    <a:lstStyle/>
+                    <a:p>
+                      <a:pPr algn="ctr">
+                        <a:lnSpc>
+                          <a:spcPct val="107000"/>
+                        </a:lnSpc>
+                        <a:spcAft>
+                          <a:spcPts val="800"/>
+                        </a:spcAft>
+                      </a:pPr>
+                      <a:r>
+                        <a:rPr lang="en-IN" sz="1100" kern="100">
+                          <a:effectLst/>
+                        </a:rPr>
+                        <a:t>Class</a:t>
+                      </a:r>
+                      <a:endParaRPr lang="en-IN" sz="1100" kern="100">
+                        <a:effectLst/>
+                        <a:latin typeface="Calibri" panose="020F0502020204030204" pitchFamily="34" charset="0"/>
+                        <a:ea typeface="Calibri" panose="020F0502020204030204" pitchFamily="34" charset="0"/>
+                        <a:cs typeface="Times New Roman" panose="02020603050405020304" pitchFamily="18" charset="0"/>
+                      </a:endParaRPr>
+                    </a:p>
+                  </a:txBody>
+                  <a:tcPr marL="68580" marR="68580" marT="0" marB="0"/>
+                </a:tc>
+                <a:tc>
+                  <a:txBody>
+                    <a:bodyPr/>
+                    <a:lstStyle/>
+                    <a:p>
+                      <a:pPr algn="ctr">
+                        <a:lnSpc>
+                          <a:spcPct val="107000"/>
+                        </a:lnSpc>
+                        <a:spcAft>
+                          <a:spcPts val="800"/>
+                        </a:spcAft>
+                      </a:pPr>
+                      <a:r>
+                        <a:rPr lang="en-IN" sz="1100" kern="100">
+                          <a:effectLst/>
+                        </a:rPr>
+                        <a:t>Vacancy</a:t>
+                      </a:r>
+                      <a:endParaRPr lang="en-IN" sz="1100" kern="100">
+                        <a:effectLst/>
+                        <a:latin typeface="Calibri" panose="020F0502020204030204" pitchFamily="34" charset="0"/>
+                        <a:ea typeface="Calibri" panose="020F0502020204030204" pitchFamily="34" charset="0"/>
+                        <a:cs typeface="Times New Roman" panose="02020603050405020304" pitchFamily="18" charset="0"/>
+                      </a:endParaRPr>
+                    </a:p>
+                  </a:txBody>
+                  <a:tcPr marL="68580" marR="68580" marT="0" marB="0"/>
+                </a:tc>
+                <a:extLst>
+                  <a:ext uri="{0D108BD9-81ED-4DB2-BD59-A6C34878D82A}">
+                    <a16:rowId xmlns:a16="http://schemas.microsoft.com/office/drawing/2014/main" val="3194717664"/>
+                  </a:ext>
+                </a:extLst>
+              </a:tr>
+              <a:tr h="0">
+                <a:tc>
+                  <a:txBody>
+                    <a:bodyPr/>
+                    <a:lstStyle/>
+                    <a:p>
+                      <a:pPr algn="ctr">
+                        <a:lnSpc>
+                          <a:spcPct val="107000"/>
+                        </a:lnSpc>
+                        <a:spcAft>
+                          <a:spcPts val="800"/>
+                        </a:spcAft>
+                      </a:pPr>
+                      <a:r>
+                        <a:rPr lang="en-IN" sz="1100" kern="100">
+                          <a:effectLst/>
+                        </a:rPr>
+                        <a:t> </a:t>
+                      </a:r>
+                      <a:endParaRPr lang="en-IN" sz="1100" kern="100">
+                        <a:effectLst/>
+                        <a:latin typeface="Calibri" panose="020F0502020204030204" pitchFamily="34" charset="0"/>
+                        <a:ea typeface="Calibri" panose="020F0502020204030204" pitchFamily="34" charset="0"/>
+                        <a:cs typeface="Times New Roman" panose="02020603050405020304" pitchFamily="18" charset="0"/>
+                      </a:endParaRPr>
+                    </a:p>
+                  </a:txBody>
+                  <a:tcPr marL="68580" marR="68580" marT="0" marB="0"/>
+                </a:tc>
+                <a:tc>
+                  <a:txBody>
+                    <a:bodyPr/>
+                    <a:lstStyle/>
+                    <a:p>
+                      <a:pPr algn="ctr">
+                        <a:lnSpc>
+                          <a:spcPct val="107000"/>
+                        </a:lnSpc>
+                        <a:spcAft>
+                          <a:spcPts val="800"/>
+                        </a:spcAft>
+                      </a:pPr>
+                      <a:r>
+                        <a:rPr lang="en-IN" sz="1100" kern="100">
+                          <a:effectLst/>
+                        </a:rPr>
+                        <a:t> </a:t>
+                      </a:r>
+                      <a:endParaRPr lang="en-IN" sz="1100" kern="100">
+                        <a:effectLst/>
+                        <a:latin typeface="Calibri" panose="020F0502020204030204" pitchFamily="34" charset="0"/>
+                        <a:ea typeface="Calibri" panose="020F0502020204030204" pitchFamily="34" charset="0"/>
+                        <a:cs typeface="Times New Roman" panose="02020603050405020304" pitchFamily="18" charset="0"/>
+                      </a:endParaRPr>
+                    </a:p>
+                  </a:txBody>
+                  <a:tcPr marL="68580" marR="68580" marT="0" marB="0"/>
+                </a:tc>
+                <a:tc>
+                  <a:txBody>
+                    <a:bodyPr/>
+                    <a:lstStyle/>
+                    <a:p>
+                      <a:pPr algn="ctr">
+                        <a:lnSpc>
+                          <a:spcPct val="107000"/>
+                        </a:lnSpc>
+                        <a:spcAft>
+                          <a:spcPts val="800"/>
+                        </a:spcAft>
+                      </a:pPr>
+                      <a:r>
+                        <a:rPr lang="en-IN" sz="1100" kern="100">
+                          <a:effectLst/>
+                        </a:rPr>
+                        <a:t> </a:t>
+                      </a:r>
+                      <a:endParaRPr lang="en-IN" sz="1100" kern="100">
+                        <a:effectLst/>
+                        <a:latin typeface="Calibri" panose="020F0502020204030204" pitchFamily="34" charset="0"/>
+                        <a:ea typeface="Calibri" panose="020F0502020204030204" pitchFamily="34" charset="0"/>
+                        <a:cs typeface="Times New Roman" panose="02020603050405020304" pitchFamily="18" charset="0"/>
+                      </a:endParaRPr>
+                    </a:p>
+                  </a:txBody>
+                  <a:tcPr marL="68580" marR="68580" marT="0" marB="0"/>
+                </a:tc>
+                <a:tc>
+                  <a:txBody>
+                    <a:bodyPr/>
+                    <a:lstStyle/>
+                    <a:p>
+                      <a:pPr algn="ctr">
+                        <a:lnSpc>
+                          <a:spcPct val="107000"/>
+                        </a:lnSpc>
+                        <a:spcAft>
+                          <a:spcPts val="800"/>
+                        </a:spcAft>
+                      </a:pPr>
+                      <a:r>
+                        <a:rPr lang="en-IN" sz="1100" kern="100">
+                          <a:effectLst/>
+                        </a:rPr>
+                        <a:t> </a:t>
+                      </a:r>
+                      <a:endParaRPr lang="en-IN" sz="1100" kern="100">
+                        <a:effectLst/>
+                        <a:latin typeface="Calibri" panose="020F0502020204030204" pitchFamily="34" charset="0"/>
+                        <a:ea typeface="Calibri" panose="020F0502020204030204" pitchFamily="34" charset="0"/>
+                        <a:cs typeface="Times New Roman" panose="02020603050405020304" pitchFamily="18" charset="0"/>
+                      </a:endParaRPr>
+                    </a:p>
+                  </a:txBody>
+                  <a:tcPr marL="68580" marR="68580" marT="0" marB="0"/>
+                </a:tc>
+                <a:tc>
+                  <a:txBody>
+                    <a:bodyPr/>
+                    <a:lstStyle/>
+                    <a:p>
+                      <a:pPr algn="ctr">
+                        <a:lnSpc>
+                          <a:spcPct val="107000"/>
+                        </a:lnSpc>
+                        <a:spcAft>
+                          <a:spcPts val="800"/>
+                        </a:spcAft>
+                      </a:pPr>
+                      <a:r>
+                        <a:rPr lang="en-IN" sz="1100" kern="100">
+                          <a:effectLst/>
+                        </a:rPr>
+                        <a:t> </a:t>
+                      </a:r>
+                      <a:endParaRPr lang="en-IN" sz="1100" kern="100">
+                        <a:effectLst/>
+                        <a:latin typeface="Calibri" panose="020F0502020204030204" pitchFamily="34" charset="0"/>
+                        <a:ea typeface="Calibri" panose="020F0502020204030204" pitchFamily="34" charset="0"/>
+                        <a:cs typeface="Times New Roman" panose="02020603050405020304" pitchFamily="18" charset="0"/>
+                      </a:endParaRPr>
+                    </a:p>
+                  </a:txBody>
+                  <a:tcPr marL="68580" marR="68580" marT="0" marB="0"/>
+                </a:tc>
+                <a:extLst>
+                  <a:ext uri="{0D108BD9-81ED-4DB2-BD59-A6C34878D82A}">
+                    <a16:rowId xmlns:a16="http://schemas.microsoft.com/office/drawing/2014/main" val="221015324"/>
+                  </a:ext>
+                </a:extLst>
+              </a:tr>
+              <a:tr h="0">
+                <a:tc>
+                  <a:txBody>
+                    <a:bodyPr/>
+                    <a:lstStyle/>
+                    <a:p>
+                      <a:pPr algn="ctr">
+                        <a:lnSpc>
+                          <a:spcPct val="107000"/>
+                        </a:lnSpc>
+                        <a:spcAft>
+                          <a:spcPts val="800"/>
+                        </a:spcAft>
+                      </a:pPr>
+                      <a:r>
+                        <a:rPr lang="en-IN" sz="1100" kern="100">
+                          <a:effectLst/>
+                        </a:rPr>
+                        <a:t>1</a:t>
+                      </a:r>
+                      <a:endParaRPr lang="en-IN" sz="1100" kern="100">
+                        <a:effectLst/>
+                        <a:latin typeface="Calibri" panose="020F0502020204030204" pitchFamily="34" charset="0"/>
+                        <a:ea typeface="Calibri" panose="020F0502020204030204" pitchFamily="34" charset="0"/>
+                        <a:cs typeface="Times New Roman" panose="02020603050405020304" pitchFamily="18" charset="0"/>
+                      </a:endParaRPr>
+                    </a:p>
+                  </a:txBody>
+                  <a:tcPr marL="68580" marR="68580" marT="0" marB="0"/>
+                </a:tc>
+                <a:tc>
+                  <a:txBody>
+                    <a:bodyPr/>
+                    <a:lstStyle/>
+                    <a:p>
+                      <a:pPr algn="ctr">
+                        <a:lnSpc>
+                          <a:spcPct val="107000"/>
+                        </a:lnSpc>
+                        <a:spcAft>
+                          <a:spcPts val="800"/>
+                        </a:spcAft>
+                      </a:pPr>
+                      <a:r>
+                        <a:rPr lang="en-IN" sz="1100" kern="100">
+                          <a:effectLst/>
+                        </a:rPr>
+                        <a:t>English</a:t>
+                      </a:r>
+                      <a:endParaRPr lang="en-IN" sz="1100" kern="100">
+                        <a:effectLst/>
+                        <a:latin typeface="Calibri" panose="020F0502020204030204" pitchFamily="34" charset="0"/>
+                        <a:ea typeface="Calibri" panose="020F0502020204030204" pitchFamily="34" charset="0"/>
+                        <a:cs typeface="Times New Roman" panose="02020603050405020304" pitchFamily="18" charset="0"/>
+                      </a:endParaRPr>
+                    </a:p>
+                  </a:txBody>
+                  <a:tcPr marL="68580" marR="68580" marT="0" marB="0"/>
+                </a:tc>
+                <a:tc>
+                  <a:txBody>
+                    <a:bodyPr/>
+                    <a:lstStyle/>
+                    <a:p>
+                      <a:pPr algn="ctr">
+                        <a:lnSpc>
+                          <a:spcPct val="107000"/>
+                        </a:lnSpc>
+                        <a:spcAft>
+                          <a:spcPts val="800"/>
+                        </a:spcAft>
+                      </a:pPr>
+                      <a:r>
+                        <a:rPr lang="en-IN" sz="1100" kern="100">
+                          <a:effectLst/>
+                        </a:rPr>
+                        <a:t>ICSE, CBSE, WB</a:t>
+                      </a:r>
+                      <a:endParaRPr lang="en-IN" sz="1100" kern="100">
+                        <a:effectLst/>
+                        <a:latin typeface="Calibri" panose="020F0502020204030204" pitchFamily="34" charset="0"/>
+                        <a:ea typeface="Calibri" panose="020F0502020204030204" pitchFamily="34" charset="0"/>
+                        <a:cs typeface="Times New Roman" panose="02020603050405020304" pitchFamily="18" charset="0"/>
+                      </a:endParaRPr>
+                    </a:p>
+                  </a:txBody>
+                  <a:tcPr marL="68580" marR="68580" marT="0" marB="0"/>
+                </a:tc>
+                <a:tc>
+                  <a:txBody>
+                    <a:bodyPr/>
+                    <a:lstStyle/>
+                    <a:p>
+                      <a:pPr algn="ctr">
+                        <a:lnSpc>
+                          <a:spcPct val="107000"/>
+                        </a:lnSpc>
+                        <a:spcAft>
+                          <a:spcPts val="800"/>
+                        </a:spcAft>
+                      </a:pPr>
+                      <a:r>
+                        <a:rPr lang="en-IN" sz="1100" kern="100">
+                          <a:effectLst/>
+                        </a:rPr>
+                        <a:t>X, XI and XII</a:t>
+                      </a:r>
+                      <a:endParaRPr lang="en-IN" sz="1100" kern="100">
+                        <a:effectLst/>
+                        <a:latin typeface="Calibri" panose="020F0502020204030204" pitchFamily="34" charset="0"/>
+                        <a:ea typeface="Calibri" panose="020F0502020204030204" pitchFamily="34" charset="0"/>
+                        <a:cs typeface="Times New Roman" panose="02020603050405020304" pitchFamily="18" charset="0"/>
+                      </a:endParaRPr>
+                    </a:p>
+                  </a:txBody>
+                  <a:tcPr marL="68580" marR="68580" marT="0" marB="0"/>
+                </a:tc>
+                <a:tc>
+                  <a:txBody>
+                    <a:bodyPr/>
+                    <a:lstStyle/>
+                    <a:p>
+                      <a:pPr algn="ctr">
+                        <a:lnSpc>
+                          <a:spcPct val="107000"/>
+                        </a:lnSpc>
+                        <a:spcAft>
+                          <a:spcPts val="800"/>
+                        </a:spcAft>
+                      </a:pPr>
+                      <a:r>
+                        <a:rPr lang="en-IN" sz="1100" kern="100">
+                          <a:effectLst/>
+                        </a:rPr>
+                        <a:t>1</a:t>
+                      </a:r>
+                      <a:endParaRPr lang="en-IN" sz="1100" kern="100">
+                        <a:effectLst/>
+                        <a:latin typeface="Calibri" panose="020F0502020204030204" pitchFamily="34" charset="0"/>
+                        <a:ea typeface="Calibri" panose="020F0502020204030204" pitchFamily="34" charset="0"/>
+                        <a:cs typeface="Times New Roman" panose="02020603050405020304" pitchFamily="18" charset="0"/>
+                      </a:endParaRPr>
+                    </a:p>
+                  </a:txBody>
+                  <a:tcPr marL="68580" marR="68580" marT="0" marB="0"/>
+                </a:tc>
+                <a:extLst>
+                  <a:ext uri="{0D108BD9-81ED-4DB2-BD59-A6C34878D82A}">
+                    <a16:rowId xmlns:a16="http://schemas.microsoft.com/office/drawing/2014/main" val="2081495807"/>
+                  </a:ext>
+                </a:extLst>
+              </a:tr>
+              <a:tr h="0">
+                <a:tc>
+                  <a:txBody>
+                    <a:bodyPr/>
+                    <a:lstStyle/>
+                    <a:p>
+                      <a:pPr algn="ctr">
+                        <a:lnSpc>
+                          <a:spcPct val="107000"/>
+                        </a:lnSpc>
+                        <a:spcAft>
+                          <a:spcPts val="800"/>
+                        </a:spcAft>
+                      </a:pPr>
+                      <a:r>
+                        <a:rPr lang="en-IN" sz="1100" kern="100">
+                          <a:effectLst/>
+                        </a:rPr>
+                        <a:t>2</a:t>
+                      </a:r>
+                      <a:endParaRPr lang="en-IN" sz="1100" kern="100">
+                        <a:effectLst/>
+                        <a:latin typeface="Calibri" panose="020F0502020204030204" pitchFamily="34" charset="0"/>
+                        <a:ea typeface="Calibri" panose="020F0502020204030204" pitchFamily="34" charset="0"/>
+                        <a:cs typeface="Times New Roman" panose="02020603050405020304" pitchFamily="18" charset="0"/>
+                      </a:endParaRPr>
+                    </a:p>
+                  </a:txBody>
+                  <a:tcPr marL="68580" marR="68580" marT="0" marB="0"/>
+                </a:tc>
+                <a:tc>
+                  <a:txBody>
+                    <a:bodyPr/>
+                    <a:lstStyle/>
+                    <a:p>
+                      <a:pPr algn="ctr">
+                        <a:lnSpc>
+                          <a:spcPct val="107000"/>
+                        </a:lnSpc>
+                        <a:spcAft>
+                          <a:spcPts val="800"/>
+                        </a:spcAft>
+                      </a:pPr>
+                      <a:r>
+                        <a:rPr lang="en-IN" sz="1100" kern="100">
+                          <a:effectLst/>
+                        </a:rPr>
+                        <a:t>Bengali</a:t>
+                      </a:r>
+                      <a:endParaRPr lang="en-IN" sz="1100" kern="100">
+                        <a:effectLst/>
+                        <a:latin typeface="Calibri" panose="020F0502020204030204" pitchFamily="34" charset="0"/>
+                        <a:ea typeface="Calibri" panose="020F0502020204030204" pitchFamily="34" charset="0"/>
+                        <a:cs typeface="Times New Roman" panose="02020603050405020304" pitchFamily="18" charset="0"/>
+                      </a:endParaRPr>
+                    </a:p>
+                  </a:txBody>
+                  <a:tcPr marL="68580" marR="68580" marT="0" marB="0"/>
+                </a:tc>
+                <a:tc>
+                  <a:txBody>
+                    <a:bodyPr/>
+                    <a:lstStyle/>
+                    <a:p>
+                      <a:pPr algn="ctr">
+                        <a:lnSpc>
+                          <a:spcPct val="107000"/>
+                        </a:lnSpc>
+                        <a:spcAft>
+                          <a:spcPts val="800"/>
+                        </a:spcAft>
+                      </a:pPr>
+                      <a:r>
+                        <a:rPr lang="en-IN" sz="1100" kern="100">
+                          <a:effectLst/>
+                        </a:rPr>
+                        <a:t>ICSE, CBSE, WB</a:t>
+                      </a:r>
+                      <a:endParaRPr lang="en-IN" sz="1100" kern="100">
+                        <a:effectLst/>
+                        <a:latin typeface="Calibri" panose="020F0502020204030204" pitchFamily="34" charset="0"/>
+                        <a:ea typeface="Calibri" panose="020F0502020204030204" pitchFamily="34" charset="0"/>
+                        <a:cs typeface="Times New Roman" panose="02020603050405020304" pitchFamily="18" charset="0"/>
+                      </a:endParaRPr>
+                    </a:p>
+                  </a:txBody>
+                  <a:tcPr marL="68580" marR="68580" marT="0" marB="0"/>
+                </a:tc>
+                <a:tc>
+                  <a:txBody>
+                    <a:bodyPr/>
+                    <a:lstStyle/>
+                    <a:p>
+                      <a:pPr algn="ctr">
+                        <a:lnSpc>
+                          <a:spcPct val="107000"/>
+                        </a:lnSpc>
+                        <a:spcAft>
+                          <a:spcPts val="800"/>
+                        </a:spcAft>
+                      </a:pPr>
+                      <a:r>
+                        <a:rPr lang="en-IN" sz="1100" kern="100">
+                          <a:effectLst/>
+                        </a:rPr>
+                        <a:t>VIII to XII</a:t>
+                      </a:r>
+                      <a:endParaRPr lang="en-IN" sz="1100" kern="100">
+                        <a:effectLst/>
+                        <a:latin typeface="Calibri" panose="020F0502020204030204" pitchFamily="34" charset="0"/>
+                        <a:ea typeface="Calibri" panose="020F0502020204030204" pitchFamily="34" charset="0"/>
+                        <a:cs typeface="Times New Roman" panose="02020603050405020304" pitchFamily="18" charset="0"/>
+                      </a:endParaRPr>
+                    </a:p>
+                  </a:txBody>
+                  <a:tcPr marL="68580" marR="68580" marT="0" marB="0"/>
+                </a:tc>
+                <a:tc>
+                  <a:txBody>
+                    <a:bodyPr/>
+                    <a:lstStyle/>
+                    <a:p>
+                      <a:pPr algn="ctr">
+                        <a:lnSpc>
+                          <a:spcPct val="107000"/>
+                        </a:lnSpc>
+                        <a:spcAft>
+                          <a:spcPts val="800"/>
+                        </a:spcAft>
+                      </a:pPr>
+                      <a:r>
+                        <a:rPr lang="en-IN" sz="1100" kern="100">
+                          <a:effectLst/>
+                        </a:rPr>
+                        <a:t>2</a:t>
+                      </a:r>
+                      <a:endParaRPr lang="en-IN" sz="1100" kern="100">
+                        <a:effectLst/>
+                        <a:latin typeface="Calibri" panose="020F0502020204030204" pitchFamily="34" charset="0"/>
+                        <a:ea typeface="Calibri" panose="020F0502020204030204" pitchFamily="34" charset="0"/>
+                        <a:cs typeface="Times New Roman" panose="02020603050405020304" pitchFamily="18" charset="0"/>
+                      </a:endParaRPr>
+                    </a:p>
+                  </a:txBody>
+                  <a:tcPr marL="68580" marR="68580" marT="0" marB="0"/>
+                </a:tc>
+                <a:extLst>
+                  <a:ext uri="{0D108BD9-81ED-4DB2-BD59-A6C34878D82A}">
+                    <a16:rowId xmlns:a16="http://schemas.microsoft.com/office/drawing/2014/main" val="1478741344"/>
+                  </a:ext>
+                </a:extLst>
+              </a:tr>
+              <a:tr h="0">
+                <a:tc>
+                  <a:txBody>
+                    <a:bodyPr/>
+                    <a:lstStyle/>
+                    <a:p>
+                      <a:pPr algn="ctr">
+                        <a:lnSpc>
+                          <a:spcPct val="107000"/>
+                        </a:lnSpc>
+                        <a:spcAft>
+                          <a:spcPts val="800"/>
+                        </a:spcAft>
+                      </a:pPr>
+                      <a:r>
+                        <a:rPr lang="en-IN" sz="1100" kern="100">
+                          <a:effectLst/>
+                        </a:rPr>
+                        <a:t>3</a:t>
+                      </a:r>
+                      <a:endParaRPr lang="en-IN" sz="1100" kern="100">
+                        <a:effectLst/>
+                        <a:latin typeface="Calibri" panose="020F0502020204030204" pitchFamily="34" charset="0"/>
+                        <a:ea typeface="Calibri" panose="020F0502020204030204" pitchFamily="34" charset="0"/>
+                        <a:cs typeface="Times New Roman" panose="02020603050405020304" pitchFamily="18" charset="0"/>
+                      </a:endParaRPr>
+                    </a:p>
+                  </a:txBody>
+                  <a:tcPr marL="68580" marR="68580" marT="0" marB="0"/>
+                </a:tc>
+                <a:tc>
+                  <a:txBody>
+                    <a:bodyPr/>
+                    <a:lstStyle/>
+                    <a:p>
+                      <a:pPr algn="ctr">
+                        <a:lnSpc>
+                          <a:spcPct val="107000"/>
+                        </a:lnSpc>
+                        <a:spcAft>
+                          <a:spcPts val="800"/>
+                        </a:spcAft>
+                      </a:pPr>
+                      <a:r>
+                        <a:rPr lang="en-IN" sz="1100" kern="100">
+                          <a:effectLst/>
+                        </a:rPr>
+                        <a:t>Geography</a:t>
+                      </a:r>
+                      <a:endParaRPr lang="en-IN" sz="1100" kern="100">
+                        <a:effectLst/>
+                        <a:latin typeface="Calibri" panose="020F0502020204030204" pitchFamily="34" charset="0"/>
+                        <a:ea typeface="Calibri" panose="020F0502020204030204" pitchFamily="34" charset="0"/>
+                        <a:cs typeface="Times New Roman" panose="02020603050405020304" pitchFamily="18" charset="0"/>
+                      </a:endParaRPr>
+                    </a:p>
+                  </a:txBody>
+                  <a:tcPr marL="68580" marR="68580" marT="0" marB="0"/>
+                </a:tc>
+                <a:tc>
+                  <a:txBody>
+                    <a:bodyPr/>
+                    <a:lstStyle/>
+                    <a:p>
+                      <a:pPr algn="ctr">
+                        <a:lnSpc>
+                          <a:spcPct val="107000"/>
+                        </a:lnSpc>
+                        <a:spcAft>
+                          <a:spcPts val="800"/>
+                        </a:spcAft>
+                      </a:pPr>
+                      <a:r>
+                        <a:rPr lang="en-IN" sz="1100" kern="100">
+                          <a:effectLst/>
+                        </a:rPr>
+                        <a:t>ICSE, CBSE, WB</a:t>
+                      </a:r>
+                      <a:endParaRPr lang="en-IN" sz="1100" kern="100">
+                        <a:effectLst/>
+                        <a:latin typeface="Calibri" panose="020F0502020204030204" pitchFamily="34" charset="0"/>
+                        <a:ea typeface="Calibri" panose="020F0502020204030204" pitchFamily="34" charset="0"/>
+                        <a:cs typeface="Times New Roman" panose="02020603050405020304" pitchFamily="18" charset="0"/>
+                      </a:endParaRPr>
+                    </a:p>
+                  </a:txBody>
+                  <a:tcPr marL="68580" marR="68580" marT="0" marB="0"/>
+                </a:tc>
+                <a:tc>
+                  <a:txBody>
+                    <a:bodyPr/>
+                    <a:lstStyle/>
+                    <a:p>
+                      <a:pPr algn="ctr">
+                        <a:lnSpc>
+                          <a:spcPct val="107000"/>
+                        </a:lnSpc>
+                        <a:spcAft>
+                          <a:spcPts val="800"/>
+                        </a:spcAft>
+                      </a:pPr>
+                      <a:r>
+                        <a:rPr lang="en-IN" sz="1100" kern="100">
+                          <a:effectLst/>
+                        </a:rPr>
+                        <a:t>VIII to XII</a:t>
+                      </a:r>
+                      <a:endParaRPr lang="en-IN" sz="1100" kern="100">
+                        <a:effectLst/>
+                        <a:latin typeface="Calibri" panose="020F0502020204030204" pitchFamily="34" charset="0"/>
+                        <a:ea typeface="Calibri" panose="020F0502020204030204" pitchFamily="34" charset="0"/>
+                        <a:cs typeface="Times New Roman" panose="02020603050405020304" pitchFamily="18" charset="0"/>
+                      </a:endParaRPr>
+                    </a:p>
+                  </a:txBody>
+                  <a:tcPr marL="68580" marR="68580" marT="0" marB="0"/>
+                </a:tc>
+                <a:tc>
+                  <a:txBody>
+                    <a:bodyPr/>
+                    <a:lstStyle/>
+                    <a:p>
+                      <a:pPr algn="ctr">
+                        <a:lnSpc>
+                          <a:spcPct val="107000"/>
+                        </a:lnSpc>
+                        <a:spcAft>
+                          <a:spcPts val="800"/>
+                        </a:spcAft>
+                      </a:pPr>
+                      <a:r>
+                        <a:rPr lang="en-IN" sz="1100" kern="100">
+                          <a:effectLst/>
+                        </a:rPr>
+                        <a:t>1</a:t>
+                      </a:r>
+                      <a:endParaRPr lang="en-IN" sz="1100" kern="100">
+                        <a:effectLst/>
+                        <a:latin typeface="Calibri" panose="020F0502020204030204" pitchFamily="34" charset="0"/>
+                        <a:ea typeface="Calibri" panose="020F0502020204030204" pitchFamily="34" charset="0"/>
+                        <a:cs typeface="Times New Roman" panose="02020603050405020304" pitchFamily="18" charset="0"/>
+                      </a:endParaRPr>
+                    </a:p>
+                  </a:txBody>
+                  <a:tcPr marL="68580" marR="68580" marT="0" marB="0"/>
+                </a:tc>
+                <a:extLst>
+                  <a:ext uri="{0D108BD9-81ED-4DB2-BD59-A6C34878D82A}">
+                    <a16:rowId xmlns:a16="http://schemas.microsoft.com/office/drawing/2014/main" val="4082778659"/>
+                  </a:ext>
+                </a:extLst>
+              </a:tr>
+              <a:tr h="0">
+                <a:tc>
+                  <a:txBody>
+                    <a:bodyPr/>
+                    <a:lstStyle/>
+                    <a:p>
+                      <a:pPr algn="ctr">
+                        <a:lnSpc>
+                          <a:spcPct val="107000"/>
+                        </a:lnSpc>
+                        <a:spcAft>
+                          <a:spcPts val="800"/>
+                        </a:spcAft>
+                      </a:pPr>
+                      <a:r>
+                        <a:rPr lang="en-IN" sz="1100" kern="100">
+                          <a:effectLst/>
+                        </a:rPr>
+                        <a:t>4</a:t>
+                      </a:r>
+                      <a:endParaRPr lang="en-IN" sz="1100" kern="100">
+                        <a:effectLst/>
+                        <a:latin typeface="Calibri" panose="020F0502020204030204" pitchFamily="34" charset="0"/>
+                        <a:ea typeface="Calibri" panose="020F0502020204030204" pitchFamily="34" charset="0"/>
+                        <a:cs typeface="Times New Roman" panose="02020603050405020304" pitchFamily="18" charset="0"/>
+                      </a:endParaRPr>
+                    </a:p>
+                  </a:txBody>
+                  <a:tcPr marL="68580" marR="68580" marT="0" marB="0"/>
+                </a:tc>
+                <a:tc>
+                  <a:txBody>
+                    <a:bodyPr/>
+                    <a:lstStyle/>
+                    <a:p>
+                      <a:pPr algn="ctr">
+                        <a:lnSpc>
+                          <a:spcPct val="107000"/>
+                        </a:lnSpc>
+                        <a:spcAft>
+                          <a:spcPts val="800"/>
+                        </a:spcAft>
+                      </a:pPr>
+                      <a:r>
+                        <a:rPr lang="en-IN" sz="1100" kern="100">
+                          <a:effectLst/>
+                        </a:rPr>
+                        <a:t>Sociology</a:t>
+                      </a:r>
+                      <a:endParaRPr lang="en-IN" sz="1100" kern="100">
+                        <a:effectLst/>
+                        <a:latin typeface="Calibri" panose="020F0502020204030204" pitchFamily="34" charset="0"/>
+                        <a:ea typeface="Calibri" panose="020F0502020204030204" pitchFamily="34" charset="0"/>
+                        <a:cs typeface="Times New Roman" panose="02020603050405020304" pitchFamily="18" charset="0"/>
+                      </a:endParaRPr>
+                    </a:p>
+                  </a:txBody>
+                  <a:tcPr marL="68580" marR="68580" marT="0" marB="0"/>
+                </a:tc>
+                <a:tc>
+                  <a:txBody>
+                    <a:bodyPr/>
+                    <a:lstStyle/>
+                    <a:p>
+                      <a:pPr algn="ctr">
+                        <a:lnSpc>
+                          <a:spcPct val="107000"/>
+                        </a:lnSpc>
+                        <a:spcAft>
+                          <a:spcPts val="800"/>
+                        </a:spcAft>
+                      </a:pPr>
+                      <a:r>
+                        <a:rPr lang="en-IN" sz="1100" kern="100">
+                          <a:effectLst/>
+                        </a:rPr>
+                        <a:t>ICSE, CBSE, WB</a:t>
+                      </a:r>
+                      <a:endParaRPr lang="en-IN" sz="1100" kern="100">
+                        <a:effectLst/>
+                        <a:latin typeface="Calibri" panose="020F0502020204030204" pitchFamily="34" charset="0"/>
+                        <a:ea typeface="Calibri" panose="020F0502020204030204" pitchFamily="34" charset="0"/>
+                        <a:cs typeface="Times New Roman" panose="02020603050405020304" pitchFamily="18" charset="0"/>
+                      </a:endParaRPr>
+                    </a:p>
+                  </a:txBody>
+                  <a:tcPr marL="68580" marR="68580" marT="0" marB="0"/>
+                </a:tc>
+                <a:tc>
+                  <a:txBody>
+                    <a:bodyPr/>
+                    <a:lstStyle/>
+                    <a:p>
+                      <a:pPr algn="ctr">
+                        <a:lnSpc>
+                          <a:spcPct val="107000"/>
+                        </a:lnSpc>
+                        <a:spcAft>
+                          <a:spcPts val="800"/>
+                        </a:spcAft>
+                      </a:pPr>
+                      <a:r>
+                        <a:rPr lang="en-IN" sz="1100" kern="100">
+                          <a:effectLst/>
+                        </a:rPr>
+                        <a:t>XI and XII</a:t>
+                      </a:r>
+                      <a:endParaRPr lang="en-IN" sz="1100" kern="100">
+                        <a:effectLst/>
+                        <a:latin typeface="Calibri" panose="020F0502020204030204" pitchFamily="34" charset="0"/>
+                        <a:ea typeface="Calibri" panose="020F0502020204030204" pitchFamily="34" charset="0"/>
+                        <a:cs typeface="Times New Roman" panose="02020603050405020304" pitchFamily="18" charset="0"/>
+                      </a:endParaRPr>
+                    </a:p>
+                  </a:txBody>
+                  <a:tcPr marL="68580" marR="68580" marT="0" marB="0"/>
+                </a:tc>
+                <a:tc>
+                  <a:txBody>
+                    <a:bodyPr/>
+                    <a:lstStyle/>
+                    <a:p>
+                      <a:pPr algn="ctr">
+                        <a:lnSpc>
+                          <a:spcPct val="107000"/>
+                        </a:lnSpc>
+                        <a:spcAft>
+                          <a:spcPts val="800"/>
+                        </a:spcAft>
+                      </a:pPr>
+                      <a:r>
+                        <a:rPr lang="en-IN" sz="1100" kern="100">
+                          <a:effectLst/>
+                        </a:rPr>
+                        <a:t>1</a:t>
+                      </a:r>
+                      <a:endParaRPr lang="en-IN" sz="1100" kern="100">
+                        <a:effectLst/>
+                        <a:latin typeface="Calibri" panose="020F0502020204030204" pitchFamily="34" charset="0"/>
+                        <a:ea typeface="Calibri" panose="020F0502020204030204" pitchFamily="34" charset="0"/>
+                        <a:cs typeface="Times New Roman" panose="02020603050405020304" pitchFamily="18" charset="0"/>
+                      </a:endParaRPr>
+                    </a:p>
+                  </a:txBody>
+                  <a:tcPr marL="68580" marR="68580" marT="0" marB="0"/>
+                </a:tc>
+                <a:extLst>
+                  <a:ext uri="{0D108BD9-81ED-4DB2-BD59-A6C34878D82A}">
+                    <a16:rowId xmlns:a16="http://schemas.microsoft.com/office/drawing/2014/main" val="3690769463"/>
+                  </a:ext>
+                </a:extLst>
+              </a:tr>
+              <a:tr h="0">
+                <a:tc>
+                  <a:txBody>
+                    <a:bodyPr/>
+                    <a:lstStyle/>
+                    <a:p>
+                      <a:pPr algn="ctr">
+                        <a:lnSpc>
+                          <a:spcPct val="107000"/>
+                        </a:lnSpc>
+                        <a:spcAft>
+                          <a:spcPts val="800"/>
+                        </a:spcAft>
+                      </a:pPr>
+                      <a:r>
+                        <a:rPr lang="en-IN" sz="1100" kern="100">
+                          <a:effectLst/>
+                        </a:rPr>
+                        <a:t>5</a:t>
+                      </a:r>
+                      <a:endParaRPr lang="en-IN" sz="1100" kern="100">
+                        <a:effectLst/>
+                        <a:latin typeface="Calibri" panose="020F0502020204030204" pitchFamily="34" charset="0"/>
+                        <a:ea typeface="Calibri" panose="020F0502020204030204" pitchFamily="34" charset="0"/>
+                        <a:cs typeface="Times New Roman" panose="02020603050405020304" pitchFamily="18" charset="0"/>
+                      </a:endParaRPr>
+                    </a:p>
+                  </a:txBody>
+                  <a:tcPr marL="68580" marR="68580" marT="0" marB="0"/>
+                </a:tc>
+                <a:tc>
+                  <a:txBody>
+                    <a:bodyPr/>
+                    <a:lstStyle/>
+                    <a:p>
+                      <a:pPr algn="ctr">
+                        <a:lnSpc>
+                          <a:spcPct val="107000"/>
+                        </a:lnSpc>
+                        <a:spcAft>
+                          <a:spcPts val="800"/>
+                        </a:spcAft>
+                      </a:pPr>
+                      <a:r>
+                        <a:rPr lang="en-IN" sz="1100" kern="100">
+                          <a:effectLst/>
+                        </a:rPr>
+                        <a:t>Psychology</a:t>
+                      </a:r>
+                      <a:endParaRPr lang="en-IN" sz="1100" kern="100">
+                        <a:effectLst/>
+                        <a:latin typeface="Calibri" panose="020F0502020204030204" pitchFamily="34" charset="0"/>
+                        <a:ea typeface="Calibri" panose="020F0502020204030204" pitchFamily="34" charset="0"/>
+                        <a:cs typeface="Times New Roman" panose="02020603050405020304" pitchFamily="18" charset="0"/>
+                      </a:endParaRPr>
+                    </a:p>
+                  </a:txBody>
+                  <a:tcPr marL="68580" marR="68580" marT="0" marB="0"/>
+                </a:tc>
+                <a:tc>
+                  <a:txBody>
+                    <a:bodyPr/>
+                    <a:lstStyle/>
+                    <a:p>
+                      <a:pPr algn="ctr">
+                        <a:lnSpc>
+                          <a:spcPct val="107000"/>
+                        </a:lnSpc>
+                        <a:spcAft>
+                          <a:spcPts val="800"/>
+                        </a:spcAft>
+                      </a:pPr>
+                      <a:r>
+                        <a:rPr lang="en-IN" sz="1100" kern="100">
+                          <a:effectLst/>
+                        </a:rPr>
+                        <a:t>ICSE, CBSE, WB</a:t>
+                      </a:r>
+                      <a:endParaRPr lang="en-IN" sz="1100" kern="100">
+                        <a:effectLst/>
+                        <a:latin typeface="Calibri" panose="020F0502020204030204" pitchFamily="34" charset="0"/>
+                        <a:ea typeface="Calibri" panose="020F0502020204030204" pitchFamily="34" charset="0"/>
+                        <a:cs typeface="Times New Roman" panose="02020603050405020304" pitchFamily="18" charset="0"/>
+                      </a:endParaRPr>
+                    </a:p>
+                  </a:txBody>
+                  <a:tcPr marL="68580" marR="68580" marT="0" marB="0"/>
+                </a:tc>
+                <a:tc>
+                  <a:txBody>
+                    <a:bodyPr/>
+                    <a:lstStyle/>
+                    <a:p>
+                      <a:pPr algn="ctr">
+                        <a:lnSpc>
+                          <a:spcPct val="107000"/>
+                        </a:lnSpc>
+                        <a:spcAft>
+                          <a:spcPts val="800"/>
+                        </a:spcAft>
+                      </a:pPr>
+                      <a:r>
+                        <a:rPr lang="en-IN" sz="1100" kern="100">
+                          <a:effectLst/>
+                        </a:rPr>
+                        <a:t>XI and XII</a:t>
+                      </a:r>
+                      <a:endParaRPr lang="en-IN" sz="1100" kern="100">
+                        <a:effectLst/>
+                        <a:latin typeface="Calibri" panose="020F0502020204030204" pitchFamily="34" charset="0"/>
+                        <a:ea typeface="Calibri" panose="020F0502020204030204" pitchFamily="34" charset="0"/>
+                        <a:cs typeface="Times New Roman" panose="02020603050405020304" pitchFamily="18" charset="0"/>
+                      </a:endParaRPr>
+                    </a:p>
+                  </a:txBody>
+                  <a:tcPr marL="68580" marR="68580" marT="0" marB="0"/>
+                </a:tc>
+                <a:tc>
+                  <a:txBody>
+                    <a:bodyPr/>
+                    <a:lstStyle/>
+                    <a:p>
+                      <a:pPr algn="ctr">
+                        <a:lnSpc>
+                          <a:spcPct val="107000"/>
+                        </a:lnSpc>
+                        <a:spcAft>
+                          <a:spcPts val="800"/>
+                        </a:spcAft>
+                      </a:pPr>
+                      <a:r>
+                        <a:rPr lang="en-IN" sz="1100" kern="100">
+                          <a:effectLst/>
+                        </a:rPr>
+                        <a:t>1</a:t>
+                      </a:r>
+                      <a:endParaRPr lang="en-IN" sz="1100" kern="100">
+                        <a:effectLst/>
+                        <a:latin typeface="Calibri" panose="020F0502020204030204" pitchFamily="34" charset="0"/>
+                        <a:ea typeface="Calibri" panose="020F0502020204030204" pitchFamily="34" charset="0"/>
+                        <a:cs typeface="Times New Roman" panose="02020603050405020304" pitchFamily="18" charset="0"/>
+                      </a:endParaRPr>
+                    </a:p>
+                  </a:txBody>
+                  <a:tcPr marL="68580" marR="68580" marT="0" marB="0"/>
+                </a:tc>
+                <a:extLst>
+                  <a:ext uri="{0D108BD9-81ED-4DB2-BD59-A6C34878D82A}">
+                    <a16:rowId xmlns:a16="http://schemas.microsoft.com/office/drawing/2014/main" val="680849344"/>
+                  </a:ext>
+                </a:extLst>
+              </a:tr>
+              <a:tr h="0">
+                <a:tc>
+                  <a:txBody>
+                    <a:bodyPr/>
+                    <a:lstStyle/>
+                    <a:p>
+                      <a:pPr algn="ctr">
+                        <a:lnSpc>
+                          <a:spcPct val="107000"/>
+                        </a:lnSpc>
+                        <a:spcAft>
+                          <a:spcPts val="800"/>
+                        </a:spcAft>
+                      </a:pPr>
+                      <a:r>
+                        <a:rPr lang="en-IN" sz="1100" kern="100">
+                          <a:effectLst/>
+                        </a:rPr>
+                        <a:t>6</a:t>
+                      </a:r>
+                      <a:endParaRPr lang="en-IN" sz="1100" kern="100">
+                        <a:effectLst/>
+                        <a:latin typeface="Calibri" panose="020F0502020204030204" pitchFamily="34" charset="0"/>
+                        <a:ea typeface="Calibri" panose="020F0502020204030204" pitchFamily="34" charset="0"/>
+                        <a:cs typeface="Times New Roman" panose="02020603050405020304" pitchFamily="18" charset="0"/>
+                      </a:endParaRPr>
+                    </a:p>
+                  </a:txBody>
+                  <a:tcPr marL="68580" marR="68580" marT="0" marB="0"/>
+                </a:tc>
+                <a:tc>
+                  <a:txBody>
+                    <a:bodyPr/>
+                    <a:lstStyle/>
+                    <a:p>
+                      <a:pPr algn="ctr">
+                        <a:lnSpc>
+                          <a:spcPct val="107000"/>
+                        </a:lnSpc>
+                        <a:spcAft>
+                          <a:spcPts val="800"/>
+                        </a:spcAft>
+                      </a:pPr>
+                      <a:r>
+                        <a:rPr lang="en-IN" sz="1100" kern="100">
+                          <a:effectLst/>
+                        </a:rPr>
+                        <a:t>Philosophy</a:t>
+                      </a:r>
+                      <a:endParaRPr lang="en-IN" sz="1100" kern="100">
+                        <a:effectLst/>
+                        <a:latin typeface="Calibri" panose="020F0502020204030204" pitchFamily="34" charset="0"/>
+                        <a:ea typeface="Calibri" panose="020F0502020204030204" pitchFamily="34" charset="0"/>
+                        <a:cs typeface="Times New Roman" panose="02020603050405020304" pitchFamily="18" charset="0"/>
+                      </a:endParaRPr>
+                    </a:p>
+                  </a:txBody>
+                  <a:tcPr marL="68580" marR="68580" marT="0" marB="0"/>
+                </a:tc>
+                <a:tc>
+                  <a:txBody>
+                    <a:bodyPr/>
+                    <a:lstStyle/>
+                    <a:p>
+                      <a:pPr algn="ctr">
+                        <a:lnSpc>
+                          <a:spcPct val="107000"/>
+                        </a:lnSpc>
+                        <a:spcAft>
+                          <a:spcPts val="800"/>
+                        </a:spcAft>
+                      </a:pPr>
+                      <a:r>
+                        <a:rPr lang="en-IN" sz="1100" kern="100">
+                          <a:effectLst/>
+                        </a:rPr>
+                        <a:t>ICSE, CBSE, WB</a:t>
+                      </a:r>
+                      <a:endParaRPr lang="en-IN" sz="1100" kern="100">
+                        <a:effectLst/>
+                        <a:latin typeface="Calibri" panose="020F0502020204030204" pitchFamily="34" charset="0"/>
+                        <a:ea typeface="Calibri" panose="020F0502020204030204" pitchFamily="34" charset="0"/>
+                        <a:cs typeface="Times New Roman" panose="02020603050405020304" pitchFamily="18" charset="0"/>
+                      </a:endParaRPr>
+                    </a:p>
+                  </a:txBody>
+                  <a:tcPr marL="68580" marR="68580" marT="0" marB="0"/>
+                </a:tc>
+                <a:tc>
+                  <a:txBody>
+                    <a:bodyPr/>
+                    <a:lstStyle/>
+                    <a:p>
+                      <a:pPr algn="ctr">
+                        <a:lnSpc>
+                          <a:spcPct val="107000"/>
+                        </a:lnSpc>
+                        <a:spcAft>
+                          <a:spcPts val="800"/>
+                        </a:spcAft>
+                      </a:pPr>
+                      <a:r>
+                        <a:rPr lang="en-IN" sz="1100" kern="100">
+                          <a:effectLst/>
+                        </a:rPr>
+                        <a:t>XI and XII</a:t>
+                      </a:r>
+                      <a:endParaRPr lang="en-IN" sz="1100" kern="100">
+                        <a:effectLst/>
+                        <a:latin typeface="Calibri" panose="020F0502020204030204" pitchFamily="34" charset="0"/>
+                        <a:ea typeface="Calibri" panose="020F0502020204030204" pitchFamily="34" charset="0"/>
+                        <a:cs typeface="Times New Roman" panose="02020603050405020304" pitchFamily="18" charset="0"/>
+                      </a:endParaRPr>
+                    </a:p>
+                  </a:txBody>
+                  <a:tcPr marL="68580" marR="68580" marT="0" marB="0"/>
+                </a:tc>
+                <a:tc>
+                  <a:txBody>
+                    <a:bodyPr/>
+                    <a:lstStyle/>
+                    <a:p>
+                      <a:pPr algn="ctr">
+                        <a:lnSpc>
+                          <a:spcPct val="107000"/>
+                        </a:lnSpc>
+                        <a:spcAft>
+                          <a:spcPts val="800"/>
+                        </a:spcAft>
+                      </a:pPr>
+                      <a:r>
+                        <a:rPr lang="en-IN" sz="1100" kern="100" dirty="0">
+                          <a:effectLst/>
+                        </a:rPr>
+                        <a:t>1</a:t>
+                      </a:r>
+                      <a:endParaRPr lang="en-IN" sz="1100" kern="100" dirty="0">
+                        <a:effectLst/>
+                        <a:latin typeface="Calibri" panose="020F0502020204030204" pitchFamily="34" charset="0"/>
+                        <a:ea typeface="Calibri" panose="020F0502020204030204" pitchFamily="34" charset="0"/>
+                        <a:cs typeface="Times New Roman" panose="02020603050405020304" pitchFamily="18" charset="0"/>
+                      </a:endParaRPr>
+                    </a:p>
+                  </a:txBody>
+                  <a:tcPr marL="68580" marR="68580" marT="0" marB="0"/>
+                </a:tc>
+                <a:extLst>
+                  <a:ext uri="{0D108BD9-81ED-4DB2-BD59-A6C34878D82A}">
+                    <a16:rowId xmlns:a16="http://schemas.microsoft.com/office/drawing/2014/main" val="2630948796"/>
+                  </a:ext>
+                </a:extLst>
+              </a:tr>
+            </a:tbl>
+          </a:graphicData>
+        </a:graphic>
+      </p:graphicFrame>
+      <p:sp>
+        <p:nvSpPr>
+          <p:cNvPr id="4" name="Rectangle 3">
+            <a:extLst>
+              <a:ext uri="{FF2B5EF4-FFF2-40B4-BE49-F238E27FC236}">
+                <a16:creationId xmlns:a16="http://schemas.microsoft.com/office/drawing/2014/main" id="{FA6271BF-549B-54FB-EA3C-24BDCC926F61}"/>
+              </a:ext>
+            </a:extLst>
+          </p:cNvPr>
+          <p:cNvSpPr/>
+          <p:nvPr/>
+        </p:nvSpPr>
+        <p:spPr>
+          <a:xfrm>
+            <a:off x="-3440" y="-2533"/>
+            <a:ext cx="6843978" cy="6840538"/>
+          </a:xfrm>
+          <a:prstGeom prst="rect">
+            <a:avLst/>
+          </a:prstGeom>
+          <a:solidFill>
+            <a:srgbClr val="E66432"/>
+          </a:solidFill>
+          <a:ln>
+            <a:noFill/>
+          </a:ln>
+        </p:spPr>
+        <p:style>
+          <a:lnRef idx="2">
+            <a:schemeClr val="accent1">
+              <a:shade val="50000"/>
+            </a:schemeClr>
+          </a:lnRef>
+          <a:fillRef idx="1">
+            <a:schemeClr val="accent1"/>
+          </a:fillRef>
+          <a:effectRef idx="0">
+            <a:schemeClr val="accent1"/>
+          </a:effectRef>
+          <a:fontRef idx="minor">
+            <a:schemeClr val="lt1"/>
+          </a:fontRef>
+        </p:style>
+        <p:txBody>
+          <a:bodyPr rtlCol="0" anchor="ctr"/>
+          <a:lstStyle/>
+          <a:p>
+            <a:pPr algn="ctr"/>
+            <a:endParaRPr lang="en-AU" dirty="0"/>
+          </a:p>
+        </p:txBody>
+      </p:sp>
+      <p:grpSp>
+        <p:nvGrpSpPr>
+          <p:cNvPr id="5" name="Group 4">
+            <a:extLst>
+              <a:ext uri="{FF2B5EF4-FFF2-40B4-BE49-F238E27FC236}">
+                <a16:creationId xmlns:a16="http://schemas.microsoft.com/office/drawing/2014/main" id="{BA07D6A4-422A-C649-E0FC-6D4AEE63D073}"/>
+              </a:ext>
+            </a:extLst>
+          </p:cNvPr>
+          <p:cNvGrpSpPr/>
+          <p:nvPr/>
+        </p:nvGrpSpPr>
+        <p:grpSpPr>
+          <a:xfrm>
+            <a:off x="3795252" y="5845026"/>
+            <a:ext cx="2713703" cy="760335"/>
+            <a:chOff x="5550427" y="1477122"/>
+            <a:chExt cx="3570187" cy="1101044"/>
+          </a:xfrm>
+        </p:grpSpPr>
+        <p:sp>
+          <p:nvSpPr>
+            <p:cNvPr id="6" name="Rounded Rectangle 8">
+              <a:extLst>
+                <a:ext uri="{FF2B5EF4-FFF2-40B4-BE49-F238E27FC236}">
+                  <a16:creationId xmlns:a16="http://schemas.microsoft.com/office/drawing/2014/main" id="{D71B5659-34D1-1196-EB13-103568E8BED9}"/>
+                </a:ext>
+              </a:extLst>
+            </p:cNvPr>
+            <p:cNvSpPr/>
+            <p:nvPr/>
+          </p:nvSpPr>
+          <p:spPr>
+            <a:xfrm>
+              <a:off x="5550427" y="1497845"/>
+              <a:ext cx="3570187" cy="1080321"/>
+            </a:xfrm>
+            <a:prstGeom prst="roundRect">
+              <a:avLst>
+                <a:gd name="adj" fmla="val 50000"/>
+              </a:avLst>
+            </a:prstGeom>
+            <a:solidFill>
+              <a:srgbClr val="FF8C52"/>
+            </a:solidFill>
+            <a:ln>
+              <a:noFill/>
+            </a:ln>
+            <a:effectLst>
+              <a:glow rad="254000">
+                <a:srgbClr val="FF8C52"/>
+              </a:glow>
+              <a:softEdge rad="254000"/>
+            </a:effectLst>
+          </p:spPr>
+          <p:style>
+            <a:lnRef idx="2">
+              <a:schemeClr val="accent1">
+                <a:shade val="50000"/>
+              </a:schemeClr>
+            </a:lnRef>
+            <a:fillRef idx="1">
+              <a:schemeClr val="accent1"/>
+            </a:fillRef>
+            <a:effectRef idx="0">
+              <a:schemeClr val="accent1"/>
+            </a:effectRef>
+            <a:fontRef idx="minor">
+              <a:schemeClr val="lt1"/>
+            </a:fontRef>
+          </p:style>
+          <p:txBody>
+            <a:bodyPr rtlCol="0" anchor="ctr"/>
+            <a:lstStyle/>
+            <a:p>
+              <a:pPr algn="ctr"/>
+              <a:endParaRPr lang="en-AU">
+                <a:latin typeface="Oxygen" panose="02000503000000000000" pitchFamily="2" charset="0"/>
+              </a:endParaRPr>
+            </a:p>
+          </p:txBody>
+        </p:sp>
+        <p:grpSp>
+          <p:nvGrpSpPr>
+            <p:cNvPr id="7" name="Group 6">
+              <a:extLst>
+                <a:ext uri="{FF2B5EF4-FFF2-40B4-BE49-F238E27FC236}">
+                  <a16:creationId xmlns:a16="http://schemas.microsoft.com/office/drawing/2014/main" id="{706741C2-3596-30CA-C6F5-8BB43673D9D1}"/>
+                </a:ext>
+              </a:extLst>
+            </p:cNvPr>
+            <p:cNvGrpSpPr/>
+            <p:nvPr/>
+          </p:nvGrpSpPr>
+          <p:grpSpPr>
+            <a:xfrm>
+              <a:off x="5976783" y="1477122"/>
+              <a:ext cx="2800727" cy="1080000"/>
+              <a:chOff x="5936143" y="1477122"/>
+              <a:chExt cx="2800727" cy="1080000"/>
+            </a:xfrm>
+          </p:grpSpPr>
+          <p:sp>
+            <p:nvSpPr>
+              <p:cNvPr id="8" name="Rectangle 7">
+                <a:extLst>
+                  <a:ext uri="{FF2B5EF4-FFF2-40B4-BE49-F238E27FC236}">
+                    <a16:creationId xmlns:a16="http://schemas.microsoft.com/office/drawing/2014/main" id="{7FC58ADE-CAD1-D5F0-FCF8-2C9AB6D0B73E}"/>
+                  </a:ext>
+                </a:extLst>
+              </p:cNvPr>
+              <p:cNvSpPr/>
+              <p:nvPr/>
+            </p:nvSpPr>
+            <p:spPr>
+              <a:xfrm>
+                <a:off x="5936143" y="1477122"/>
+                <a:ext cx="2717475" cy="1080000"/>
+              </a:xfrm>
+              <a:prstGeom prst="rect">
+                <a:avLst/>
+              </a:prstGeom>
+              <a:solidFill>
+                <a:srgbClr val="FF8C52"/>
+              </a:solidFill>
+              <a:ln>
+                <a:noFill/>
+              </a:ln>
+            </p:spPr>
+            <p:style>
+              <a:lnRef idx="2">
+                <a:schemeClr val="accent1">
+                  <a:shade val="50000"/>
+                </a:schemeClr>
+              </a:lnRef>
+              <a:fillRef idx="1">
+                <a:schemeClr val="accent1"/>
+              </a:fillRef>
+              <a:effectRef idx="0">
+                <a:schemeClr val="accent1"/>
+              </a:effectRef>
+              <a:fontRef idx="minor">
+                <a:schemeClr val="lt1"/>
+              </a:fontRef>
+            </p:style>
+            <p:txBody>
+              <a:bodyPr rtlCol="0" anchor="ctr"/>
+              <a:lstStyle/>
+              <a:p>
+                <a:pPr algn="ctr"/>
+                <a:endParaRPr lang="en-AU"/>
+              </a:p>
+            </p:txBody>
+          </p:sp>
+          <p:sp>
+            <p:nvSpPr>
+              <p:cNvPr id="9" name="TextBox 8">
+                <a:extLst>
+                  <a:ext uri="{FF2B5EF4-FFF2-40B4-BE49-F238E27FC236}">
+                    <a16:creationId xmlns:a16="http://schemas.microsoft.com/office/drawing/2014/main" id="{CCDDD188-F223-810B-FF3E-2A4B75273D71}"/>
+                  </a:ext>
+                </a:extLst>
+              </p:cNvPr>
+              <p:cNvSpPr txBox="1"/>
+              <p:nvPr/>
+            </p:nvSpPr>
+            <p:spPr>
+              <a:xfrm>
+                <a:off x="6513561" y="1601129"/>
+                <a:ext cx="2223309" cy="741982"/>
+              </a:xfrm>
+              <a:prstGeom prst="rect">
+                <a:avLst/>
+              </a:prstGeom>
+              <a:noFill/>
+            </p:spPr>
+            <p:txBody>
+              <a:bodyPr wrap="square" rtlCol="0">
+                <a:spAutoFit/>
+              </a:bodyPr>
+              <a:lstStyle/>
+              <a:p>
+                <a:r>
+                  <a:rPr lang="en-US" sz="3000" b="1" dirty="0">
+                    <a:solidFill>
+                      <a:schemeClr val="bg1"/>
+                    </a:solidFill>
+                    <a:latin typeface="Oxygen" panose="02000503000000000000" pitchFamily="2" charset="0"/>
+                  </a:rPr>
+                  <a:t>nodiam</a:t>
+                </a:r>
+              </a:p>
+            </p:txBody>
+          </p:sp>
+          <p:sp>
+            <p:nvSpPr>
+              <p:cNvPr id="10" name="TextBox 9">
+                <a:extLst>
+                  <a:ext uri="{FF2B5EF4-FFF2-40B4-BE49-F238E27FC236}">
+                    <a16:creationId xmlns:a16="http://schemas.microsoft.com/office/drawing/2014/main" id="{C660DA96-6015-2EF1-60BB-D36A7CC42715}"/>
+                  </a:ext>
+                </a:extLst>
+              </p:cNvPr>
+              <p:cNvSpPr txBox="1"/>
+              <p:nvPr/>
+            </p:nvSpPr>
+            <p:spPr>
+              <a:xfrm>
+                <a:off x="5938291" y="2183975"/>
+                <a:ext cx="2741469" cy="370991"/>
+              </a:xfrm>
+              <a:prstGeom prst="rect">
+                <a:avLst/>
+              </a:prstGeom>
+              <a:noFill/>
+            </p:spPr>
+            <p:txBody>
+              <a:bodyPr wrap="square" rtlCol="0">
+                <a:spAutoFit/>
+              </a:bodyPr>
+              <a:lstStyle/>
+              <a:p>
+                <a:r>
+                  <a:rPr lang="en-US" sz="1200" b="1" i="1" dirty="0">
+                    <a:solidFill>
+                      <a:schemeClr val="bg1"/>
+                    </a:solidFill>
+                    <a:latin typeface="Oxygen" panose="02000503000000000000" pitchFamily="2" charset="0"/>
+                  </a:rPr>
+                  <a:t>Education that enlightens!</a:t>
+                </a:r>
+              </a:p>
+            </p:txBody>
+          </p:sp>
+          <p:sp>
+            <p:nvSpPr>
+              <p:cNvPr id="11" name="Freeform 13">
+                <a:extLst>
+                  <a:ext uri="{FF2B5EF4-FFF2-40B4-BE49-F238E27FC236}">
+                    <a16:creationId xmlns:a16="http://schemas.microsoft.com/office/drawing/2014/main" id="{F26A55DD-F424-F19C-2630-F744E384B5B1}"/>
+                  </a:ext>
+                </a:extLst>
+              </p:cNvPr>
+              <p:cNvSpPr/>
+              <p:nvPr/>
+            </p:nvSpPr>
+            <p:spPr>
+              <a:xfrm>
+                <a:off x="5999251" y="1652587"/>
+                <a:ext cx="576000" cy="576000"/>
+              </a:xfrm>
+              <a:custGeom>
+                <a:avLst/>
+                <a:gdLst>
+                  <a:gd name="connsiteX0" fmla="*/ 1080000 w 2160000"/>
+                  <a:gd name="connsiteY0" fmla="*/ 0 h 2160000"/>
+                  <a:gd name="connsiteX1" fmla="*/ 2154424 w 2160000"/>
+                  <a:gd name="connsiteY1" fmla="*/ 969576 h 2160000"/>
+                  <a:gd name="connsiteX2" fmla="*/ 2157027 w 2160000"/>
+                  <a:gd name="connsiteY2" fmla="*/ 1021127 h 2160000"/>
+                  <a:gd name="connsiteX3" fmla="*/ 2159999 w 2160000"/>
+                  <a:gd name="connsiteY3" fmla="*/ 1021127 h 2160000"/>
+                  <a:gd name="connsiteX4" fmla="*/ 2159999 w 2160000"/>
+                  <a:gd name="connsiteY4" fmla="*/ 1079980 h 2160000"/>
+                  <a:gd name="connsiteX5" fmla="*/ 2160000 w 2160000"/>
+                  <a:gd name="connsiteY5" fmla="*/ 1080000 h 2160000"/>
+                  <a:gd name="connsiteX6" fmla="*/ 2159999 w 2160000"/>
+                  <a:gd name="connsiteY6" fmla="*/ 1080021 h 2160000"/>
+                  <a:gd name="connsiteX7" fmla="*/ 2159999 w 2160000"/>
+                  <a:gd name="connsiteY7" fmla="*/ 1716639 h 2160000"/>
+                  <a:gd name="connsiteX8" fmla="*/ 2157838 w 2160000"/>
+                  <a:gd name="connsiteY8" fmla="*/ 1716639 h 2160000"/>
+                  <a:gd name="connsiteX9" fmla="*/ 2160000 w 2160000"/>
+                  <a:gd name="connsiteY9" fmla="*/ 1738544 h 2160000"/>
+                  <a:gd name="connsiteX10" fmla="*/ 1891921 w 2160000"/>
+                  <a:gd name="connsiteY10" fmla="*/ 2012333 h 2160000"/>
+                  <a:gd name="connsiteX11" fmla="*/ 1623842 w 2160000"/>
+                  <a:gd name="connsiteY11" fmla="*/ 1738544 h 2160000"/>
+                  <a:gd name="connsiteX12" fmla="*/ 1626005 w 2160000"/>
+                  <a:gd name="connsiteY12" fmla="*/ 1716639 h 2160000"/>
+                  <a:gd name="connsiteX13" fmla="*/ 1620298 w 2160000"/>
+                  <a:gd name="connsiteY13" fmla="*/ 1716639 h 2160000"/>
+                  <a:gd name="connsiteX14" fmla="*/ 1620298 w 2160000"/>
+                  <a:gd name="connsiteY14" fmla="*/ 1090950 h 2160000"/>
+                  <a:gd name="connsiteX15" fmla="*/ 1618898 w 2160000"/>
+                  <a:gd name="connsiteY15" fmla="*/ 1090937 h 2160000"/>
+                  <a:gd name="connsiteX16" fmla="*/ 1620000 w 2160000"/>
+                  <a:gd name="connsiteY16" fmla="*/ 1080000 h 2160000"/>
+                  <a:gd name="connsiteX17" fmla="*/ 1080000 w 2160000"/>
+                  <a:gd name="connsiteY17" fmla="*/ 540000 h 2160000"/>
+                  <a:gd name="connsiteX18" fmla="*/ 540000 w 2160000"/>
+                  <a:gd name="connsiteY18" fmla="*/ 1080000 h 2160000"/>
+                  <a:gd name="connsiteX19" fmla="*/ 1080000 w 2160000"/>
+                  <a:gd name="connsiteY19" fmla="*/ 1620000 h 2160000"/>
+                  <a:gd name="connsiteX20" fmla="*/ 1172144 w 2160000"/>
+                  <a:gd name="connsiteY20" fmla="*/ 1610711 h 2160000"/>
+                  <a:gd name="connsiteX21" fmla="*/ 1192722 w 2160000"/>
+                  <a:gd name="connsiteY21" fmla="*/ 1599542 h 2160000"/>
+                  <a:gd name="connsiteX22" fmla="*/ 1205334 w 2160000"/>
+                  <a:gd name="connsiteY22" fmla="*/ 1595627 h 2160000"/>
+                  <a:gd name="connsiteX23" fmla="*/ 1218649 w 2160000"/>
+                  <a:gd name="connsiteY23" fmla="*/ 1594482 h 2160000"/>
+                  <a:gd name="connsiteX24" fmla="*/ 1273176 w 2160000"/>
+                  <a:gd name="connsiteY24" fmla="*/ 1581875 h 2160000"/>
+                  <a:gd name="connsiteX25" fmla="*/ 1277433 w 2160000"/>
+                  <a:gd name="connsiteY25" fmla="*/ 1580379 h 2160000"/>
+                  <a:gd name="connsiteX26" fmla="*/ 1297818 w 2160000"/>
+                  <a:gd name="connsiteY26" fmla="*/ 1578324 h 2160000"/>
+                  <a:gd name="connsiteX27" fmla="*/ 1567818 w 2160000"/>
+                  <a:gd name="connsiteY27" fmla="*/ 1848324 h 2160000"/>
+                  <a:gd name="connsiteX28" fmla="*/ 1469563 w 2160000"/>
+                  <a:gd name="connsiteY28" fmla="*/ 2056669 h 2160000"/>
+                  <a:gd name="connsiteX29" fmla="*/ 1412948 w 2160000"/>
+                  <a:gd name="connsiteY29" fmla="*/ 2091019 h 2160000"/>
+                  <a:gd name="connsiteX30" fmla="*/ 1398272 w 2160000"/>
+                  <a:gd name="connsiteY30" fmla="*/ 2101498 h 2160000"/>
+                  <a:gd name="connsiteX31" fmla="*/ 1374464 w 2160000"/>
+                  <a:gd name="connsiteY31" fmla="*/ 2110955 h 2160000"/>
+                  <a:gd name="connsiteX32" fmla="*/ 1376211 w 2160000"/>
+                  <a:gd name="connsiteY32" fmla="*/ 2117860 h 2160000"/>
+                  <a:gd name="connsiteX33" fmla="*/ 1321962 w 2160000"/>
+                  <a:gd name="connsiteY33" fmla="*/ 2131809 h 2160000"/>
+                  <a:gd name="connsiteX34" fmla="*/ 1306247 w 2160000"/>
+                  <a:gd name="connsiteY34" fmla="*/ 2138051 h 2160000"/>
+                  <a:gd name="connsiteX35" fmla="*/ 1267530 w 2160000"/>
+                  <a:gd name="connsiteY35" fmla="*/ 2142656 h 2160000"/>
+                  <a:gd name="connsiteX36" fmla="*/ 1190424 w 2160000"/>
+                  <a:gd name="connsiteY36" fmla="*/ 2154424 h 2160000"/>
+                  <a:gd name="connsiteX37" fmla="*/ 1080000 w 2160000"/>
+                  <a:gd name="connsiteY37" fmla="*/ 2160000 h 2160000"/>
+                  <a:gd name="connsiteX38" fmla="*/ 0 w 2160000"/>
+                  <a:gd name="connsiteY38" fmla="*/ 1080000 h 2160000"/>
+                  <a:gd name="connsiteX39" fmla="*/ 1080000 w 2160000"/>
+                  <a:gd name="connsiteY39" fmla="*/ 0 h 2160000"/>
+                </a:gdLst>
+                <a:ahLst/>
+                <a:cxnLst>
+                  <a:cxn ang="0">
+                    <a:pos x="connsiteX0" y="connsiteY0"/>
+                  </a:cxn>
+                  <a:cxn ang="0">
+                    <a:pos x="connsiteX1" y="connsiteY1"/>
+                  </a:cxn>
+                  <a:cxn ang="0">
+                    <a:pos x="connsiteX2" y="connsiteY2"/>
+                  </a:cxn>
+                  <a:cxn ang="0">
+                    <a:pos x="connsiteX3" y="connsiteY3"/>
+                  </a:cxn>
+                  <a:cxn ang="0">
+                    <a:pos x="connsiteX4" y="connsiteY4"/>
+                  </a:cxn>
+                  <a:cxn ang="0">
+                    <a:pos x="connsiteX5" y="connsiteY5"/>
+                  </a:cxn>
+                  <a:cxn ang="0">
+                    <a:pos x="connsiteX6" y="connsiteY6"/>
+                  </a:cxn>
+                  <a:cxn ang="0">
+                    <a:pos x="connsiteX7" y="connsiteY7"/>
+                  </a:cxn>
+                  <a:cxn ang="0">
+                    <a:pos x="connsiteX8" y="connsiteY8"/>
+                  </a:cxn>
+                  <a:cxn ang="0">
+                    <a:pos x="connsiteX9" y="connsiteY9"/>
+                  </a:cxn>
+                  <a:cxn ang="0">
+                    <a:pos x="connsiteX10" y="connsiteY10"/>
+                  </a:cxn>
+                  <a:cxn ang="0">
+                    <a:pos x="connsiteX11" y="connsiteY11"/>
+                  </a:cxn>
+                  <a:cxn ang="0">
+                    <a:pos x="connsiteX12" y="connsiteY12"/>
+                  </a:cxn>
+                  <a:cxn ang="0">
+                    <a:pos x="connsiteX13" y="connsiteY13"/>
+                  </a:cxn>
+                  <a:cxn ang="0">
+                    <a:pos x="connsiteX14" y="connsiteY14"/>
+                  </a:cxn>
+                  <a:cxn ang="0">
+                    <a:pos x="connsiteX15" y="connsiteY15"/>
+                  </a:cxn>
+                  <a:cxn ang="0">
+                    <a:pos x="connsiteX16" y="connsiteY16"/>
+                  </a:cxn>
+                  <a:cxn ang="0">
+                    <a:pos x="connsiteX17" y="connsiteY17"/>
+                  </a:cxn>
+                  <a:cxn ang="0">
+                    <a:pos x="connsiteX18" y="connsiteY18"/>
+                  </a:cxn>
+                  <a:cxn ang="0">
+                    <a:pos x="connsiteX19" y="connsiteY19"/>
+                  </a:cxn>
+                  <a:cxn ang="0">
+                    <a:pos x="connsiteX20" y="connsiteY20"/>
+                  </a:cxn>
+                  <a:cxn ang="0">
+                    <a:pos x="connsiteX21" y="connsiteY21"/>
+                  </a:cxn>
+                  <a:cxn ang="0">
+                    <a:pos x="connsiteX22" y="connsiteY22"/>
+                  </a:cxn>
+                  <a:cxn ang="0">
+                    <a:pos x="connsiteX23" y="connsiteY23"/>
+                  </a:cxn>
+                  <a:cxn ang="0">
+                    <a:pos x="connsiteX24" y="connsiteY24"/>
+                  </a:cxn>
+                  <a:cxn ang="0">
+                    <a:pos x="connsiteX25" y="connsiteY25"/>
+                  </a:cxn>
+                  <a:cxn ang="0">
+                    <a:pos x="connsiteX26" y="connsiteY26"/>
+                  </a:cxn>
+                  <a:cxn ang="0">
+                    <a:pos x="connsiteX27" y="connsiteY27"/>
+                  </a:cxn>
+                  <a:cxn ang="0">
+                    <a:pos x="connsiteX28" y="connsiteY28"/>
+                  </a:cxn>
+                  <a:cxn ang="0">
+                    <a:pos x="connsiteX29" y="connsiteY29"/>
+                  </a:cxn>
+                  <a:cxn ang="0">
+                    <a:pos x="connsiteX30" y="connsiteY30"/>
+                  </a:cxn>
+                  <a:cxn ang="0">
+                    <a:pos x="connsiteX31" y="connsiteY31"/>
+                  </a:cxn>
+                  <a:cxn ang="0">
+                    <a:pos x="connsiteX32" y="connsiteY32"/>
+                  </a:cxn>
+                  <a:cxn ang="0">
+                    <a:pos x="connsiteX33" y="connsiteY33"/>
+                  </a:cxn>
+                  <a:cxn ang="0">
+                    <a:pos x="connsiteX34" y="connsiteY34"/>
+                  </a:cxn>
+                  <a:cxn ang="0">
+                    <a:pos x="connsiteX35" y="connsiteY35"/>
+                  </a:cxn>
+                  <a:cxn ang="0">
+                    <a:pos x="connsiteX36" y="connsiteY36"/>
+                  </a:cxn>
+                  <a:cxn ang="0">
+                    <a:pos x="connsiteX37" y="connsiteY37"/>
+                  </a:cxn>
+                  <a:cxn ang="0">
+                    <a:pos x="connsiteX38" y="connsiteY38"/>
+                  </a:cxn>
+                  <a:cxn ang="0">
+                    <a:pos x="connsiteX39" y="connsiteY39"/>
+                  </a:cxn>
+                </a:cxnLst>
+                <a:rect l="l" t="t" r="r" b="b"/>
+                <a:pathLst>
+                  <a:path w="2160000" h="2160000">
+                    <a:moveTo>
+                      <a:pt x="1080000" y="0"/>
+                    </a:moveTo>
+                    <a:cubicBezTo>
+                      <a:pt x="1639189" y="0"/>
+                      <a:pt x="2099117" y="424979"/>
+                      <a:pt x="2154424" y="969576"/>
+                    </a:cubicBezTo>
+                    <a:lnTo>
+                      <a:pt x="2157027" y="1021127"/>
+                    </a:lnTo>
+                    <a:lnTo>
+                      <a:pt x="2159999" y="1021127"/>
+                    </a:lnTo>
+                    <a:lnTo>
+                      <a:pt x="2159999" y="1079980"/>
+                    </a:lnTo>
+                    <a:lnTo>
+                      <a:pt x="2160000" y="1080000"/>
+                    </a:lnTo>
+                    <a:lnTo>
+                      <a:pt x="2159999" y="1080021"/>
+                    </a:lnTo>
+                    <a:lnTo>
+                      <a:pt x="2159999" y="1716639"/>
+                    </a:lnTo>
+                    <a:lnTo>
+                      <a:pt x="2157838" y="1716639"/>
+                    </a:lnTo>
+                    <a:lnTo>
+                      <a:pt x="2160000" y="1738544"/>
+                    </a:lnTo>
+                    <a:cubicBezTo>
+                      <a:pt x="2160000" y="1889753"/>
+                      <a:pt x="2039977" y="2012333"/>
+                      <a:pt x="1891921" y="2012333"/>
+                    </a:cubicBezTo>
+                    <a:cubicBezTo>
+                      <a:pt x="1743865" y="2012333"/>
+                      <a:pt x="1623842" y="1889753"/>
+                      <a:pt x="1623842" y="1738544"/>
+                    </a:cubicBezTo>
+                    <a:lnTo>
+                      <a:pt x="1626005" y="1716639"/>
+                    </a:lnTo>
+                    <a:lnTo>
+                      <a:pt x="1620298" y="1716639"/>
+                    </a:lnTo>
+                    <a:lnTo>
+                      <a:pt x="1620298" y="1090950"/>
+                    </a:lnTo>
+                    <a:lnTo>
+                      <a:pt x="1618898" y="1090937"/>
+                    </a:lnTo>
+                    <a:lnTo>
+                      <a:pt x="1620000" y="1080000"/>
+                    </a:lnTo>
+                    <a:cubicBezTo>
+                      <a:pt x="1620000" y="781766"/>
+                      <a:pt x="1378234" y="540000"/>
+                      <a:pt x="1080000" y="540000"/>
+                    </a:cubicBezTo>
+                    <a:cubicBezTo>
+                      <a:pt x="781766" y="540000"/>
+                      <a:pt x="540000" y="781766"/>
+                      <a:pt x="540000" y="1080000"/>
+                    </a:cubicBezTo>
+                    <a:cubicBezTo>
+                      <a:pt x="540000" y="1378234"/>
+                      <a:pt x="781766" y="1620000"/>
+                      <a:pt x="1080000" y="1620000"/>
+                    </a:cubicBezTo>
+                    <a:lnTo>
+                      <a:pt x="1172144" y="1610711"/>
+                    </a:lnTo>
+                    <a:lnTo>
+                      <a:pt x="1192722" y="1599542"/>
+                    </a:lnTo>
+                    <a:lnTo>
+                      <a:pt x="1205334" y="1595627"/>
+                    </a:lnTo>
+                    <a:lnTo>
+                      <a:pt x="1218649" y="1594482"/>
+                    </a:lnTo>
+                    <a:cubicBezTo>
+                      <a:pt x="1237851" y="1591023"/>
+                      <a:pt x="1256099" y="1586790"/>
+                      <a:pt x="1273176" y="1581875"/>
+                    </a:cubicBezTo>
+                    <a:lnTo>
+                      <a:pt x="1277433" y="1580379"/>
+                    </a:lnTo>
+                    <a:lnTo>
+                      <a:pt x="1297818" y="1578324"/>
+                    </a:lnTo>
+                    <a:cubicBezTo>
+                      <a:pt x="1446935" y="1578324"/>
+                      <a:pt x="1567818" y="1699207"/>
+                      <a:pt x="1567818" y="1848324"/>
+                    </a:cubicBezTo>
+                    <a:cubicBezTo>
+                      <a:pt x="1567818" y="1932202"/>
+                      <a:pt x="1529570" y="2007147"/>
+                      <a:pt x="1469563" y="2056669"/>
+                    </a:cubicBezTo>
+                    <a:lnTo>
+                      <a:pt x="1412948" y="2091019"/>
+                    </a:lnTo>
+                    <a:lnTo>
+                      <a:pt x="1398272" y="2101498"/>
+                    </a:lnTo>
+                    <a:lnTo>
+                      <a:pt x="1374464" y="2110955"/>
+                    </a:lnTo>
+                    <a:lnTo>
+                      <a:pt x="1376211" y="2117860"/>
+                    </a:lnTo>
+                    <a:lnTo>
+                      <a:pt x="1321962" y="2131809"/>
+                    </a:lnTo>
+                    <a:lnTo>
+                      <a:pt x="1306247" y="2138051"/>
+                    </a:lnTo>
+                    <a:lnTo>
+                      <a:pt x="1267530" y="2142656"/>
+                    </a:lnTo>
+                    <a:lnTo>
+                      <a:pt x="1190424" y="2154424"/>
+                    </a:lnTo>
+                    <a:cubicBezTo>
+                      <a:pt x="1154118" y="2158111"/>
+                      <a:pt x="1117280" y="2160000"/>
+                      <a:pt x="1080000" y="2160000"/>
+                    </a:cubicBezTo>
+                    <a:cubicBezTo>
+                      <a:pt x="483532" y="2160000"/>
+                      <a:pt x="0" y="1676468"/>
+                      <a:pt x="0" y="1080000"/>
+                    </a:cubicBezTo>
+                    <a:cubicBezTo>
+                      <a:pt x="0" y="483532"/>
+                      <a:pt x="483532" y="0"/>
+                      <a:pt x="1080000" y="0"/>
+                    </a:cubicBezTo>
+                    <a:close/>
+                  </a:path>
+                </a:pathLst>
+              </a:custGeom>
+              <a:solidFill>
+                <a:schemeClr val="bg1"/>
+              </a:solidFill>
+              <a:ln>
+                <a:solidFill>
+                  <a:schemeClr val="bg1"/>
+                </a:solidFill>
+              </a:ln>
+            </p:spPr>
+            <p:style>
+              <a:lnRef idx="2">
+                <a:schemeClr val="accent1">
+                  <a:shade val="50000"/>
+                </a:schemeClr>
+              </a:lnRef>
+              <a:fillRef idx="1">
+                <a:schemeClr val="accent1"/>
+              </a:fillRef>
+              <a:effectRef idx="0">
+                <a:schemeClr val="accent1"/>
+              </a:effectRef>
+              <a:fontRef idx="minor">
+                <a:schemeClr val="lt1"/>
+              </a:fontRef>
+            </p:style>
+            <p:txBody>
+              <a:bodyPr rtlCol="0" anchor="ctr"/>
+              <a:lstStyle/>
+              <a:p>
+                <a:pPr marL="285750" indent="-285750" algn="ctr">
+                  <a:buFont typeface="Arial" panose="020B0604020202020204" pitchFamily="34" charset="0"/>
+                  <a:buChar char="•"/>
+                </a:pPr>
+                <a:endParaRPr lang="en-AU" sz="1796">
+                  <a:latin typeface="Oxygen" panose="02000503000000000000" pitchFamily="2" charset="0"/>
+                </a:endParaRPr>
+              </a:p>
+            </p:txBody>
+          </p:sp>
+        </p:grpSp>
+      </p:grpSp>
+      <p:sp>
+        <p:nvSpPr>
+          <p:cNvPr id="12" name="TextBox 11">
+            <a:extLst>
+              <a:ext uri="{FF2B5EF4-FFF2-40B4-BE49-F238E27FC236}">
+                <a16:creationId xmlns:a16="http://schemas.microsoft.com/office/drawing/2014/main" id="{DCE77697-0499-322D-8A01-EA63EAED79E1}"/>
+              </a:ext>
+            </a:extLst>
+          </p:cNvPr>
+          <p:cNvSpPr txBox="1"/>
+          <p:nvPr/>
+        </p:nvSpPr>
+        <p:spPr>
+          <a:xfrm>
+            <a:off x="-45720" y="265176"/>
+            <a:ext cx="6840538" cy="523220"/>
+          </a:xfrm>
+          <a:prstGeom prst="rect">
+            <a:avLst/>
+          </a:prstGeom>
+          <a:noFill/>
+        </p:spPr>
+        <p:txBody>
+          <a:bodyPr wrap="square" rtlCol="0">
+            <a:spAutoFit/>
+          </a:bodyPr>
+          <a:lstStyle/>
+          <a:p>
+            <a:pPr algn="ctr"/>
+            <a:endParaRPr lang="en-US" sz="1400" dirty="0">
+              <a:solidFill>
+                <a:schemeClr val="bg1"/>
+              </a:solidFill>
+              <a:latin typeface="Oxygen" panose="02000503000000000000" pitchFamily="2" charset="0"/>
+            </a:endParaRPr>
+          </a:p>
+          <a:p>
+            <a:endParaRPr lang="en-US" sz="1400" b="1" dirty="0">
+              <a:solidFill>
+                <a:schemeClr val="bg1"/>
+              </a:solidFill>
+              <a:latin typeface="Oxygen" panose="02000503000000000000" pitchFamily="2" charset="0"/>
+            </a:endParaRPr>
+          </a:p>
+        </p:txBody>
+      </p:sp>
+      <p:sp>
+        <p:nvSpPr>
+          <p:cNvPr id="16" name="TextBox 15">
+            <a:extLst>
+              <a:ext uri="{FF2B5EF4-FFF2-40B4-BE49-F238E27FC236}">
+                <a16:creationId xmlns:a16="http://schemas.microsoft.com/office/drawing/2014/main" id="{C1078C45-68C2-5CDF-A615-357BDDC0F711}"/>
+              </a:ext>
+            </a:extLst>
+          </p:cNvPr>
+          <p:cNvSpPr txBox="1"/>
+          <p:nvPr/>
+        </p:nvSpPr>
+        <p:spPr>
+          <a:xfrm>
+            <a:off x="111597" y="4856830"/>
+            <a:ext cx="6840538" cy="923330"/>
+          </a:xfrm>
+          <a:prstGeom prst="rect">
+            <a:avLst/>
+          </a:prstGeom>
+          <a:noFill/>
+        </p:spPr>
+        <p:txBody>
+          <a:bodyPr wrap="square" rtlCol="0">
+            <a:spAutoFit/>
+          </a:bodyPr>
+          <a:lstStyle/>
+          <a:p>
+            <a:pPr algn="ctr"/>
+            <a:r>
+              <a:rPr lang="en-US" sz="2400" b="1" dirty="0">
+                <a:solidFill>
+                  <a:schemeClr val="bg1"/>
+                </a:solidFill>
+                <a:latin typeface="Oxygen" panose="02000503000000000000" pitchFamily="2" charset="0"/>
+              </a:rPr>
+              <a:t>                               </a:t>
+            </a:r>
+            <a:r>
+              <a:rPr lang="en-US" sz="2400" b="1" u="sng" dirty="0">
+                <a:solidFill>
+                  <a:srgbClr val="002060"/>
+                </a:solidFill>
+                <a:latin typeface="Oxygen" panose="02000503000000000000" pitchFamily="2" charset="0"/>
+                <a:hlinkClick r:id="rId2">
+                  <a:extLst>
+                    <a:ext uri="{A12FA001-AC4F-418D-AE19-62706E023703}">
+                      <ahyp:hlinkClr xmlns:ahyp="http://schemas.microsoft.com/office/drawing/2018/hyperlinkcolor" val="tx"/>
+                    </a:ext>
+                  </a:extLst>
+                </a:hlinkClick>
+              </a:rPr>
+              <a:t>anirban@anodiam.com</a:t>
+            </a:r>
+            <a:endParaRPr lang="en-US" sz="2400" b="1" u="sng" dirty="0">
+              <a:solidFill>
+                <a:srgbClr val="002060"/>
+              </a:solidFill>
+              <a:latin typeface="Oxygen" panose="02000503000000000000" pitchFamily="2" charset="0"/>
+            </a:endParaRPr>
+          </a:p>
+          <a:p>
+            <a:pPr algn="ctr"/>
+            <a:endParaRPr lang="en-US" sz="600" b="1" dirty="0">
+              <a:solidFill>
+                <a:srgbClr val="00B0F0"/>
+              </a:solidFill>
+              <a:latin typeface="Oxygen" panose="02000503000000000000" pitchFamily="2" charset="0"/>
+            </a:endParaRPr>
+          </a:p>
+          <a:p>
+            <a:pPr algn="ctr"/>
+            <a:r>
+              <a:rPr lang="en-US" sz="2400" b="1" dirty="0">
+                <a:solidFill>
+                  <a:schemeClr val="bg1"/>
+                </a:solidFill>
+                <a:latin typeface="Oxygen" panose="02000503000000000000" pitchFamily="2" charset="0"/>
+              </a:rPr>
+              <a:t>                          or call 9073700094</a:t>
+            </a:r>
+            <a:endParaRPr lang="en-AU" sz="2400" b="1" dirty="0">
+              <a:solidFill>
+                <a:schemeClr val="bg1"/>
+              </a:solidFill>
+              <a:latin typeface="Oxygen" panose="02000503000000000000" pitchFamily="2" charset="0"/>
+            </a:endParaRPr>
+          </a:p>
+        </p:txBody>
+      </p:sp>
+      <p:sp>
+        <p:nvSpPr>
+          <p:cNvPr id="26" name="TextBox 25">
+            <a:extLst>
+              <a:ext uri="{FF2B5EF4-FFF2-40B4-BE49-F238E27FC236}">
+                <a16:creationId xmlns:a16="http://schemas.microsoft.com/office/drawing/2014/main" id="{F96659F9-C473-8A59-7C2E-AA805DFC1E2C}"/>
+              </a:ext>
+            </a:extLst>
+          </p:cNvPr>
+          <p:cNvSpPr txBox="1"/>
+          <p:nvPr/>
+        </p:nvSpPr>
+        <p:spPr>
+          <a:xfrm>
+            <a:off x="2574126" y="1566070"/>
+            <a:ext cx="3689022" cy="4154984"/>
+          </a:xfrm>
+          <a:prstGeom prst="rect">
+            <a:avLst/>
+          </a:prstGeom>
+          <a:noFill/>
+        </p:spPr>
+        <p:txBody>
+          <a:bodyPr wrap="square" rtlCol="0">
+            <a:spAutoFit/>
+          </a:bodyPr>
+          <a:lstStyle/>
+          <a:p>
+            <a:pPr marL="285750" indent="-285750">
+              <a:buFontTx/>
+              <a:buChar char="-"/>
+            </a:pPr>
+            <a:r>
+              <a:rPr lang="en-US" sz="2400" b="1" dirty="0">
+                <a:latin typeface="Oxygen" panose="02000503000000000000" pitchFamily="2" charset="0"/>
+              </a:rPr>
+              <a:t>C, C++</a:t>
+            </a:r>
+          </a:p>
+          <a:p>
+            <a:pPr marL="285750" indent="-285750">
+              <a:buFontTx/>
+              <a:buChar char="-"/>
+            </a:pPr>
+            <a:r>
+              <a:rPr lang="en-US" sz="2400" b="1" dirty="0">
+                <a:latin typeface="Oxygen" panose="02000503000000000000" pitchFamily="2" charset="0"/>
+              </a:rPr>
+              <a:t>Java, Advanced Java</a:t>
+            </a:r>
+          </a:p>
+          <a:p>
+            <a:pPr marL="285750" indent="-285750">
+              <a:buFontTx/>
+              <a:buChar char="-"/>
+            </a:pPr>
+            <a:r>
+              <a:rPr lang="en-US" sz="2400" b="1" dirty="0">
+                <a:latin typeface="Oxygen" panose="02000503000000000000" pitchFamily="2" charset="0"/>
+              </a:rPr>
+              <a:t>.NET (C#,VB.NET)</a:t>
+            </a:r>
+          </a:p>
+          <a:p>
+            <a:pPr marL="285750" indent="-285750">
+              <a:buFontTx/>
+              <a:buChar char="-"/>
+            </a:pPr>
+            <a:r>
+              <a:rPr lang="en-US" sz="2400" b="1" dirty="0">
+                <a:latin typeface="Oxygen" panose="02000503000000000000" pitchFamily="2" charset="0"/>
+              </a:rPr>
+              <a:t>React JS (MUI)</a:t>
+            </a:r>
+          </a:p>
+          <a:p>
+            <a:pPr marL="285750" indent="-285750">
+              <a:buFontTx/>
+              <a:buChar char="-"/>
+            </a:pPr>
+            <a:r>
+              <a:rPr lang="en-US" sz="2400" b="1" dirty="0">
+                <a:latin typeface="Oxygen" panose="02000503000000000000" pitchFamily="2" charset="0"/>
+              </a:rPr>
+              <a:t>React Native</a:t>
+            </a:r>
+          </a:p>
+          <a:p>
+            <a:pPr marL="285750" indent="-285750">
+              <a:buFontTx/>
+              <a:buChar char="-"/>
+            </a:pPr>
+            <a:r>
+              <a:rPr lang="en-US" sz="2400" b="1" dirty="0">
+                <a:latin typeface="Oxygen" panose="02000503000000000000" pitchFamily="2" charset="0"/>
+              </a:rPr>
+              <a:t>MYSQL, SQL Server</a:t>
+            </a:r>
+          </a:p>
+          <a:p>
+            <a:pPr marL="285750" indent="-285750">
+              <a:buFontTx/>
+              <a:buChar char="-"/>
+            </a:pPr>
+            <a:r>
+              <a:rPr lang="en-US" sz="2400" b="1" dirty="0">
+                <a:latin typeface="Oxygen" panose="02000503000000000000" pitchFamily="2" charset="0"/>
+              </a:rPr>
+              <a:t>Oracle, Firebase</a:t>
+            </a:r>
+          </a:p>
+          <a:p>
+            <a:pPr marL="285750" indent="-285750">
+              <a:buFontTx/>
+              <a:buChar char="-"/>
+            </a:pPr>
+            <a:r>
+              <a:rPr lang="en-US" sz="2400" b="1" dirty="0">
+                <a:latin typeface="Oxygen" panose="02000503000000000000" pitchFamily="2" charset="0"/>
+              </a:rPr>
+              <a:t>Prince2, Agile Scrum</a:t>
+            </a:r>
+          </a:p>
+          <a:p>
+            <a:pPr marL="285750" indent="-285750">
+              <a:buFontTx/>
+              <a:buChar char="-"/>
+            </a:pPr>
+            <a:endParaRPr lang="en-US" sz="2400" b="1" dirty="0">
+              <a:latin typeface="Oxygen" panose="02000503000000000000" pitchFamily="2" charset="0"/>
+            </a:endParaRPr>
+          </a:p>
+          <a:p>
+            <a:pPr marL="285750" indent="-285750">
+              <a:buFontTx/>
+              <a:buChar char="-"/>
+            </a:pPr>
+            <a:endParaRPr lang="en-US" sz="2400" dirty="0">
+              <a:latin typeface="Oxygen" panose="02000503000000000000" pitchFamily="2" charset="0"/>
+            </a:endParaRPr>
+          </a:p>
+          <a:p>
+            <a:pPr marL="285750" indent="-285750">
+              <a:buFontTx/>
+              <a:buChar char="-"/>
+            </a:pPr>
+            <a:endParaRPr lang="en-IN" sz="2400" dirty="0">
+              <a:latin typeface="Oxygen" panose="02000503000000000000" pitchFamily="2" charset="0"/>
+            </a:endParaRPr>
+          </a:p>
+        </p:txBody>
+      </p:sp>
+      <p:pic>
+        <p:nvPicPr>
+          <p:cNvPr id="17" name="Picture 16">
+            <a:extLst>
+              <a:ext uri="{FF2B5EF4-FFF2-40B4-BE49-F238E27FC236}">
+                <a16:creationId xmlns:a16="http://schemas.microsoft.com/office/drawing/2014/main" id="{85E60F96-1090-5598-AAA9-9AA6CE51B540}"/>
+              </a:ext>
+            </a:extLst>
+          </p:cNvPr>
+          <p:cNvPicPr>
+            <a:picLocks noChangeAspect="1"/>
+          </p:cNvPicPr>
+          <p:nvPr/>
+        </p:nvPicPr>
+        <p:blipFill>
+          <a:blip r:embed="rId3"/>
+          <a:stretch>
+            <a:fillRect/>
+          </a:stretch>
+        </p:blipFill>
+        <p:spPr>
+          <a:xfrm>
+            <a:off x="155015" y="4938587"/>
+            <a:ext cx="2295525" cy="800100"/>
+          </a:xfrm>
+          <a:prstGeom prst="rect">
+            <a:avLst/>
+          </a:prstGeom>
+        </p:spPr>
+      </p:pic>
+      <p:pic>
+        <p:nvPicPr>
+          <p:cNvPr id="19" name="Picture 18">
+            <a:extLst>
+              <a:ext uri="{FF2B5EF4-FFF2-40B4-BE49-F238E27FC236}">
+                <a16:creationId xmlns:a16="http://schemas.microsoft.com/office/drawing/2014/main" id="{83147F61-F3CF-AC80-4470-7BD9254E80F6}"/>
+              </a:ext>
+            </a:extLst>
+          </p:cNvPr>
+          <p:cNvPicPr>
+            <a:picLocks noChangeAspect="1"/>
+          </p:cNvPicPr>
+          <p:nvPr/>
+        </p:nvPicPr>
+        <p:blipFill>
+          <a:blip r:embed="rId4">
+            <a:extLst>
+              <a:ext uri="{28A0092B-C50C-407E-A947-70E740481C1C}">
+                <a14:useLocalDpi xmlns:a14="http://schemas.microsoft.com/office/drawing/2010/main" val="0"/>
+              </a:ext>
+            </a:extLst>
+          </a:blip>
+          <a:stretch>
+            <a:fillRect/>
+          </a:stretch>
+        </p:blipFill>
+        <p:spPr>
+          <a:xfrm flipH="1">
+            <a:off x="577390" y="879985"/>
+            <a:ext cx="1881699" cy="2244132"/>
+          </a:xfrm>
+          <a:prstGeom prst="rect">
+            <a:avLst/>
+          </a:prstGeom>
+        </p:spPr>
+      </p:pic>
+      <p:sp>
+        <p:nvSpPr>
+          <p:cNvPr id="24" name="TextBox 23">
+            <a:extLst>
+              <a:ext uri="{FF2B5EF4-FFF2-40B4-BE49-F238E27FC236}">
+                <a16:creationId xmlns:a16="http://schemas.microsoft.com/office/drawing/2014/main" id="{F0909449-EE98-45AC-6E7F-EBE86D6F7480}"/>
+              </a:ext>
+            </a:extLst>
+          </p:cNvPr>
+          <p:cNvSpPr txBox="1"/>
+          <p:nvPr/>
+        </p:nvSpPr>
+        <p:spPr>
+          <a:xfrm>
+            <a:off x="1425676" y="1112905"/>
+            <a:ext cx="5418302" cy="461665"/>
+          </a:xfrm>
+          <a:prstGeom prst="rect">
+            <a:avLst/>
+          </a:prstGeom>
+          <a:noFill/>
+        </p:spPr>
+        <p:txBody>
+          <a:bodyPr wrap="square" rtlCol="0">
+            <a:spAutoFit/>
+          </a:bodyPr>
+          <a:lstStyle/>
+          <a:p>
+            <a:r>
+              <a:rPr lang="en-US" sz="2400" b="1" dirty="0">
+                <a:solidFill>
+                  <a:srgbClr val="FFFF00"/>
+                </a:solidFill>
+                <a:highlight>
+                  <a:srgbClr val="000080"/>
+                </a:highlight>
+                <a:latin typeface="Oxygen" panose="02000503000000000000" pitchFamily="2" charset="0"/>
+              </a:rPr>
+              <a:t>Passionate Teachers for IT Courses</a:t>
+            </a:r>
+            <a:endParaRPr lang="en-IN" sz="2400" b="1" dirty="0">
+              <a:solidFill>
+                <a:srgbClr val="FFFF00"/>
+              </a:solidFill>
+              <a:highlight>
+                <a:srgbClr val="000080"/>
+              </a:highlight>
+              <a:latin typeface="Oxygen" panose="02000503000000000000" pitchFamily="2" charset="0"/>
+            </a:endParaRPr>
+          </a:p>
+        </p:txBody>
+      </p:sp>
+      <p:pic>
+        <p:nvPicPr>
+          <p:cNvPr id="29" name="Content Placeholder 4">
+            <a:extLst>
+              <a:ext uri="{FF2B5EF4-FFF2-40B4-BE49-F238E27FC236}">
+                <a16:creationId xmlns:a16="http://schemas.microsoft.com/office/drawing/2014/main" id="{0D9A8972-C715-4DE5-50BB-1AEFFE3E4C74}"/>
+              </a:ext>
+            </a:extLst>
+          </p:cNvPr>
+          <p:cNvPicPr>
+            <a:picLocks noChangeAspect="1"/>
+          </p:cNvPicPr>
+          <p:nvPr/>
+        </p:nvPicPr>
+        <p:blipFill>
+          <a:blip r:embed="rId5"/>
+          <a:stretch>
+            <a:fillRect/>
+          </a:stretch>
+        </p:blipFill>
+        <p:spPr>
+          <a:xfrm>
+            <a:off x="0" y="-62026"/>
+            <a:ext cx="6840538" cy="1084298"/>
+          </a:xfrm>
+          <a:prstGeom prst="rect">
+            <a:avLst/>
+          </a:prstGeom>
+        </p:spPr>
+      </p:pic>
+    </p:spTree>
+    <p:extLst>
+      <p:ext uri="{BB962C8B-B14F-4D97-AF65-F5344CB8AC3E}">
+        <p14:creationId xmlns:p14="http://schemas.microsoft.com/office/powerpoint/2010/main" val="3610700388"/>
+      </p:ext>
+    </p:extLst>
+  </p:cSld>
+  <p:clrMapOvr>
+    <a:masterClrMapping/>
+  </p:clrMapOvr>
+</p:sld>
+</file>
+
 <file path=ppt/theme/theme1.xml><?xml version="1.0" encoding="utf-8"?>
 <a:theme xmlns:a="http://schemas.openxmlformats.org/drawingml/2006/main" name="Office Theme">
   <a:themeElements>

</xml_diff>

<commit_message>
CV of new candidates taken
CV of new candidates taken
</commit_message>
<xml_diff>
--- a/Offline/TeacherRecruitment/FaceBookAdForTeacherRecruitments/TeacherVaccancy.pptx
+++ b/Offline/TeacherRecruitment/FaceBookAdForTeacherRecruitments/TeacherVaccancy.pptx
@@ -4,11 +4,15 @@
   <p:sldMasterIdLst>
     <p:sldMasterId id="2147483660" r:id="rId1"/>
   </p:sldMasterIdLst>
+  <p:notesMasterIdLst>
+    <p:notesMasterId r:id="rId7"/>
+  </p:notesMasterIdLst>
   <p:sldIdLst>
     <p:sldId id="257" r:id="rId2"/>
     <p:sldId id="258" r:id="rId3"/>
     <p:sldId id="259" r:id="rId4"/>
     <p:sldId id="260" r:id="rId5"/>
+    <p:sldId id="261" r:id="rId6"/>
   </p:sldIdLst>
   <p:sldSz cx="6840538" cy="6840538"/>
   <p:notesSz cx="6858000" cy="9144000"/>
@@ -115,6 +119,440 @@
 </p:presentation>
 </file>
 
+<file path=ppt/notesMasters/notesMaster1.xml><?xml version="1.0" encoding="utf-8"?>
+<p:notesMaster xmlns:a="http://schemas.openxmlformats.org/drawingml/2006/main" xmlns:r="http://schemas.openxmlformats.org/officeDocument/2006/relationships" xmlns:p="http://schemas.openxmlformats.org/presentationml/2006/main">
+  <p:cSld>
+    <p:bg>
+      <p:bgRef idx="1001">
+        <a:schemeClr val="bg1"/>
+      </p:bgRef>
+    </p:bg>
+    <p:spTree>
+      <p:nvGrpSpPr>
+        <p:cNvPr id="1" name=""/>
+        <p:cNvGrpSpPr/>
+        <p:nvPr/>
+      </p:nvGrpSpPr>
+      <p:grpSpPr>
+        <a:xfrm>
+          <a:off x="0" y="0"/>
+          <a:ext cx="0" cy="0"/>
+          <a:chOff x="0" y="0"/>
+          <a:chExt cx="0" cy="0"/>
+        </a:xfrm>
+      </p:grpSpPr>
+      <p:sp>
+        <p:nvSpPr>
+          <p:cNvPr id="2" name="Header Placeholder 1"/>
+          <p:cNvSpPr>
+            <a:spLocks noGrp="1"/>
+          </p:cNvSpPr>
+          <p:nvPr>
+            <p:ph type="hdr" sz="quarter"/>
+          </p:nvPr>
+        </p:nvSpPr>
+        <p:spPr>
+          <a:xfrm>
+            <a:off x="0" y="0"/>
+            <a:ext cx="2971800" cy="458788"/>
+          </a:xfrm>
+          <a:prstGeom prst="rect">
+            <a:avLst/>
+          </a:prstGeom>
+        </p:spPr>
+        <p:txBody>
+          <a:bodyPr vert="horz" lIns="91440" tIns="45720" rIns="91440" bIns="45720" rtlCol="0"/>
+          <a:lstStyle>
+            <a:lvl1pPr algn="l">
+              <a:defRPr sz="1200"/>
+            </a:lvl1pPr>
+          </a:lstStyle>
+          <a:p>
+            <a:endParaRPr lang="en-IN"/>
+          </a:p>
+        </p:txBody>
+      </p:sp>
+      <p:sp>
+        <p:nvSpPr>
+          <p:cNvPr id="3" name="Date Placeholder 2"/>
+          <p:cNvSpPr>
+            <a:spLocks noGrp="1"/>
+          </p:cNvSpPr>
+          <p:nvPr>
+            <p:ph type="dt" idx="1"/>
+          </p:nvPr>
+        </p:nvSpPr>
+        <p:spPr>
+          <a:xfrm>
+            <a:off x="3884613" y="0"/>
+            <a:ext cx="2971800" cy="458788"/>
+          </a:xfrm>
+          <a:prstGeom prst="rect">
+            <a:avLst/>
+          </a:prstGeom>
+        </p:spPr>
+        <p:txBody>
+          <a:bodyPr vert="horz" lIns="91440" tIns="45720" rIns="91440" bIns="45720" rtlCol="0"/>
+          <a:lstStyle>
+            <a:lvl1pPr algn="r">
+              <a:defRPr sz="1200"/>
+            </a:lvl1pPr>
+          </a:lstStyle>
+          <a:p>
+            <a:fld id="{EA90F906-E5FA-4DE0-865C-43E12A441DAC}" type="datetimeFigureOut">
+              <a:rPr lang="en-IN" smtClean="0"/>
+              <a:t>02-08-2023</a:t>
+            </a:fld>
+            <a:endParaRPr lang="en-IN"/>
+          </a:p>
+        </p:txBody>
+      </p:sp>
+      <p:sp>
+        <p:nvSpPr>
+          <p:cNvPr id="4" name="Slide Image Placeholder 3"/>
+          <p:cNvSpPr>
+            <a:spLocks noGrp="1" noRot="1" noChangeAspect="1"/>
+          </p:cNvSpPr>
+          <p:nvPr>
+            <p:ph type="sldImg" idx="2"/>
+          </p:nvPr>
+        </p:nvSpPr>
+        <p:spPr>
+          <a:xfrm>
+            <a:off x="1885950" y="1143000"/>
+            <a:ext cx="3086100" cy="3086100"/>
+          </a:xfrm>
+          <a:prstGeom prst="rect">
+            <a:avLst/>
+          </a:prstGeom>
+          <a:noFill/>
+          <a:ln w="12700">
+            <a:solidFill>
+              <a:prstClr val="black"/>
+            </a:solidFill>
+          </a:ln>
+        </p:spPr>
+        <p:txBody>
+          <a:bodyPr vert="horz" lIns="91440" tIns="45720" rIns="91440" bIns="45720" rtlCol="0" anchor="ctr"/>
+          <a:lstStyle/>
+          <a:p>
+            <a:endParaRPr lang="en-IN"/>
+          </a:p>
+        </p:txBody>
+      </p:sp>
+      <p:sp>
+        <p:nvSpPr>
+          <p:cNvPr id="5" name="Notes Placeholder 4"/>
+          <p:cNvSpPr>
+            <a:spLocks noGrp="1"/>
+          </p:cNvSpPr>
+          <p:nvPr>
+            <p:ph type="body" sz="quarter" idx="3"/>
+          </p:nvPr>
+        </p:nvSpPr>
+        <p:spPr>
+          <a:xfrm>
+            <a:off x="685800" y="4400550"/>
+            <a:ext cx="5486400" cy="3600450"/>
+          </a:xfrm>
+          <a:prstGeom prst="rect">
+            <a:avLst/>
+          </a:prstGeom>
+        </p:spPr>
+        <p:txBody>
+          <a:bodyPr vert="horz" lIns="91440" tIns="45720" rIns="91440" bIns="45720" rtlCol="0"/>
+          <a:lstStyle/>
+          <a:p>
+            <a:pPr lvl="0"/>
+            <a:r>
+              <a:rPr lang="en-US"/>
+              <a:t>Click to edit Master text styles</a:t>
+            </a:r>
+          </a:p>
+          <a:p>
+            <a:pPr lvl="1"/>
+            <a:r>
+              <a:rPr lang="en-US"/>
+              <a:t>Second level</a:t>
+            </a:r>
+          </a:p>
+          <a:p>
+            <a:pPr lvl="2"/>
+            <a:r>
+              <a:rPr lang="en-US"/>
+              <a:t>Third level</a:t>
+            </a:r>
+          </a:p>
+          <a:p>
+            <a:pPr lvl="3"/>
+            <a:r>
+              <a:rPr lang="en-US"/>
+              <a:t>Fourth level</a:t>
+            </a:r>
+          </a:p>
+          <a:p>
+            <a:pPr lvl="4"/>
+            <a:r>
+              <a:rPr lang="en-US"/>
+              <a:t>Fifth level</a:t>
+            </a:r>
+            <a:endParaRPr lang="en-IN"/>
+          </a:p>
+        </p:txBody>
+      </p:sp>
+      <p:sp>
+        <p:nvSpPr>
+          <p:cNvPr id="6" name="Footer Placeholder 5"/>
+          <p:cNvSpPr>
+            <a:spLocks noGrp="1"/>
+          </p:cNvSpPr>
+          <p:nvPr>
+            <p:ph type="ftr" sz="quarter" idx="4"/>
+          </p:nvPr>
+        </p:nvSpPr>
+        <p:spPr>
+          <a:xfrm>
+            <a:off x="0" y="8685213"/>
+            <a:ext cx="2971800" cy="458787"/>
+          </a:xfrm>
+          <a:prstGeom prst="rect">
+            <a:avLst/>
+          </a:prstGeom>
+        </p:spPr>
+        <p:txBody>
+          <a:bodyPr vert="horz" lIns="91440" tIns="45720" rIns="91440" bIns="45720" rtlCol="0" anchor="b"/>
+          <a:lstStyle>
+            <a:lvl1pPr algn="l">
+              <a:defRPr sz="1200"/>
+            </a:lvl1pPr>
+          </a:lstStyle>
+          <a:p>
+            <a:endParaRPr lang="en-IN"/>
+          </a:p>
+        </p:txBody>
+      </p:sp>
+      <p:sp>
+        <p:nvSpPr>
+          <p:cNvPr id="7" name="Slide Number Placeholder 6"/>
+          <p:cNvSpPr>
+            <a:spLocks noGrp="1"/>
+          </p:cNvSpPr>
+          <p:nvPr>
+            <p:ph type="sldNum" sz="quarter" idx="5"/>
+          </p:nvPr>
+        </p:nvSpPr>
+        <p:spPr>
+          <a:xfrm>
+            <a:off x="3884613" y="8685213"/>
+            <a:ext cx="2971800" cy="458787"/>
+          </a:xfrm>
+          <a:prstGeom prst="rect">
+            <a:avLst/>
+          </a:prstGeom>
+        </p:spPr>
+        <p:txBody>
+          <a:bodyPr vert="horz" lIns="91440" tIns="45720" rIns="91440" bIns="45720" rtlCol="0" anchor="b"/>
+          <a:lstStyle>
+            <a:lvl1pPr algn="r">
+              <a:defRPr sz="1200"/>
+            </a:lvl1pPr>
+          </a:lstStyle>
+          <a:p>
+            <a:fld id="{BC999565-0DD4-4BE4-9B40-877C40CDA263}" type="slidenum">
+              <a:rPr lang="en-IN" smtClean="0"/>
+              <a:t>‹#›</a:t>
+            </a:fld>
+            <a:endParaRPr lang="en-IN"/>
+          </a:p>
+        </p:txBody>
+      </p:sp>
+    </p:spTree>
+    <p:extLst>
+      <p:ext uri="{BB962C8B-B14F-4D97-AF65-F5344CB8AC3E}">
+        <p14:creationId xmlns:p14="http://schemas.microsoft.com/office/powerpoint/2010/main" val="58372319"/>
+      </p:ext>
+    </p:extLst>
+  </p:cSld>
+  <p:clrMap bg1="lt1" tx1="dk1" bg2="lt2" tx2="dk2" accent1="accent1" accent2="accent2" accent3="accent3" accent4="accent4" accent5="accent5" accent6="accent6" hlink="hlink" folHlink="folHlink"/>
+  <p:notesStyle>
+    <a:lvl1pPr marL="0" algn="l" defTabSz="914400" rtl="0" eaLnBrk="1" latinLnBrk="0" hangingPunct="1">
+      <a:defRPr sz="1200" kern="1200">
+        <a:solidFill>
+          <a:schemeClr val="tx1"/>
+        </a:solidFill>
+        <a:latin typeface="+mn-lt"/>
+        <a:ea typeface="+mn-ea"/>
+        <a:cs typeface="+mn-cs"/>
+      </a:defRPr>
+    </a:lvl1pPr>
+    <a:lvl2pPr marL="457200" algn="l" defTabSz="914400" rtl="0" eaLnBrk="1" latinLnBrk="0" hangingPunct="1">
+      <a:defRPr sz="1200" kern="1200">
+        <a:solidFill>
+          <a:schemeClr val="tx1"/>
+        </a:solidFill>
+        <a:latin typeface="+mn-lt"/>
+        <a:ea typeface="+mn-ea"/>
+        <a:cs typeface="+mn-cs"/>
+      </a:defRPr>
+    </a:lvl2pPr>
+    <a:lvl3pPr marL="914400" algn="l" defTabSz="914400" rtl="0" eaLnBrk="1" latinLnBrk="0" hangingPunct="1">
+      <a:defRPr sz="1200" kern="1200">
+        <a:solidFill>
+          <a:schemeClr val="tx1"/>
+        </a:solidFill>
+        <a:latin typeface="+mn-lt"/>
+        <a:ea typeface="+mn-ea"/>
+        <a:cs typeface="+mn-cs"/>
+      </a:defRPr>
+    </a:lvl3pPr>
+    <a:lvl4pPr marL="1371600" algn="l" defTabSz="914400" rtl="0" eaLnBrk="1" latinLnBrk="0" hangingPunct="1">
+      <a:defRPr sz="1200" kern="1200">
+        <a:solidFill>
+          <a:schemeClr val="tx1"/>
+        </a:solidFill>
+        <a:latin typeface="+mn-lt"/>
+        <a:ea typeface="+mn-ea"/>
+        <a:cs typeface="+mn-cs"/>
+      </a:defRPr>
+    </a:lvl4pPr>
+    <a:lvl5pPr marL="1828800" algn="l" defTabSz="914400" rtl="0" eaLnBrk="1" latinLnBrk="0" hangingPunct="1">
+      <a:defRPr sz="1200" kern="1200">
+        <a:solidFill>
+          <a:schemeClr val="tx1"/>
+        </a:solidFill>
+        <a:latin typeface="+mn-lt"/>
+        <a:ea typeface="+mn-ea"/>
+        <a:cs typeface="+mn-cs"/>
+      </a:defRPr>
+    </a:lvl5pPr>
+    <a:lvl6pPr marL="2286000" algn="l" defTabSz="914400" rtl="0" eaLnBrk="1" latinLnBrk="0" hangingPunct="1">
+      <a:defRPr sz="1200" kern="1200">
+        <a:solidFill>
+          <a:schemeClr val="tx1"/>
+        </a:solidFill>
+        <a:latin typeface="+mn-lt"/>
+        <a:ea typeface="+mn-ea"/>
+        <a:cs typeface="+mn-cs"/>
+      </a:defRPr>
+    </a:lvl6pPr>
+    <a:lvl7pPr marL="2743200" algn="l" defTabSz="914400" rtl="0" eaLnBrk="1" latinLnBrk="0" hangingPunct="1">
+      <a:defRPr sz="1200" kern="1200">
+        <a:solidFill>
+          <a:schemeClr val="tx1"/>
+        </a:solidFill>
+        <a:latin typeface="+mn-lt"/>
+        <a:ea typeface="+mn-ea"/>
+        <a:cs typeface="+mn-cs"/>
+      </a:defRPr>
+    </a:lvl7pPr>
+    <a:lvl8pPr marL="3200400" algn="l" defTabSz="914400" rtl="0" eaLnBrk="1" latinLnBrk="0" hangingPunct="1">
+      <a:defRPr sz="1200" kern="1200">
+        <a:solidFill>
+          <a:schemeClr val="tx1"/>
+        </a:solidFill>
+        <a:latin typeface="+mn-lt"/>
+        <a:ea typeface="+mn-ea"/>
+        <a:cs typeface="+mn-cs"/>
+      </a:defRPr>
+    </a:lvl8pPr>
+    <a:lvl9pPr marL="3657600" algn="l" defTabSz="914400" rtl="0" eaLnBrk="1" latinLnBrk="0" hangingPunct="1">
+      <a:defRPr sz="1200" kern="1200">
+        <a:solidFill>
+          <a:schemeClr val="tx1"/>
+        </a:solidFill>
+        <a:latin typeface="+mn-lt"/>
+        <a:ea typeface="+mn-ea"/>
+        <a:cs typeface="+mn-cs"/>
+      </a:defRPr>
+    </a:lvl9pPr>
+  </p:notesStyle>
+</p:notesMaster>
+</file>
+
+<file path=ppt/notesSlides/notesSlide1.xml><?xml version="1.0" encoding="utf-8"?>
+<p:notes xmlns:a="http://schemas.openxmlformats.org/drawingml/2006/main" xmlns:r="http://schemas.openxmlformats.org/officeDocument/2006/relationships" xmlns:p="http://schemas.openxmlformats.org/presentationml/2006/main">
+  <p:cSld>
+    <p:spTree>
+      <p:nvGrpSpPr>
+        <p:cNvPr id="1" name=""/>
+        <p:cNvGrpSpPr/>
+        <p:nvPr/>
+      </p:nvGrpSpPr>
+      <p:grpSpPr>
+        <a:xfrm>
+          <a:off x="0" y="0"/>
+          <a:ext cx="0" cy="0"/>
+          <a:chOff x="0" y="0"/>
+          <a:chExt cx="0" cy="0"/>
+        </a:xfrm>
+      </p:grpSpPr>
+      <p:sp>
+        <p:nvSpPr>
+          <p:cNvPr id="2" name="Slide Image Placeholder 1"/>
+          <p:cNvSpPr>
+            <a:spLocks noGrp="1" noRot="1" noChangeAspect="1"/>
+          </p:cNvSpPr>
+          <p:nvPr>
+            <p:ph type="sldImg"/>
+          </p:nvPr>
+        </p:nvSpPr>
+        <p:spPr/>
+      </p:sp>
+      <p:sp>
+        <p:nvSpPr>
+          <p:cNvPr id="3" name="Notes Placeholder 2"/>
+          <p:cNvSpPr>
+            <a:spLocks noGrp="1"/>
+          </p:cNvSpPr>
+          <p:nvPr>
+            <p:ph type="body" idx="1"/>
+          </p:nvPr>
+        </p:nvSpPr>
+        <p:spPr/>
+        <p:txBody>
+          <a:bodyPr/>
+          <a:lstStyle/>
+          <a:p>
+            <a:endParaRPr lang="en-IN" dirty="0"/>
+          </a:p>
+        </p:txBody>
+      </p:sp>
+      <p:sp>
+        <p:nvSpPr>
+          <p:cNvPr id="4" name="Slide Number Placeholder 3"/>
+          <p:cNvSpPr>
+            <a:spLocks noGrp="1"/>
+          </p:cNvSpPr>
+          <p:nvPr>
+            <p:ph type="sldNum" sz="quarter" idx="5"/>
+          </p:nvPr>
+        </p:nvSpPr>
+        <p:spPr/>
+        <p:txBody>
+          <a:bodyPr/>
+          <a:lstStyle/>
+          <a:p>
+            <a:fld id="{BC999565-0DD4-4BE4-9B40-877C40CDA263}" type="slidenum">
+              <a:rPr lang="en-IN" smtClean="0"/>
+              <a:t>5</a:t>
+            </a:fld>
+            <a:endParaRPr lang="en-IN"/>
+          </a:p>
+        </p:txBody>
+      </p:sp>
+    </p:spTree>
+    <p:extLst>
+      <p:ext uri="{BB962C8B-B14F-4D97-AF65-F5344CB8AC3E}">
+        <p14:creationId xmlns:p14="http://schemas.microsoft.com/office/powerpoint/2010/main" val="2725242557"/>
+      </p:ext>
+    </p:extLst>
+  </p:cSld>
+  <p:clrMapOvr>
+    <a:masterClrMapping/>
+  </p:clrMapOvr>
+</p:notes>
+</file>
+
 <file path=ppt/slideLayouts/slideLayout1.xml><?xml version="1.0" encoding="utf-8"?>
 <p:sldLayout xmlns:a="http://schemas.openxmlformats.org/drawingml/2006/main" xmlns:r="http://schemas.openxmlformats.org/officeDocument/2006/relationships" xmlns:p="http://schemas.openxmlformats.org/presentationml/2006/main" type="title" preserve="1">
   <p:cSld name="Title Slide">
@@ -246,7 +684,7 @@
           <a:p>
             <a:fld id="{97D4CEB5-D715-49F4-8146-54BD8651C3AA}" type="datetimeFigureOut">
               <a:rPr lang="en-AU" smtClean="0"/>
-              <a:t>28/07/2023</a:t>
+              <a:t>2/08/2023</a:t>
             </a:fld>
             <a:endParaRPr lang="en-AU"/>
           </a:p>
@@ -416,7 +854,7 @@
           <a:p>
             <a:fld id="{97D4CEB5-D715-49F4-8146-54BD8651C3AA}" type="datetimeFigureOut">
               <a:rPr lang="en-AU" smtClean="0"/>
-              <a:t>28/07/2023</a:t>
+              <a:t>2/08/2023</a:t>
             </a:fld>
             <a:endParaRPr lang="en-AU"/>
           </a:p>
@@ -596,7 +1034,7 @@
           <a:p>
             <a:fld id="{97D4CEB5-D715-49F4-8146-54BD8651C3AA}" type="datetimeFigureOut">
               <a:rPr lang="en-AU" smtClean="0"/>
-              <a:t>28/07/2023</a:t>
+              <a:t>2/08/2023</a:t>
             </a:fld>
             <a:endParaRPr lang="en-AU"/>
           </a:p>
@@ -766,7 +1204,7 @@
           <a:p>
             <a:fld id="{97D4CEB5-D715-49F4-8146-54BD8651C3AA}" type="datetimeFigureOut">
               <a:rPr lang="en-AU" smtClean="0"/>
-              <a:t>28/07/2023</a:t>
+              <a:t>2/08/2023</a:t>
             </a:fld>
             <a:endParaRPr lang="en-AU"/>
           </a:p>
@@ -1010,7 +1448,7 @@
           <a:p>
             <a:fld id="{97D4CEB5-D715-49F4-8146-54BD8651C3AA}" type="datetimeFigureOut">
               <a:rPr lang="en-AU" smtClean="0"/>
-              <a:t>28/07/2023</a:t>
+              <a:t>2/08/2023</a:t>
             </a:fld>
             <a:endParaRPr lang="en-AU"/>
           </a:p>
@@ -1242,7 +1680,7 @@
           <a:p>
             <a:fld id="{97D4CEB5-D715-49F4-8146-54BD8651C3AA}" type="datetimeFigureOut">
               <a:rPr lang="en-AU" smtClean="0"/>
-              <a:t>28/07/2023</a:t>
+              <a:t>2/08/2023</a:t>
             </a:fld>
             <a:endParaRPr lang="en-AU"/>
           </a:p>
@@ -1609,7 +2047,7 @@
           <a:p>
             <a:fld id="{97D4CEB5-D715-49F4-8146-54BD8651C3AA}" type="datetimeFigureOut">
               <a:rPr lang="en-AU" smtClean="0"/>
-              <a:t>28/07/2023</a:t>
+              <a:t>2/08/2023</a:t>
             </a:fld>
             <a:endParaRPr lang="en-AU"/>
           </a:p>
@@ -1727,7 +2165,7 @@
           <a:p>
             <a:fld id="{97D4CEB5-D715-49F4-8146-54BD8651C3AA}" type="datetimeFigureOut">
               <a:rPr lang="en-AU" smtClean="0"/>
-              <a:t>28/07/2023</a:t>
+              <a:t>2/08/2023</a:t>
             </a:fld>
             <a:endParaRPr lang="en-AU"/>
           </a:p>
@@ -1822,7 +2260,7 @@
           <a:p>
             <a:fld id="{97D4CEB5-D715-49F4-8146-54BD8651C3AA}" type="datetimeFigureOut">
               <a:rPr lang="en-AU" smtClean="0"/>
-              <a:t>28/07/2023</a:t>
+              <a:t>2/08/2023</a:t>
             </a:fld>
             <a:endParaRPr lang="en-AU"/>
           </a:p>
@@ -2099,7 +2537,7 @@
           <a:p>
             <a:fld id="{97D4CEB5-D715-49F4-8146-54BD8651C3AA}" type="datetimeFigureOut">
               <a:rPr lang="en-AU" smtClean="0"/>
-              <a:t>28/07/2023</a:t>
+              <a:t>2/08/2023</a:t>
             </a:fld>
             <a:endParaRPr lang="en-AU"/>
           </a:p>
@@ -2356,7 +2794,7 @@
           <a:p>
             <a:fld id="{97D4CEB5-D715-49F4-8146-54BD8651C3AA}" type="datetimeFigureOut">
               <a:rPr lang="en-AU" smtClean="0"/>
-              <a:t>28/07/2023</a:t>
+              <a:t>2/08/2023</a:t>
             </a:fld>
             <a:endParaRPr lang="en-AU"/>
           </a:p>
@@ -2569,7 +3007,7 @@
           <a:p>
             <a:fld id="{97D4CEB5-D715-49F4-8146-54BD8651C3AA}" type="datetimeFigureOut">
               <a:rPr lang="en-AU" smtClean="0"/>
-              <a:t>28/07/2023</a:t>
+              <a:t>2/08/2023</a:t>
             </a:fld>
             <a:endParaRPr lang="en-AU"/>
           </a:p>
@@ -13151,6 +13589,2678 @@
 </p:sld>
 </file>
 
+<file path=ppt/slides/slide5.xml><?xml version="1.0" encoding="utf-8"?>
+<p:sld xmlns:a="http://schemas.openxmlformats.org/drawingml/2006/main" xmlns:r="http://schemas.openxmlformats.org/officeDocument/2006/relationships" xmlns:p="http://schemas.openxmlformats.org/presentationml/2006/main">
+  <p:cSld>
+    <p:spTree>
+      <p:nvGrpSpPr>
+        <p:cNvPr id="1" name=""/>
+        <p:cNvGrpSpPr/>
+        <p:nvPr/>
+      </p:nvGrpSpPr>
+      <p:grpSpPr>
+        <a:xfrm>
+          <a:off x="0" y="0"/>
+          <a:ext cx="0" cy="0"/>
+          <a:chOff x="0" y="0"/>
+          <a:chExt cx="0" cy="0"/>
+        </a:xfrm>
+      </p:grpSpPr>
+      <p:sp>
+        <p:nvSpPr>
+          <p:cNvPr id="2" name="Title 1">
+            <a:extLst>
+              <a:ext uri="{FF2B5EF4-FFF2-40B4-BE49-F238E27FC236}">
+                <a16:creationId xmlns:a16="http://schemas.microsoft.com/office/drawing/2014/main" id="{26BE1386-1BCA-7B0F-B9FC-5AFBF04FB3E7}"/>
+              </a:ext>
+            </a:extLst>
+          </p:cNvPr>
+          <p:cNvSpPr>
+            <a:spLocks noGrp="1"/>
+          </p:cNvSpPr>
+          <p:nvPr>
+            <p:ph type="title"/>
+          </p:nvPr>
+        </p:nvSpPr>
+        <p:spPr/>
+        <p:txBody>
+          <a:bodyPr/>
+          <a:lstStyle/>
+          <a:p>
+            <a:endParaRPr lang="en-IN"/>
+          </a:p>
+        </p:txBody>
+      </p:sp>
+      <p:graphicFrame>
+        <p:nvGraphicFramePr>
+          <p:cNvPr id="14" name="Content Placeholder 13">
+            <a:extLst>
+              <a:ext uri="{FF2B5EF4-FFF2-40B4-BE49-F238E27FC236}">
+                <a16:creationId xmlns:a16="http://schemas.microsoft.com/office/drawing/2014/main" id="{462AD04C-E9A6-5682-A618-202DC5411229}"/>
+              </a:ext>
+            </a:extLst>
+          </p:cNvPr>
+          <p:cNvGraphicFramePr>
+            <a:graphicFrameLocks noGrp="1"/>
+          </p:cNvGraphicFramePr>
+          <p:nvPr>
+            <p:ph idx="1"/>
+          </p:nvPr>
+        </p:nvGraphicFramePr>
+        <p:xfrm>
+          <a:off x="1286986" y="3135184"/>
+          <a:ext cx="4266565" cy="1722438"/>
+        </p:xfrm>
+        <a:graphic>
+          <a:graphicData uri="http://schemas.openxmlformats.org/drawingml/2006/table">
+            <a:tbl>
+              <a:tblPr firstRow="1" firstCol="1" bandRow="1">
+                <a:tableStyleId>{5C22544A-7EE6-4342-B048-85BDC9FD1C3A}</a:tableStyleId>
+              </a:tblPr>
+              <a:tblGrid>
+                <a:gridCol w="455930">
+                  <a:extLst>
+                    <a:ext uri="{9D8B030D-6E8A-4147-A177-3AD203B41FA5}">
+                      <a16:colId xmlns:a16="http://schemas.microsoft.com/office/drawing/2014/main" val="3566507320"/>
+                    </a:ext>
+                  </a:extLst>
+                </a:gridCol>
+                <a:gridCol w="981075">
+                  <a:extLst>
+                    <a:ext uri="{9D8B030D-6E8A-4147-A177-3AD203B41FA5}">
+                      <a16:colId xmlns:a16="http://schemas.microsoft.com/office/drawing/2014/main" val="3757330138"/>
+                    </a:ext>
+                  </a:extLst>
+                </a:gridCol>
+                <a:gridCol w="1350645">
+                  <a:extLst>
+                    <a:ext uri="{9D8B030D-6E8A-4147-A177-3AD203B41FA5}">
+                      <a16:colId xmlns:a16="http://schemas.microsoft.com/office/drawing/2014/main" val="3835889449"/>
+                    </a:ext>
+                  </a:extLst>
+                </a:gridCol>
+                <a:gridCol w="899795">
+                  <a:extLst>
+                    <a:ext uri="{9D8B030D-6E8A-4147-A177-3AD203B41FA5}">
+                      <a16:colId xmlns:a16="http://schemas.microsoft.com/office/drawing/2014/main" val="3953704053"/>
+                    </a:ext>
+                  </a:extLst>
+                </a:gridCol>
+                <a:gridCol w="579120">
+                  <a:extLst>
+                    <a:ext uri="{9D8B030D-6E8A-4147-A177-3AD203B41FA5}">
+                      <a16:colId xmlns:a16="http://schemas.microsoft.com/office/drawing/2014/main" val="1189350803"/>
+                    </a:ext>
+                  </a:extLst>
+                </a:gridCol>
+              </a:tblGrid>
+              <a:tr h="0">
+                <a:tc>
+                  <a:txBody>
+                    <a:bodyPr/>
+                    <a:lstStyle/>
+                    <a:p>
+                      <a:pPr algn="ctr">
+                        <a:lnSpc>
+                          <a:spcPct val="107000"/>
+                        </a:lnSpc>
+                        <a:spcAft>
+                          <a:spcPts val="800"/>
+                        </a:spcAft>
+                      </a:pPr>
+                      <a:r>
+                        <a:rPr lang="en-IN" sz="1100" kern="100">
+                          <a:effectLst/>
+                        </a:rPr>
+                        <a:t> </a:t>
+                      </a:r>
+                      <a:endParaRPr lang="en-IN" sz="1100" kern="100">
+                        <a:effectLst/>
+                        <a:latin typeface="Calibri" panose="020F0502020204030204" pitchFamily="34" charset="0"/>
+                        <a:ea typeface="Calibri" panose="020F0502020204030204" pitchFamily="34" charset="0"/>
+                        <a:cs typeface="Times New Roman" panose="02020603050405020304" pitchFamily="18" charset="0"/>
+                      </a:endParaRPr>
+                    </a:p>
+                  </a:txBody>
+                  <a:tcPr marL="68580" marR="68580" marT="0" marB="0"/>
+                </a:tc>
+                <a:tc>
+                  <a:txBody>
+                    <a:bodyPr/>
+                    <a:lstStyle/>
+                    <a:p>
+                      <a:pPr algn="ctr">
+                        <a:lnSpc>
+                          <a:spcPct val="107000"/>
+                        </a:lnSpc>
+                        <a:spcAft>
+                          <a:spcPts val="800"/>
+                        </a:spcAft>
+                      </a:pPr>
+                      <a:r>
+                        <a:rPr lang="en-IN" sz="1100" kern="100">
+                          <a:effectLst/>
+                        </a:rPr>
+                        <a:t> </a:t>
+                      </a:r>
+                      <a:endParaRPr lang="en-IN" sz="1100" kern="100">
+                        <a:effectLst/>
+                        <a:latin typeface="Calibri" panose="020F0502020204030204" pitchFamily="34" charset="0"/>
+                        <a:ea typeface="Calibri" panose="020F0502020204030204" pitchFamily="34" charset="0"/>
+                        <a:cs typeface="Times New Roman" panose="02020603050405020304" pitchFamily="18" charset="0"/>
+                      </a:endParaRPr>
+                    </a:p>
+                  </a:txBody>
+                  <a:tcPr marL="68580" marR="68580" marT="0" marB="0"/>
+                </a:tc>
+                <a:tc gridSpan="2">
+                  <a:txBody>
+                    <a:bodyPr/>
+                    <a:lstStyle/>
+                    <a:p>
+                      <a:pPr algn="ctr">
+                        <a:lnSpc>
+                          <a:spcPct val="107000"/>
+                        </a:lnSpc>
+                        <a:spcAft>
+                          <a:spcPts val="800"/>
+                        </a:spcAft>
+                      </a:pPr>
+                      <a:r>
+                        <a:rPr lang="en-IN" sz="1100" kern="100">
+                          <a:effectLst/>
+                        </a:rPr>
+                        <a:t>Arts Department</a:t>
+                      </a:r>
+                      <a:endParaRPr lang="en-IN" sz="1100" kern="100">
+                        <a:effectLst/>
+                        <a:latin typeface="Calibri" panose="020F0502020204030204" pitchFamily="34" charset="0"/>
+                        <a:ea typeface="Calibri" panose="020F0502020204030204" pitchFamily="34" charset="0"/>
+                        <a:cs typeface="Times New Roman" panose="02020603050405020304" pitchFamily="18" charset="0"/>
+                      </a:endParaRPr>
+                    </a:p>
+                  </a:txBody>
+                  <a:tcPr marL="68580" marR="68580" marT="0" marB="0"/>
+                </a:tc>
+                <a:tc hMerge="1">
+                  <a:txBody>
+                    <a:bodyPr/>
+                    <a:lstStyle/>
+                    <a:p>
+                      <a:endParaRPr lang="en-IN"/>
+                    </a:p>
+                  </a:txBody>
+                  <a:tcPr/>
+                </a:tc>
+                <a:tc>
+                  <a:txBody>
+                    <a:bodyPr/>
+                    <a:lstStyle/>
+                    <a:p>
+                      <a:pPr algn="ctr">
+                        <a:lnSpc>
+                          <a:spcPct val="107000"/>
+                        </a:lnSpc>
+                        <a:spcAft>
+                          <a:spcPts val="800"/>
+                        </a:spcAft>
+                      </a:pPr>
+                      <a:r>
+                        <a:rPr lang="en-IN" sz="1100" kern="100">
+                          <a:effectLst/>
+                        </a:rPr>
+                        <a:t> </a:t>
+                      </a:r>
+                      <a:endParaRPr lang="en-IN" sz="1100" kern="100">
+                        <a:effectLst/>
+                        <a:latin typeface="Calibri" panose="020F0502020204030204" pitchFamily="34" charset="0"/>
+                        <a:ea typeface="Calibri" panose="020F0502020204030204" pitchFamily="34" charset="0"/>
+                        <a:cs typeface="Times New Roman" panose="02020603050405020304" pitchFamily="18" charset="0"/>
+                      </a:endParaRPr>
+                    </a:p>
+                  </a:txBody>
+                  <a:tcPr marL="68580" marR="68580" marT="0" marB="0"/>
+                </a:tc>
+                <a:extLst>
+                  <a:ext uri="{0D108BD9-81ED-4DB2-BD59-A6C34878D82A}">
+                    <a16:rowId xmlns:a16="http://schemas.microsoft.com/office/drawing/2014/main" val="473810462"/>
+                  </a:ext>
+                </a:extLst>
+              </a:tr>
+              <a:tr h="0">
+                <a:tc>
+                  <a:txBody>
+                    <a:bodyPr/>
+                    <a:lstStyle/>
+                    <a:p>
+                      <a:pPr algn="ctr">
+                        <a:lnSpc>
+                          <a:spcPct val="107000"/>
+                        </a:lnSpc>
+                        <a:spcAft>
+                          <a:spcPts val="800"/>
+                        </a:spcAft>
+                      </a:pPr>
+                      <a:r>
+                        <a:rPr lang="en-IN" sz="1100" kern="100">
+                          <a:effectLst/>
+                        </a:rPr>
+                        <a:t>SlNo</a:t>
+                      </a:r>
+                      <a:endParaRPr lang="en-IN" sz="1100" kern="100">
+                        <a:effectLst/>
+                        <a:latin typeface="Calibri" panose="020F0502020204030204" pitchFamily="34" charset="0"/>
+                        <a:ea typeface="Calibri" panose="020F0502020204030204" pitchFamily="34" charset="0"/>
+                        <a:cs typeface="Times New Roman" panose="02020603050405020304" pitchFamily="18" charset="0"/>
+                      </a:endParaRPr>
+                    </a:p>
+                  </a:txBody>
+                  <a:tcPr marL="68580" marR="68580" marT="0" marB="0"/>
+                </a:tc>
+                <a:tc>
+                  <a:txBody>
+                    <a:bodyPr/>
+                    <a:lstStyle/>
+                    <a:p>
+                      <a:pPr algn="ctr">
+                        <a:lnSpc>
+                          <a:spcPct val="107000"/>
+                        </a:lnSpc>
+                        <a:spcAft>
+                          <a:spcPts val="800"/>
+                        </a:spcAft>
+                      </a:pPr>
+                      <a:r>
+                        <a:rPr lang="en-IN" sz="1100" kern="100">
+                          <a:effectLst/>
+                        </a:rPr>
+                        <a:t>Subject</a:t>
+                      </a:r>
+                      <a:endParaRPr lang="en-IN" sz="1100" kern="100">
+                        <a:effectLst/>
+                        <a:latin typeface="Calibri" panose="020F0502020204030204" pitchFamily="34" charset="0"/>
+                        <a:ea typeface="Calibri" panose="020F0502020204030204" pitchFamily="34" charset="0"/>
+                        <a:cs typeface="Times New Roman" panose="02020603050405020304" pitchFamily="18" charset="0"/>
+                      </a:endParaRPr>
+                    </a:p>
+                  </a:txBody>
+                  <a:tcPr marL="68580" marR="68580" marT="0" marB="0"/>
+                </a:tc>
+                <a:tc>
+                  <a:txBody>
+                    <a:bodyPr/>
+                    <a:lstStyle/>
+                    <a:p>
+                      <a:pPr algn="ctr">
+                        <a:lnSpc>
+                          <a:spcPct val="107000"/>
+                        </a:lnSpc>
+                        <a:spcAft>
+                          <a:spcPts val="800"/>
+                        </a:spcAft>
+                      </a:pPr>
+                      <a:r>
+                        <a:rPr lang="en-IN" sz="1100" kern="100">
+                          <a:effectLst/>
+                        </a:rPr>
+                        <a:t>Board</a:t>
+                      </a:r>
+                      <a:endParaRPr lang="en-IN" sz="1100" kern="100">
+                        <a:effectLst/>
+                        <a:latin typeface="Calibri" panose="020F0502020204030204" pitchFamily="34" charset="0"/>
+                        <a:ea typeface="Calibri" panose="020F0502020204030204" pitchFamily="34" charset="0"/>
+                        <a:cs typeface="Times New Roman" panose="02020603050405020304" pitchFamily="18" charset="0"/>
+                      </a:endParaRPr>
+                    </a:p>
+                  </a:txBody>
+                  <a:tcPr marL="68580" marR="68580" marT="0" marB="0"/>
+                </a:tc>
+                <a:tc>
+                  <a:txBody>
+                    <a:bodyPr/>
+                    <a:lstStyle/>
+                    <a:p>
+                      <a:pPr algn="ctr">
+                        <a:lnSpc>
+                          <a:spcPct val="107000"/>
+                        </a:lnSpc>
+                        <a:spcAft>
+                          <a:spcPts val="800"/>
+                        </a:spcAft>
+                      </a:pPr>
+                      <a:r>
+                        <a:rPr lang="en-IN" sz="1100" kern="100">
+                          <a:effectLst/>
+                        </a:rPr>
+                        <a:t>Class</a:t>
+                      </a:r>
+                      <a:endParaRPr lang="en-IN" sz="1100" kern="100">
+                        <a:effectLst/>
+                        <a:latin typeface="Calibri" panose="020F0502020204030204" pitchFamily="34" charset="0"/>
+                        <a:ea typeface="Calibri" panose="020F0502020204030204" pitchFamily="34" charset="0"/>
+                        <a:cs typeface="Times New Roman" panose="02020603050405020304" pitchFamily="18" charset="0"/>
+                      </a:endParaRPr>
+                    </a:p>
+                  </a:txBody>
+                  <a:tcPr marL="68580" marR="68580" marT="0" marB="0"/>
+                </a:tc>
+                <a:tc>
+                  <a:txBody>
+                    <a:bodyPr/>
+                    <a:lstStyle/>
+                    <a:p>
+                      <a:pPr algn="ctr">
+                        <a:lnSpc>
+                          <a:spcPct val="107000"/>
+                        </a:lnSpc>
+                        <a:spcAft>
+                          <a:spcPts val="800"/>
+                        </a:spcAft>
+                      </a:pPr>
+                      <a:r>
+                        <a:rPr lang="en-IN" sz="1100" kern="100">
+                          <a:effectLst/>
+                        </a:rPr>
+                        <a:t>Vacancy</a:t>
+                      </a:r>
+                      <a:endParaRPr lang="en-IN" sz="1100" kern="100">
+                        <a:effectLst/>
+                        <a:latin typeface="Calibri" panose="020F0502020204030204" pitchFamily="34" charset="0"/>
+                        <a:ea typeface="Calibri" panose="020F0502020204030204" pitchFamily="34" charset="0"/>
+                        <a:cs typeface="Times New Roman" panose="02020603050405020304" pitchFamily="18" charset="0"/>
+                      </a:endParaRPr>
+                    </a:p>
+                  </a:txBody>
+                  <a:tcPr marL="68580" marR="68580" marT="0" marB="0"/>
+                </a:tc>
+                <a:extLst>
+                  <a:ext uri="{0D108BD9-81ED-4DB2-BD59-A6C34878D82A}">
+                    <a16:rowId xmlns:a16="http://schemas.microsoft.com/office/drawing/2014/main" val="3194717664"/>
+                  </a:ext>
+                </a:extLst>
+              </a:tr>
+              <a:tr h="0">
+                <a:tc>
+                  <a:txBody>
+                    <a:bodyPr/>
+                    <a:lstStyle/>
+                    <a:p>
+                      <a:pPr algn="ctr">
+                        <a:lnSpc>
+                          <a:spcPct val="107000"/>
+                        </a:lnSpc>
+                        <a:spcAft>
+                          <a:spcPts val="800"/>
+                        </a:spcAft>
+                      </a:pPr>
+                      <a:r>
+                        <a:rPr lang="en-IN" sz="1100" kern="100">
+                          <a:effectLst/>
+                        </a:rPr>
+                        <a:t> </a:t>
+                      </a:r>
+                      <a:endParaRPr lang="en-IN" sz="1100" kern="100">
+                        <a:effectLst/>
+                        <a:latin typeface="Calibri" panose="020F0502020204030204" pitchFamily="34" charset="0"/>
+                        <a:ea typeface="Calibri" panose="020F0502020204030204" pitchFamily="34" charset="0"/>
+                        <a:cs typeface="Times New Roman" panose="02020603050405020304" pitchFamily="18" charset="0"/>
+                      </a:endParaRPr>
+                    </a:p>
+                  </a:txBody>
+                  <a:tcPr marL="68580" marR="68580" marT="0" marB="0"/>
+                </a:tc>
+                <a:tc>
+                  <a:txBody>
+                    <a:bodyPr/>
+                    <a:lstStyle/>
+                    <a:p>
+                      <a:pPr algn="ctr">
+                        <a:lnSpc>
+                          <a:spcPct val="107000"/>
+                        </a:lnSpc>
+                        <a:spcAft>
+                          <a:spcPts val="800"/>
+                        </a:spcAft>
+                      </a:pPr>
+                      <a:r>
+                        <a:rPr lang="en-IN" sz="1100" kern="100">
+                          <a:effectLst/>
+                        </a:rPr>
+                        <a:t> </a:t>
+                      </a:r>
+                      <a:endParaRPr lang="en-IN" sz="1100" kern="100">
+                        <a:effectLst/>
+                        <a:latin typeface="Calibri" panose="020F0502020204030204" pitchFamily="34" charset="0"/>
+                        <a:ea typeface="Calibri" panose="020F0502020204030204" pitchFamily="34" charset="0"/>
+                        <a:cs typeface="Times New Roman" panose="02020603050405020304" pitchFamily="18" charset="0"/>
+                      </a:endParaRPr>
+                    </a:p>
+                  </a:txBody>
+                  <a:tcPr marL="68580" marR="68580" marT="0" marB="0"/>
+                </a:tc>
+                <a:tc>
+                  <a:txBody>
+                    <a:bodyPr/>
+                    <a:lstStyle/>
+                    <a:p>
+                      <a:pPr algn="ctr">
+                        <a:lnSpc>
+                          <a:spcPct val="107000"/>
+                        </a:lnSpc>
+                        <a:spcAft>
+                          <a:spcPts val="800"/>
+                        </a:spcAft>
+                      </a:pPr>
+                      <a:r>
+                        <a:rPr lang="en-IN" sz="1100" kern="100">
+                          <a:effectLst/>
+                        </a:rPr>
+                        <a:t> </a:t>
+                      </a:r>
+                      <a:endParaRPr lang="en-IN" sz="1100" kern="100">
+                        <a:effectLst/>
+                        <a:latin typeface="Calibri" panose="020F0502020204030204" pitchFamily="34" charset="0"/>
+                        <a:ea typeface="Calibri" panose="020F0502020204030204" pitchFamily="34" charset="0"/>
+                        <a:cs typeface="Times New Roman" panose="02020603050405020304" pitchFamily="18" charset="0"/>
+                      </a:endParaRPr>
+                    </a:p>
+                  </a:txBody>
+                  <a:tcPr marL="68580" marR="68580" marT="0" marB="0"/>
+                </a:tc>
+                <a:tc>
+                  <a:txBody>
+                    <a:bodyPr/>
+                    <a:lstStyle/>
+                    <a:p>
+                      <a:pPr algn="ctr">
+                        <a:lnSpc>
+                          <a:spcPct val="107000"/>
+                        </a:lnSpc>
+                        <a:spcAft>
+                          <a:spcPts val="800"/>
+                        </a:spcAft>
+                      </a:pPr>
+                      <a:r>
+                        <a:rPr lang="en-IN" sz="1100" kern="100">
+                          <a:effectLst/>
+                        </a:rPr>
+                        <a:t> </a:t>
+                      </a:r>
+                      <a:endParaRPr lang="en-IN" sz="1100" kern="100">
+                        <a:effectLst/>
+                        <a:latin typeface="Calibri" panose="020F0502020204030204" pitchFamily="34" charset="0"/>
+                        <a:ea typeface="Calibri" panose="020F0502020204030204" pitchFamily="34" charset="0"/>
+                        <a:cs typeface="Times New Roman" panose="02020603050405020304" pitchFamily="18" charset="0"/>
+                      </a:endParaRPr>
+                    </a:p>
+                  </a:txBody>
+                  <a:tcPr marL="68580" marR="68580" marT="0" marB="0"/>
+                </a:tc>
+                <a:tc>
+                  <a:txBody>
+                    <a:bodyPr/>
+                    <a:lstStyle/>
+                    <a:p>
+                      <a:pPr algn="ctr">
+                        <a:lnSpc>
+                          <a:spcPct val="107000"/>
+                        </a:lnSpc>
+                        <a:spcAft>
+                          <a:spcPts val="800"/>
+                        </a:spcAft>
+                      </a:pPr>
+                      <a:r>
+                        <a:rPr lang="en-IN" sz="1100" kern="100">
+                          <a:effectLst/>
+                        </a:rPr>
+                        <a:t> </a:t>
+                      </a:r>
+                      <a:endParaRPr lang="en-IN" sz="1100" kern="100">
+                        <a:effectLst/>
+                        <a:latin typeface="Calibri" panose="020F0502020204030204" pitchFamily="34" charset="0"/>
+                        <a:ea typeface="Calibri" panose="020F0502020204030204" pitchFamily="34" charset="0"/>
+                        <a:cs typeface="Times New Roman" panose="02020603050405020304" pitchFamily="18" charset="0"/>
+                      </a:endParaRPr>
+                    </a:p>
+                  </a:txBody>
+                  <a:tcPr marL="68580" marR="68580" marT="0" marB="0"/>
+                </a:tc>
+                <a:extLst>
+                  <a:ext uri="{0D108BD9-81ED-4DB2-BD59-A6C34878D82A}">
+                    <a16:rowId xmlns:a16="http://schemas.microsoft.com/office/drawing/2014/main" val="221015324"/>
+                  </a:ext>
+                </a:extLst>
+              </a:tr>
+              <a:tr h="0">
+                <a:tc>
+                  <a:txBody>
+                    <a:bodyPr/>
+                    <a:lstStyle/>
+                    <a:p>
+                      <a:pPr algn="ctr">
+                        <a:lnSpc>
+                          <a:spcPct val="107000"/>
+                        </a:lnSpc>
+                        <a:spcAft>
+                          <a:spcPts val="800"/>
+                        </a:spcAft>
+                      </a:pPr>
+                      <a:r>
+                        <a:rPr lang="en-IN" sz="1100" kern="100">
+                          <a:effectLst/>
+                        </a:rPr>
+                        <a:t>1</a:t>
+                      </a:r>
+                      <a:endParaRPr lang="en-IN" sz="1100" kern="100">
+                        <a:effectLst/>
+                        <a:latin typeface="Calibri" panose="020F0502020204030204" pitchFamily="34" charset="0"/>
+                        <a:ea typeface="Calibri" panose="020F0502020204030204" pitchFamily="34" charset="0"/>
+                        <a:cs typeface="Times New Roman" panose="02020603050405020304" pitchFamily="18" charset="0"/>
+                      </a:endParaRPr>
+                    </a:p>
+                  </a:txBody>
+                  <a:tcPr marL="68580" marR="68580" marT="0" marB="0"/>
+                </a:tc>
+                <a:tc>
+                  <a:txBody>
+                    <a:bodyPr/>
+                    <a:lstStyle/>
+                    <a:p>
+                      <a:pPr algn="ctr">
+                        <a:lnSpc>
+                          <a:spcPct val="107000"/>
+                        </a:lnSpc>
+                        <a:spcAft>
+                          <a:spcPts val="800"/>
+                        </a:spcAft>
+                      </a:pPr>
+                      <a:r>
+                        <a:rPr lang="en-IN" sz="1100" kern="100">
+                          <a:effectLst/>
+                        </a:rPr>
+                        <a:t>English</a:t>
+                      </a:r>
+                      <a:endParaRPr lang="en-IN" sz="1100" kern="100">
+                        <a:effectLst/>
+                        <a:latin typeface="Calibri" panose="020F0502020204030204" pitchFamily="34" charset="0"/>
+                        <a:ea typeface="Calibri" panose="020F0502020204030204" pitchFamily="34" charset="0"/>
+                        <a:cs typeface="Times New Roman" panose="02020603050405020304" pitchFamily="18" charset="0"/>
+                      </a:endParaRPr>
+                    </a:p>
+                  </a:txBody>
+                  <a:tcPr marL="68580" marR="68580" marT="0" marB="0"/>
+                </a:tc>
+                <a:tc>
+                  <a:txBody>
+                    <a:bodyPr/>
+                    <a:lstStyle/>
+                    <a:p>
+                      <a:pPr algn="ctr">
+                        <a:lnSpc>
+                          <a:spcPct val="107000"/>
+                        </a:lnSpc>
+                        <a:spcAft>
+                          <a:spcPts val="800"/>
+                        </a:spcAft>
+                      </a:pPr>
+                      <a:r>
+                        <a:rPr lang="en-IN" sz="1100" kern="100">
+                          <a:effectLst/>
+                        </a:rPr>
+                        <a:t>ICSE, CBSE, WB</a:t>
+                      </a:r>
+                      <a:endParaRPr lang="en-IN" sz="1100" kern="100">
+                        <a:effectLst/>
+                        <a:latin typeface="Calibri" panose="020F0502020204030204" pitchFamily="34" charset="0"/>
+                        <a:ea typeface="Calibri" panose="020F0502020204030204" pitchFamily="34" charset="0"/>
+                        <a:cs typeface="Times New Roman" panose="02020603050405020304" pitchFamily="18" charset="0"/>
+                      </a:endParaRPr>
+                    </a:p>
+                  </a:txBody>
+                  <a:tcPr marL="68580" marR="68580" marT="0" marB="0"/>
+                </a:tc>
+                <a:tc>
+                  <a:txBody>
+                    <a:bodyPr/>
+                    <a:lstStyle/>
+                    <a:p>
+                      <a:pPr algn="ctr">
+                        <a:lnSpc>
+                          <a:spcPct val="107000"/>
+                        </a:lnSpc>
+                        <a:spcAft>
+                          <a:spcPts val="800"/>
+                        </a:spcAft>
+                      </a:pPr>
+                      <a:r>
+                        <a:rPr lang="en-IN" sz="1100" kern="100">
+                          <a:effectLst/>
+                        </a:rPr>
+                        <a:t>X, XI and XII</a:t>
+                      </a:r>
+                      <a:endParaRPr lang="en-IN" sz="1100" kern="100">
+                        <a:effectLst/>
+                        <a:latin typeface="Calibri" panose="020F0502020204030204" pitchFamily="34" charset="0"/>
+                        <a:ea typeface="Calibri" panose="020F0502020204030204" pitchFamily="34" charset="0"/>
+                        <a:cs typeface="Times New Roman" panose="02020603050405020304" pitchFamily="18" charset="0"/>
+                      </a:endParaRPr>
+                    </a:p>
+                  </a:txBody>
+                  <a:tcPr marL="68580" marR="68580" marT="0" marB="0"/>
+                </a:tc>
+                <a:tc>
+                  <a:txBody>
+                    <a:bodyPr/>
+                    <a:lstStyle/>
+                    <a:p>
+                      <a:pPr algn="ctr">
+                        <a:lnSpc>
+                          <a:spcPct val="107000"/>
+                        </a:lnSpc>
+                        <a:spcAft>
+                          <a:spcPts val="800"/>
+                        </a:spcAft>
+                      </a:pPr>
+                      <a:r>
+                        <a:rPr lang="en-IN" sz="1100" kern="100">
+                          <a:effectLst/>
+                        </a:rPr>
+                        <a:t>1</a:t>
+                      </a:r>
+                      <a:endParaRPr lang="en-IN" sz="1100" kern="100">
+                        <a:effectLst/>
+                        <a:latin typeface="Calibri" panose="020F0502020204030204" pitchFamily="34" charset="0"/>
+                        <a:ea typeface="Calibri" panose="020F0502020204030204" pitchFamily="34" charset="0"/>
+                        <a:cs typeface="Times New Roman" panose="02020603050405020304" pitchFamily="18" charset="0"/>
+                      </a:endParaRPr>
+                    </a:p>
+                  </a:txBody>
+                  <a:tcPr marL="68580" marR="68580" marT="0" marB="0"/>
+                </a:tc>
+                <a:extLst>
+                  <a:ext uri="{0D108BD9-81ED-4DB2-BD59-A6C34878D82A}">
+                    <a16:rowId xmlns:a16="http://schemas.microsoft.com/office/drawing/2014/main" val="2081495807"/>
+                  </a:ext>
+                </a:extLst>
+              </a:tr>
+              <a:tr h="0">
+                <a:tc>
+                  <a:txBody>
+                    <a:bodyPr/>
+                    <a:lstStyle/>
+                    <a:p>
+                      <a:pPr algn="ctr">
+                        <a:lnSpc>
+                          <a:spcPct val="107000"/>
+                        </a:lnSpc>
+                        <a:spcAft>
+                          <a:spcPts val="800"/>
+                        </a:spcAft>
+                      </a:pPr>
+                      <a:r>
+                        <a:rPr lang="en-IN" sz="1100" kern="100">
+                          <a:effectLst/>
+                        </a:rPr>
+                        <a:t>2</a:t>
+                      </a:r>
+                      <a:endParaRPr lang="en-IN" sz="1100" kern="100">
+                        <a:effectLst/>
+                        <a:latin typeface="Calibri" panose="020F0502020204030204" pitchFamily="34" charset="0"/>
+                        <a:ea typeface="Calibri" panose="020F0502020204030204" pitchFamily="34" charset="0"/>
+                        <a:cs typeface="Times New Roman" panose="02020603050405020304" pitchFamily="18" charset="0"/>
+                      </a:endParaRPr>
+                    </a:p>
+                  </a:txBody>
+                  <a:tcPr marL="68580" marR="68580" marT="0" marB="0"/>
+                </a:tc>
+                <a:tc>
+                  <a:txBody>
+                    <a:bodyPr/>
+                    <a:lstStyle/>
+                    <a:p>
+                      <a:pPr algn="ctr">
+                        <a:lnSpc>
+                          <a:spcPct val="107000"/>
+                        </a:lnSpc>
+                        <a:spcAft>
+                          <a:spcPts val="800"/>
+                        </a:spcAft>
+                      </a:pPr>
+                      <a:r>
+                        <a:rPr lang="en-IN" sz="1100" kern="100">
+                          <a:effectLst/>
+                        </a:rPr>
+                        <a:t>Bengali</a:t>
+                      </a:r>
+                      <a:endParaRPr lang="en-IN" sz="1100" kern="100">
+                        <a:effectLst/>
+                        <a:latin typeface="Calibri" panose="020F0502020204030204" pitchFamily="34" charset="0"/>
+                        <a:ea typeface="Calibri" panose="020F0502020204030204" pitchFamily="34" charset="0"/>
+                        <a:cs typeface="Times New Roman" panose="02020603050405020304" pitchFamily="18" charset="0"/>
+                      </a:endParaRPr>
+                    </a:p>
+                  </a:txBody>
+                  <a:tcPr marL="68580" marR="68580" marT="0" marB="0"/>
+                </a:tc>
+                <a:tc>
+                  <a:txBody>
+                    <a:bodyPr/>
+                    <a:lstStyle/>
+                    <a:p>
+                      <a:pPr algn="ctr">
+                        <a:lnSpc>
+                          <a:spcPct val="107000"/>
+                        </a:lnSpc>
+                        <a:spcAft>
+                          <a:spcPts val="800"/>
+                        </a:spcAft>
+                      </a:pPr>
+                      <a:r>
+                        <a:rPr lang="en-IN" sz="1100" kern="100">
+                          <a:effectLst/>
+                        </a:rPr>
+                        <a:t>ICSE, CBSE, WB</a:t>
+                      </a:r>
+                      <a:endParaRPr lang="en-IN" sz="1100" kern="100">
+                        <a:effectLst/>
+                        <a:latin typeface="Calibri" panose="020F0502020204030204" pitchFamily="34" charset="0"/>
+                        <a:ea typeface="Calibri" panose="020F0502020204030204" pitchFamily="34" charset="0"/>
+                        <a:cs typeface="Times New Roman" panose="02020603050405020304" pitchFamily="18" charset="0"/>
+                      </a:endParaRPr>
+                    </a:p>
+                  </a:txBody>
+                  <a:tcPr marL="68580" marR="68580" marT="0" marB="0"/>
+                </a:tc>
+                <a:tc>
+                  <a:txBody>
+                    <a:bodyPr/>
+                    <a:lstStyle/>
+                    <a:p>
+                      <a:pPr algn="ctr">
+                        <a:lnSpc>
+                          <a:spcPct val="107000"/>
+                        </a:lnSpc>
+                        <a:spcAft>
+                          <a:spcPts val="800"/>
+                        </a:spcAft>
+                      </a:pPr>
+                      <a:r>
+                        <a:rPr lang="en-IN" sz="1100" kern="100">
+                          <a:effectLst/>
+                        </a:rPr>
+                        <a:t>VIII to XII</a:t>
+                      </a:r>
+                      <a:endParaRPr lang="en-IN" sz="1100" kern="100">
+                        <a:effectLst/>
+                        <a:latin typeface="Calibri" panose="020F0502020204030204" pitchFamily="34" charset="0"/>
+                        <a:ea typeface="Calibri" panose="020F0502020204030204" pitchFamily="34" charset="0"/>
+                        <a:cs typeface="Times New Roman" panose="02020603050405020304" pitchFamily="18" charset="0"/>
+                      </a:endParaRPr>
+                    </a:p>
+                  </a:txBody>
+                  <a:tcPr marL="68580" marR="68580" marT="0" marB="0"/>
+                </a:tc>
+                <a:tc>
+                  <a:txBody>
+                    <a:bodyPr/>
+                    <a:lstStyle/>
+                    <a:p>
+                      <a:pPr algn="ctr">
+                        <a:lnSpc>
+                          <a:spcPct val="107000"/>
+                        </a:lnSpc>
+                        <a:spcAft>
+                          <a:spcPts val="800"/>
+                        </a:spcAft>
+                      </a:pPr>
+                      <a:r>
+                        <a:rPr lang="en-IN" sz="1100" kern="100">
+                          <a:effectLst/>
+                        </a:rPr>
+                        <a:t>2</a:t>
+                      </a:r>
+                      <a:endParaRPr lang="en-IN" sz="1100" kern="100">
+                        <a:effectLst/>
+                        <a:latin typeface="Calibri" panose="020F0502020204030204" pitchFamily="34" charset="0"/>
+                        <a:ea typeface="Calibri" panose="020F0502020204030204" pitchFamily="34" charset="0"/>
+                        <a:cs typeface="Times New Roman" panose="02020603050405020304" pitchFamily="18" charset="0"/>
+                      </a:endParaRPr>
+                    </a:p>
+                  </a:txBody>
+                  <a:tcPr marL="68580" marR="68580" marT="0" marB="0"/>
+                </a:tc>
+                <a:extLst>
+                  <a:ext uri="{0D108BD9-81ED-4DB2-BD59-A6C34878D82A}">
+                    <a16:rowId xmlns:a16="http://schemas.microsoft.com/office/drawing/2014/main" val="1478741344"/>
+                  </a:ext>
+                </a:extLst>
+              </a:tr>
+              <a:tr h="0">
+                <a:tc>
+                  <a:txBody>
+                    <a:bodyPr/>
+                    <a:lstStyle/>
+                    <a:p>
+                      <a:pPr algn="ctr">
+                        <a:lnSpc>
+                          <a:spcPct val="107000"/>
+                        </a:lnSpc>
+                        <a:spcAft>
+                          <a:spcPts val="800"/>
+                        </a:spcAft>
+                      </a:pPr>
+                      <a:r>
+                        <a:rPr lang="en-IN" sz="1100" kern="100">
+                          <a:effectLst/>
+                        </a:rPr>
+                        <a:t>3</a:t>
+                      </a:r>
+                      <a:endParaRPr lang="en-IN" sz="1100" kern="100">
+                        <a:effectLst/>
+                        <a:latin typeface="Calibri" panose="020F0502020204030204" pitchFamily="34" charset="0"/>
+                        <a:ea typeface="Calibri" panose="020F0502020204030204" pitchFamily="34" charset="0"/>
+                        <a:cs typeface="Times New Roman" panose="02020603050405020304" pitchFamily="18" charset="0"/>
+                      </a:endParaRPr>
+                    </a:p>
+                  </a:txBody>
+                  <a:tcPr marL="68580" marR="68580" marT="0" marB="0"/>
+                </a:tc>
+                <a:tc>
+                  <a:txBody>
+                    <a:bodyPr/>
+                    <a:lstStyle/>
+                    <a:p>
+                      <a:pPr algn="ctr">
+                        <a:lnSpc>
+                          <a:spcPct val="107000"/>
+                        </a:lnSpc>
+                        <a:spcAft>
+                          <a:spcPts val="800"/>
+                        </a:spcAft>
+                      </a:pPr>
+                      <a:r>
+                        <a:rPr lang="en-IN" sz="1100" kern="100">
+                          <a:effectLst/>
+                        </a:rPr>
+                        <a:t>Geography</a:t>
+                      </a:r>
+                      <a:endParaRPr lang="en-IN" sz="1100" kern="100">
+                        <a:effectLst/>
+                        <a:latin typeface="Calibri" panose="020F0502020204030204" pitchFamily="34" charset="0"/>
+                        <a:ea typeface="Calibri" panose="020F0502020204030204" pitchFamily="34" charset="0"/>
+                        <a:cs typeface="Times New Roman" panose="02020603050405020304" pitchFamily="18" charset="0"/>
+                      </a:endParaRPr>
+                    </a:p>
+                  </a:txBody>
+                  <a:tcPr marL="68580" marR="68580" marT="0" marB="0"/>
+                </a:tc>
+                <a:tc>
+                  <a:txBody>
+                    <a:bodyPr/>
+                    <a:lstStyle/>
+                    <a:p>
+                      <a:pPr algn="ctr">
+                        <a:lnSpc>
+                          <a:spcPct val="107000"/>
+                        </a:lnSpc>
+                        <a:spcAft>
+                          <a:spcPts val="800"/>
+                        </a:spcAft>
+                      </a:pPr>
+                      <a:r>
+                        <a:rPr lang="en-IN" sz="1100" kern="100">
+                          <a:effectLst/>
+                        </a:rPr>
+                        <a:t>ICSE, CBSE, WB</a:t>
+                      </a:r>
+                      <a:endParaRPr lang="en-IN" sz="1100" kern="100">
+                        <a:effectLst/>
+                        <a:latin typeface="Calibri" panose="020F0502020204030204" pitchFamily="34" charset="0"/>
+                        <a:ea typeface="Calibri" panose="020F0502020204030204" pitchFamily="34" charset="0"/>
+                        <a:cs typeface="Times New Roman" panose="02020603050405020304" pitchFamily="18" charset="0"/>
+                      </a:endParaRPr>
+                    </a:p>
+                  </a:txBody>
+                  <a:tcPr marL="68580" marR="68580" marT="0" marB="0"/>
+                </a:tc>
+                <a:tc>
+                  <a:txBody>
+                    <a:bodyPr/>
+                    <a:lstStyle/>
+                    <a:p>
+                      <a:pPr algn="ctr">
+                        <a:lnSpc>
+                          <a:spcPct val="107000"/>
+                        </a:lnSpc>
+                        <a:spcAft>
+                          <a:spcPts val="800"/>
+                        </a:spcAft>
+                      </a:pPr>
+                      <a:r>
+                        <a:rPr lang="en-IN" sz="1100" kern="100">
+                          <a:effectLst/>
+                        </a:rPr>
+                        <a:t>VIII to XII</a:t>
+                      </a:r>
+                      <a:endParaRPr lang="en-IN" sz="1100" kern="100">
+                        <a:effectLst/>
+                        <a:latin typeface="Calibri" panose="020F0502020204030204" pitchFamily="34" charset="0"/>
+                        <a:ea typeface="Calibri" panose="020F0502020204030204" pitchFamily="34" charset="0"/>
+                        <a:cs typeface="Times New Roman" panose="02020603050405020304" pitchFamily="18" charset="0"/>
+                      </a:endParaRPr>
+                    </a:p>
+                  </a:txBody>
+                  <a:tcPr marL="68580" marR="68580" marT="0" marB="0"/>
+                </a:tc>
+                <a:tc>
+                  <a:txBody>
+                    <a:bodyPr/>
+                    <a:lstStyle/>
+                    <a:p>
+                      <a:pPr algn="ctr">
+                        <a:lnSpc>
+                          <a:spcPct val="107000"/>
+                        </a:lnSpc>
+                        <a:spcAft>
+                          <a:spcPts val="800"/>
+                        </a:spcAft>
+                      </a:pPr>
+                      <a:r>
+                        <a:rPr lang="en-IN" sz="1100" kern="100">
+                          <a:effectLst/>
+                        </a:rPr>
+                        <a:t>1</a:t>
+                      </a:r>
+                      <a:endParaRPr lang="en-IN" sz="1100" kern="100">
+                        <a:effectLst/>
+                        <a:latin typeface="Calibri" panose="020F0502020204030204" pitchFamily="34" charset="0"/>
+                        <a:ea typeface="Calibri" panose="020F0502020204030204" pitchFamily="34" charset="0"/>
+                        <a:cs typeface="Times New Roman" panose="02020603050405020304" pitchFamily="18" charset="0"/>
+                      </a:endParaRPr>
+                    </a:p>
+                  </a:txBody>
+                  <a:tcPr marL="68580" marR="68580" marT="0" marB="0"/>
+                </a:tc>
+                <a:extLst>
+                  <a:ext uri="{0D108BD9-81ED-4DB2-BD59-A6C34878D82A}">
+                    <a16:rowId xmlns:a16="http://schemas.microsoft.com/office/drawing/2014/main" val="4082778659"/>
+                  </a:ext>
+                </a:extLst>
+              </a:tr>
+              <a:tr h="0">
+                <a:tc>
+                  <a:txBody>
+                    <a:bodyPr/>
+                    <a:lstStyle/>
+                    <a:p>
+                      <a:pPr algn="ctr">
+                        <a:lnSpc>
+                          <a:spcPct val="107000"/>
+                        </a:lnSpc>
+                        <a:spcAft>
+                          <a:spcPts val="800"/>
+                        </a:spcAft>
+                      </a:pPr>
+                      <a:r>
+                        <a:rPr lang="en-IN" sz="1100" kern="100">
+                          <a:effectLst/>
+                        </a:rPr>
+                        <a:t>4</a:t>
+                      </a:r>
+                      <a:endParaRPr lang="en-IN" sz="1100" kern="100">
+                        <a:effectLst/>
+                        <a:latin typeface="Calibri" panose="020F0502020204030204" pitchFamily="34" charset="0"/>
+                        <a:ea typeface="Calibri" panose="020F0502020204030204" pitchFamily="34" charset="0"/>
+                        <a:cs typeface="Times New Roman" panose="02020603050405020304" pitchFamily="18" charset="0"/>
+                      </a:endParaRPr>
+                    </a:p>
+                  </a:txBody>
+                  <a:tcPr marL="68580" marR="68580" marT="0" marB="0"/>
+                </a:tc>
+                <a:tc>
+                  <a:txBody>
+                    <a:bodyPr/>
+                    <a:lstStyle/>
+                    <a:p>
+                      <a:pPr algn="ctr">
+                        <a:lnSpc>
+                          <a:spcPct val="107000"/>
+                        </a:lnSpc>
+                        <a:spcAft>
+                          <a:spcPts val="800"/>
+                        </a:spcAft>
+                      </a:pPr>
+                      <a:r>
+                        <a:rPr lang="en-IN" sz="1100" kern="100">
+                          <a:effectLst/>
+                        </a:rPr>
+                        <a:t>Sociology</a:t>
+                      </a:r>
+                      <a:endParaRPr lang="en-IN" sz="1100" kern="100">
+                        <a:effectLst/>
+                        <a:latin typeface="Calibri" panose="020F0502020204030204" pitchFamily="34" charset="0"/>
+                        <a:ea typeface="Calibri" panose="020F0502020204030204" pitchFamily="34" charset="0"/>
+                        <a:cs typeface="Times New Roman" panose="02020603050405020304" pitchFamily="18" charset="0"/>
+                      </a:endParaRPr>
+                    </a:p>
+                  </a:txBody>
+                  <a:tcPr marL="68580" marR="68580" marT="0" marB="0"/>
+                </a:tc>
+                <a:tc>
+                  <a:txBody>
+                    <a:bodyPr/>
+                    <a:lstStyle/>
+                    <a:p>
+                      <a:pPr algn="ctr">
+                        <a:lnSpc>
+                          <a:spcPct val="107000"/>
+                        </a:lnSpc>
+                        <a:spcAft>
+                          <a:spcPts val="800"/>
+                        </a:spcAft>
+                      </a:pPr>
+                      <a:r>
+                        <a:rPr lang="en-IN" sz="1100" kern="100">
+                          <a:effectLst/>
+                        </a:rPr>
+                        <a:t>ICSE, CBSE, WB</a:t>
+                      </a:r>
+                      <a:endParaRPr lang="en-IN" sz="1100" kern="100">
+                        <a:effectLst/>
+                        <a:latin typeface="Calibri" panose="020F0502020204030204" pitchFamily="34" charset="0"/>
+                        <a:ea typeface="Calibri" panose="020F0502020204030204" pitchFamily="34" charset="0"/>
+                        <a:cs typeface="Times New Roman" panose="02020603050405020304" pitchFamily="18" charset="0"/>
+                      </a:endParaRPr>
+                    </a:p>
+                  </a:txBody>
+                  <a:tcPr marL="68580" marR="68580" marT="0" marB="0"/>
+                </a:tc>
+                <a:tc>
+                  <a:txBody>
+                    <a:bodyPr/>
+                    <a:lstStyle/>
+                    <a:p>
+                      <a:pPr algn="ctr">
+                        <a:lnSpc>
+                          <a:spcPct val="107000"/>
+                        </a:lnSpc>
+                        <a:spcAft>
+                          <a:spcPts val="800"/>
+                        </a:spcAft>
+                      </a:pPr>
+                      <a:r>
+                        <a:rPr lang="en-IN" sz="1100" kern="100">
+                          <a:effectLst/>
+                        </a:rPr>
+                        <a:t>XI and XII</a:t>
+                      </a:r>
+                      <a:endParaRPr lang="en-IN" sz="1100" kern="100">
+                        <a:effectLst/>
+                        <a:latin typeface="Calibri" panose="020F0502020204030204" pitchFamily="34" charset="0"/>
+                        <a:ea typeface="Calibri" panose="020F0502020204030204" pitchFamily="34" charset="0"/>
+                        <a:cs typeface="Times New Roman" panose="02020603050405020304" pitchFamily="18" charset="0"/>
+                      </a:endParaRPr>
+                    </a:p>
+                  </a:txBody>
+                  <a:tcPr marL="68580" marR="68580" marT="0" marB="0"/>
+                </a:tc>
+                <a:tc>
+                  <a:txBody>
+                    <a:bodyPr/>
+                    <a:lstStyle/>
+                    <a:p>
+                      <a:pPr algn="ctr">
+                        <a:lnSpc>
+                          <a:spcPct val="107000"/>
+                        </a:lnSpc>
+                        <a:spcAft>
+                          <a:spcPts val="800"/>
+                        </a:spcAft>
+                      </a:pPr>
+                      <a:r>
+                        <a:rPr lang="en-IN" sz="1100" kern="100">
+                          <a:effectLst/>
+                        </a:rPr>
+                        <a:t>1</a:t>
+                      </a:r>
+                      <a:endParaRPr lang="en-IN" sz="1100" kern="100">
+                        <a:effectLst/>
+                        <a:latin typeface="Calibri" panose="020F0502020204030204" pitchFamily="34" charset="0"/>
+                        <a:ea typeface="Calibri" panose="020F0502020204030204" pitchFamily="34" charset="0"/>
+                        <a:cs typeface="Times New Roman" panose="02020603050405020304" pitchFamily="18" charset="0"/>
+                      </a:endParaRPr>
+                    </a:p>
+                  </a:txBody>
+                  <a:tcPr marL="68580" marR="68580" marT="0" marB="0"/>
+                </a:tc>
+                <a:extLst>
+                  <a:ext uri="{0D108BD9-81ED-4DB2-BD59-A6C34878D82A}">
+                    <a16:rowId xmlns:a16="http://schemas.microsoft.com/office/drawing/2014/main" val="3690769463"/>
+                  </a:ext>
+                </a:extLst>
+              </a:tr>
+              <a:tr h="0">
+                <a:tc>
+                  <a:txBody>
+                    <a:bodyPr/>
+                    <a:lstStyle/>
+                    <a:p>
+                      <a:pPr algn="ctr">
+                        <a:lnSpc>
+                          <a:spcPct val="107000"/>
+                        </a:lnSpc>
+                        <a:spcAft>
+                          <a:spcPts val="800"/>
+                        </a:spcAft>
+                      </a:pPr>
+                      <a:r>
+                        <a:rPr lang="en-IN" sz="1100" kern="100">
+                          <a:effectLst/>
+                        </a:rPr>
+                        <a:t>5</a:t>
+                      </a:r>
+                      <a:endParaRPr lang="en-IN" sz="1100" kern="100">
+                        <a:effectLst/>
+                        <a:latin typeface="Calibri" panose="020F0502020204030204" pitchFamily="34" charset="0"/>
+                        <a:ea typeface="Calibri" panose="020F0502020204030204" pitchFamily="34" charset="0"/>
+                        <a:cs typeface="Times New Roman" panose="02020603050405020304" pitchFamily="18" charset="0"/>
+                      </a:endParaRPr>
+                    </a:p>
+                  </a:txBody>
+                  <a:tcPr marL="68580" marR="68580" marT="0" marB="0"/>
+                </a:tc>
+                <a:tc>
+                  <a:txBody>
+                    <a:bodyPr/>
+                    <a:lstStyle/>
+                    <a:p>
+                      <a:pPr algn="ctr">
+                        <a:lnSpc>
+                          <a:spcPct val="107000"/>
+                        </a:lnSpc>
+                        <a:spcAft>
+                          <a:spcPts val="800"/>
+                        </a:spcAft>
+                      </a:pPr>
+                      <a:r>
+                        <a:rPr lang="en-IN" sz="1100" kern="100">
+                          <a:effectLst/>
+                        </a:rPr>
+                        <a:t>Psychology</a:t>
+                      </a:r>
+                      <a:endParaRPr lang="en-IN" sz="1100" kern="100">
+                        <a:effectLst/>
+                        <a:latin typeface="Calibri" panose="020F0502020204030204" pitchFamily="34" charset="0"/>
+                        <a:ea typeface="Calibri" panose="020F0502020204030204" pitchFamily="34" charset="0"/>
+                        <a:cs typeface="Times New Roman" panose="02020603050405020304" pitchFamily="18" charset="0"/>
+                      </a:endParaRPr>
+                    </a:p>
+                  </a:txBody>
+                  <a:tcPr marL="68580" marR="68580" marT="0" marB="0"/>
+                </a:tc>
+                <a:tc>
+                  <a:txBody>
+                    <a:bodyPr/>
+                    <a:lstStyle/>
+                    <a:p>
+                      <a:pPr algn="ctr">
+                        <a:lnSpc>
+                          <a:spcPct val="107000"/>
+                        </a:lnSpc>
+                        <a:spcAft>
+                          <a:spcPts val="800"/>
+                        </a:spcAft>
+                      </a:pPr>
+                      <a:r>
+                        <a:rPr lang="en-IN" sz="1100" kern="100">
+                          <a:effectLst/>
+                        </a:rPr>
+                        <a:t>ICSE, CBSE, WB</a:t>
+                      </a:r>
+                      <a:endParaRPr lang="en-IN" sz="1100" kern="100">
+                        <a:effectLst/>
+                        <a:latin typeface="Calibri" panose="020F0502020204030204" pitchFamily="34" charset="0"/>
+                        <a:ea typeface="Calibri" panose="020F0502020204030204" pitchFamily="34" charset="0"/>
+                        <a:cs typeface="Times New Roman" panose="02020603050405020304" pitchFamily="18" charset="0"/>
+                      </a:endParaRPr>
+                    </a:p>
+                  </a:txBody>
+                  <a:tcPr marL="68580" marR="68580" marT="0" marB="0"/>
+                </a:tc>
+                <a:tc>
+                  <a:txBody>
+                    <a:bodyPr/>
+                    <a:lstStyle/>
+                    <a:p>
+                      <a:pPr algn="ctr">
+                        <a:lnSpc>
+                          <a:spcPct val="107000"/>
+                        </a:lnSpc>
+                        <a:spcAft>
+                          <a:spcPts val="800"/>
+                        </a:spcAft>
+                      </a:pPr>
+                      <a:r>
+                        <a:rPr lang="en-IN" sz="1100" kern="100">
+                          <a:effectLst/>
+                        </a:rPr>
+                        <a:t>XI and XII</a:t>
+                      </a:r>
+                      <a:endParaRPr lang="en-IN" sz="1100" kern="100">
+                        <a:effectLst/>
+                        <a:latin typeface="Calibri" panose="020F0502020204030204" pitchFamily="34" charset="0"/>
+                        <a:ea typeface="Calibri" panose="020F0502020204030204" pitchFamily="34" charset="0"/>
+                        <a:cs typeface="Times New Roman" panose="02020603050405020304" pitchFamily="18" charset="0"/>
+                      </a:endParaRPr>
+                    </a:p>
+                  </a:txBody>
+                  <a:tcPr marL="68580" marR="68580" marT="0" marB="0"/>
+                </a:tc>
+                <a:tc>
+                  <a:txBody>
+                    <a:bodyPr/>
+                    <a:lstStyle/>
+                    <a:p>
+                      <a:pPr algn="ctr">
+                        <a:lnSpc>
+                          <a:spcPct val="107000"/>
+                        </a:lnSpc>
+                        <a:spcAft>
+                          <a:spcPts val="800"/>
+                        </a:spcAft>
+                      </a:pPr>
+                      <a:r>
+                        <a:rPr lang="en-IN" sz="1100" kern="100">
+                          <a:effectLst/>
+                        </a:rPr>
+                        <a:t>1</a:t>
+                      </a:r>
+                      <a:endParaRPr lang="en-IN" sz="1100" kern="100">
+                        <a:effectLst/>
+                        <a:latin typeface="Calibri" panose="020F0502020204030204" pitchFamily="34" charset="0"/>
+                        <a:ea typeface="Calibri" panose="020F0502020204030204" pitchFamily="34" charset="0"/>
+                        <a:cs typeface="Times New Roman" panose="02020603050405020304" pitchFamily="18" charset="0"/>
+                      </a:endParaRPr>
+                    </a:p>
+                  </a:txBody>
+                  <a:tcPr marL="68580" marR="68580" marT="0" marB="0"/>
+                </a:tc>
+                <a:extLst>
+                  <a:ext uri="{0D108BD9-81ED-4DB2-BD59-A6C34878D82A}">
+                    <a16:rowId xmlns:a16="http://schemas.microsoft.com/office/drawing/2014/main" val="680849344"/>
+                  </a:ext>
+                </a:extLst>
+              </a:tr>
+              <a:tr h="0">
+                <a:tc>
+                  <a:txBody>
+                    <a:bodyPr/>
+                    <a:lstStyle/>
+                    <a:p>
+                      <a:pPr algn="ctr">
+                        <a:lnSpc>
+                          <a:spcPct val="107000"/>
+                        </a:lnSpc>
+                        <a:spcAft>
+                          <a:spcPts val="800"/>
+                        </a:spcAft>
+                      </a:pPr>
+                      <a:r>
+                        <a:rPr lang="en-IN" sz="1100" kern="100">
+                          <a:effectLst/>
+                        </a:rPr>
+                        <a:t>6</a:t>
+                      </a:r>
+                      <a:endParaRPr lang="en-IN" sz="1100" kern="100">
+                        <a:effectLst/>
+                        <a:latin typeface="Calibri" panose="020F0502020204030204" pitchFamily="34" charset="0"/>
+                        <a:ea typeface="Calibri" panose="020F0502020204030204" pitchFamily="34" charset="0"/>
+                        <a:cs typeface="Times New Roman" panose="02020603050405020304" pitchFamily="18" charset="0"/>
+                      </a:endParaRPr>
+                    </a:p>
+                  </a:txBody>
+                  <a:tcPr marL="68580" marR="68580" marT="0" marB="0"/>
+                </a:tc>
+                <a:tc>
+                  <a:txBody>
+                    <a:bodyPr/>
+                    <a:lstStyle/>
+                    <a:p>
+                      <a:pPr algn="ctr">
+                        <a:lnSpc>
+                          <a:spcPct val="107000"/>
+                        </a:lnSpc>
+                        <a:spcAft>
+                          <a:spcPts val="800"/>
+                        </a:spcAft>
+                      </a:pPr>
+                      <a:r>
+                        <a:rPr lang="en-IN" sz="1100" kern="100">
+                          <a:effectLst/>
+                        </a:rPr>
+                        <a:t>Philosophy</a:t>
+                      </a:r>
+                      <a:endParaRPr lang="en-IN" sz="1100" kern="100">
+                        <a:effectLst/>
+                        <a:latin typeface="Calibri" panose="020F0502020204030204" pitchFamily="34" charset="0"/>
+                        <a:ea typeface="Calibri" panose="020F0502020204030204" pitchFamily="34" charset="0"/>
+                        <a:cs typeface="Times New Roman" panose="02020603050405020304" pitchFamily="18" charset="0"/>
+                      </a:endParaRPr>
+                    </a:p>
+                  </a:txBody>
+                  <a:tcPr marL="68580" marR="68580" marT="0" marB="0"/>
+                </a:tc>
+                <a:tc>
+                  <a:txBody>
+                    <a:bodyPr/>
+                    <a:lstStyle/>
+                    <a:p>
+                      <a:pPr algn="ctr">
+                        <a:lnSpc>
+                          <a:spcPct val="107000"/>
+                        </a:lnSpc>
+                        <a:spcAft>
+                          <a:spcPts val="800"/>
+                        </a:spcAft>
+                      </a:pPr>
+                      <a:r>
+                        <a:rPr lang="en-IN" sz="1100" kern="100">
+                          <a:effectLst/>
+                        </a:rPr>
+                        <a:t>ICSE, CBSE, WB</a:t>
+                      </a:r>
+                      <a:endParaRPr lang="en-IN" sz="1100" kern="100">
+                        <a:effectLst/>
+                        <a:latin typeface="Calibri" panose="020F0502020204030204" pitchFamily="34" charset="0"/>
+                        <a:ea typeface="Calibri" panose="020F0502020204030204" pitchFamily="34" charset="0"/>
+                        <a:cs typeface="Times New Roman" panose="02020603050405020304" pitchFamily="18" charset="0"/>
+                      </a:endParaRPr>
+                    </a:p>
+                  </a:txBody>
+                  <a:tcPr marL="68580" marR="68580" marT="0" marB="0"/>
+                </a:tc>
+                <a:tc>
+                  <a:txBody>
+                    <a:bodyPr/>
+                    <a:lstStyle/>
+                    <a:p>
+                      <a:pPr algn="ctr">
+                        <a:lnSpc>
+                          <a:spcPct val="107000"/>
+                        </a:lnSpc>
+                        <a:spcAft>
+                          <a:spcPts val="800"/>
+                        </a:spcAft>
+                      </a:pPr>
+                      <a:r>
+                        <a:rPr lang="en-IN" sz="1100" kern="100">
+                          <a:effectLst/>
+                        </a:rPr>
+                        <a:t>XI and XII</a:t>
+                      </a:r>
+                      <a:endParaRPr lang="en-IN" sz="1100" kern="100">
+                        <a:effectLst/>
+                        <a:latin typeface="Calibri" panose="020F0502020204030204" pitchFamily="34" charset="0"/>
+                        <a:ea typeface="Calibri" panose="020F0502020204030204" pitchFamily="34" charset="0"/>
+                        <a:cs typeface="Times New Roman" panose="02020603050405020304" pitchFamily="18" charset="0"/>
+                      </a:endParaRPr>
+                    </a:p>
+                  </a:txBody>
+                  <a:tcPr marL="68580" marR="68580" marT="0" marB="0"/>
+                </a:tc>
+                <a:tc>
+                  <a:txBody>
+                    <a:bodyPr/>
+                    <a:lstStyle/>
+                    <a:p>
+                      <a:pPr algn="ctr">
+                        <a:lnSpc>
+                          <a:spcPct val="107000"/>
+                        </a:lnSpc>
+                        <a:spcAft>
+                          <a:spcPts val="800"/>
+                        </a:spcAft>
+                      </a:pPr>
+                      <a:r>
+                        <a:rPr lang="en-IN" sz="1100" kern="100" dirty="0">
+                          <a:effectLst/>
+                        </a:rPr>
+                        <a:t>1</a:t>
+                      </a:r>
+                      <a:endParaRPr lang="en-IN" sz="1100" kern="100" dirty="0">
+                        <a:effectLst/>
+                        <a:latin typeface="Calibri" panose="020F0502020204030204" pitchFamily="34" charset="0"/>
+                        <a:ea typeface="Calibri" panose="020F0502020204030204" pitchFamily="34" charset="0"/>
+                        <a:cs typeface="Times New Roman" panose="02020603050405020304" pitchFamily="18" charset="0"/>
+                      </a:endParaRPr>
+                    </a:p>
+                  </a:txBody>
+                  <a:tcPr marL="68580" marR="68580" marT="0" marB="0"/>
+                </a:tc>
+                <a:extLst>
+                  <a:ext uri="{0D108BD9-81ED-4DB2-BD59-A6C34878D82A}">
+                    <a16:rowId xmlns:a16="http://schemas.microsoft.com/office/drawing/2014/main" val="2630948796"/>
+                  </a:ext>
+                </a:extLst>
+              </a:tr>
+            </a:tbl>
+          </a:graphicData>
+        </a:graphic>
+      </p:graphicFrame>
+      <p:sp>
+        <p:nvSpPr>
+          <p:cNvPr id="4" name="Rectangle 3">
+            <a:extLst>
+              <a:ext uri="{FF2B5EF4-FFF2-40B4-BE49-F238E27FC236}">
+                <a16:creationId xmlns:a16="http://schemas.microsoft.com/office/drawing/2014/main" id="{FA6271BF-549B-54FB-EA3C-24BDCC926F61}"/>
+              </a:ext>
+            </a:extLst>
+          </p:cNvPr>
+          <p:cNvSpPr/>
+          <p:nvPr/>
+        </p:nvSpPr>
+        <p:spPr>
+          <a:xfrm>
+            <a:off x="0" y="302139"/>
+            <a:ext cx="6840538" cy="6538399"/>
+          </a:xfrm>
+          <a:prstGeom prst="rect">
+            <a:avLst/>
+          </a:prstGeom>
+          <a:solidFill>
+            <a:srgbClr val="E66432"/>
+          </a:solidFill>
+          <a:ln>
+            <a:noFill/>
+          </a:ln>
+        </p:spPr>
+        <p:style>
+          <a:lnRef idx="2">
+            <a:schemeClr val="accent1">
+              <a:shade val="50000"/>
+            </a:schemeClr>
+          </a:lnRef>
+          <a:fillRef idx="1">
+            <a:schemeClr val="accent1"/>
+          </a:fillRef>
+          <a:effectRef idx="0">
+            <a:schemeClr val="accent1"/>
+          </a:effectRef>
+          <a:fontRef idx="minor">
+            <a:schemeClr val="lt1"/>
+          </a:fontRef>
+        </p:style>
+        <p:txBody>
+          <a:bodyPr rtlCol="0" anchor="ctr"/>
+          <a:lstStyle/>
+          <a:p>
+            <a:pPr algn="ctr"/>
+            <a:endParaRPr lang="en-AU" dirty="0"/>
+          </a:p>
+        </p:txBody>
+      </p:sp>
+      <p:grpSp>
+        <p:nvGrpSpPr>
+          <p:cNvPr id="5" name="Group 4">
+            <a:extLst>
+              <a:ext uri="{FF2B5EF4-FFF2-40B4-BE49-F238E27FC236}">
+                <a16:creationId xmlns:a16="http://schemas.microsoft.com/office/drawing/2014/main" id="{BA07D6A4-422A-C649-E0FC-6D4AEE63D073}"/>
+              </a:ext>
+            </a:extLst>
+          </p:cNvPr>
+          <p:cNvGrpSpPr/>
+          <p:nvPr/>
+        </p:nvGrpSpPr>
+        <p:grpSpPr>
+          <a:xfrm>
+            <a:off x="3913508" y="127168"/>
+            <a:ext cx="2710720" cy="836369"/>
+            <a:chOff x="5550427" y="1477122"/>
+            <a:chExt cx="3570187" cy="1101044"/>
+          </a:xfrm>
+        </p:grpSpPr>
+        <p:sp>
+          <p:nvSpPr>
+            <p:cNvPr id="6" name="Rounded Rectangle 8">
+              <a:extLst>
+                <a:ext uri="{FF2B5EF4-FFF2-40B4-BE49-F238E27FC236}">
+                  <a16:creationId xmlns:a16="http://schemas.microsoft.com/office/drawing/2014/main" id="{D71B5659-34D1-1196-EB13-103568E8BED9}"/>
+                </a:ext>
+              </a:extLst>
+            </p:cNvPr>
+            <p:cNvSpPr/>
+            <p:nvPr/>
+          </p:nvSpPr>
+          <p:spPr>
+            <a:xfrm>
+              <a:off x="5550427" y="1497845"/>
+              <a:ext cx="3570187" cy="1080321"/>
+            </a:xfrm>
+            <a:prstGeom prst="roundRect">
+              <a:avLst>
+                <a:gd name="adj" fmla="val 50000"/>
+              </a:avLst>
+            </a:prstGeom>
+            <a:solidFill>
+              <a:srgbClr val="FF8C52"/>
+            </a:solidFill>
+            <a:ln>
+              <a:noFill/>
+            </a:ln>
+            <a:effectLst>
+              <a:glow rad="254000">
+                <a:srgbClr val="FF8C52"/>
+              </a:glow>
+              <a:softEdge rad="254000"/>
+            </a:effectLst>
+          </p:spPr>
+          <p:style>
+            <a:lnRef idx="2">
+              <a:schemeClr val="accent1">
+                <a:shade val="50000"/>
+              </a:schemeClr>
+            </a:lnRef>
+            <a:fillRef idx="1">
+              <a:schemeClr val="accent1"/>
+            </a:fillRef>
+            <a:effectRef idx="0">
+              <a:schemeClr val="accent1"/>
+            </a:effectRef>
+            <a:fontRef idx="minor">
+              <a:schemeClr val="lt1"/>
+            </a:fontRef>
+          </p:style>
+          <p:txBody>
+            <a:bodyPr rtlCol="0" anchor="ctr"/>
+            <a:lstStyle/>
+            <a:p>
+              <a:pPr algn="ctr"/>
+              <a:endParaRPr lang="en-AU">
+                <a:latin typeface="Oxygen" panose="02000503000000000000" pitchFamily="2" charset="0"/>
+              </a:endParaRPr>
+            </a:p>
+          </p:txBody>
+        </p:sp>
+        <p:grpSp>
+          <p:nvGrpSpPr>
+            <p:cNvPr id="7" name="Group 6">
+              <a:extLst>
+                <a:ext uri="{FF2B5EF4-FFF2-40B4-BE49-F238E27FC236}">
+                  <a16:creationId xmlns:a16="http://schemas.microsoft.com/office/drawing/2014/main" id="{706741C2-3596-30CA-C6F5-8BB43673D9D1}"/>
+                </a:ext>
+              </a:extLst>
+            </p:cNvPr>
+            <p:cNvGrpSpPr/>
+            <p:nvPr/>
+          </p:nvGrpSpPr>
+          <p:grpSpPr>
+            <a:xfrm>
+              <a:off x="5976783" y="1477122"/>
+              <a:ext cx="2800727" cy="1080000"/>
+              <a:chOff x="5936143" y="1477122"/>
+              <a:chExt cx="2800727" cy="1080000"/>
+            </a:xfrm>
+          </p:grpSpPr>
+          <p:sp>
+            <p:nvSpPr>
+              <p:cNvPr id="8" name="Rectangle 7">
+                <a:extLst>
+                  <a:ext uri="{FF2B5EF4-FFF2-40B4-BE49-F238E27FC236}">
+                    <a16:creationId xmlns:a16="http://schemas.microsoft.com/office/drawing/2014/main" id="{7FC58ADE-CAD1-D5F0-FCF8-2C9AB6D0B73E}"/>
+                  </a:ext>
+                </a:extLst>
+              </p:cNvPr>
+              <p:cNvSpPr/>
+              <p:nvPr/>
+            </p:nvSpPr>
+            <p:spPr>
+              <a:xfrm>
+                <a:off x="5936143" y="1477122"/>
+                <a:ext cx="2717475" cy="1080000"/>
+              </a:xfrm>
+              <a:prstGeom prst="rect">
+                <a:avLst/>
+              </a:prstGeom>
+              <a:solidFill>
+                <a:srgbClr val="FF8C52"/>
+              </a:solidFill>
+              <a:ln>
+                <a:noFill/>
+              </a:ln>
+            </p:spPr>
+            <p:style>
+              <a:lnRef idx="2">
+                <a:schemeClr val="accent1">
+                  <a:shade val="50000"/>
+                </a:schemeClr>
+              </a:lnRef>
+              <a:fillRef idx="1">
+                <a:schemeClr val="accent1"/>
+              </a:fillRef>
+              <a:effectRef idx="0">
+                <a:schemeClr val="accent1"/>
+              </a:effectRef>
+              <a:fontRef idx="minor">
+                <a:schemeClr val="lt1"/>
+              </a:fontRef>
+            </p:style>
+            <p:txBody>
+              <a:bodyPr rtlCol="0" anchor="ctr"/>
+              <a:lstStyle/>
+              <a:p>
+                <a:pPr algn="ctr"/>
+                <a:endParaRPr lang="en-AU"/>
+              </a:p>
+            </p:txBody>
+          </p:sp>
+          <p:sp>
+            <p:nvSpPr>
+              <p:cNvPr id="9" name="TextBox 8">
+                <a:extLst>
+                  <a:ext uri="{FF2B5EF4-FFF2-40B4-BE49-F238E27FC236}">
+                    <a16:creationId xmlns:a16="http://schemas.microsoft.com/office/drawing/2014/main" id="{CCDDD188-F223-810B-FF3E-2A4B75273D71}"/>
+                  </a:ext>
+                </a:extLst>
+              </p:cNvPr>
+              <p:cNvSpPr txBox="1"/>
+              <p:nvPr/>
+            </p:nvSpPr>
+            <p:spPr>
+              <a:xfrm>
+                <a:off x="6513561" y="1601129"/>
+                <a:ext cx="2223309" cy="741982"/>
+              </a:xfrm>
+              <a:prstGeom prst="rect">
+                <a:avLst/>
+              </a:prstGeom>
+              <a:noFill/>
+            </p:spPr>
+            <p:txBody>
+              <a:bodyPr wrap="square" rtlCol="0">
+                <a:spAutoFit/>
+              </a:bodyPr>
+              <a:lstStyle/>
+              <a:p>
+                <a:r>
+                  <a:rPr lang="en-US" sz="3000" b="1" dirty="0">
+                    <a:solidFill>
+                      <a:schemeClr val="bg1"/>
+                    </a:solidFill>
+                    <a:latin typeface="Oxygen" panose="02000503000000000000" pitchFamily="2" charset="0"/>
+                  </a:rPr>
+                  <a:t>nodiam</a:t>
+                </a:r>
+              </a:p>
+            </p:txBody>
+          </p:sp>
+          <p:sp>
+            <p:nvSpPr>
+              <p:cNvPr id="10" name="TextBox 9">
+                <a:extLst>
+                  <a:ext uri="{FF2B5EF4-FFF2-40B4-BE49-F238E27FC236}">
+                    <a16:creationId xmlns:a16="http://schemas.microsoft.com/office/drawing/2014/main" id="{C660DA96-6015-2EF1-60BB-D36A7CC42715}"/>
+                  </a:ext>
+                </a:extLst>
+              </p:cNvPr>
+              <p:cNvSpPr txBox="1"/>
+              <p:nvPr/>
+            </p:nvSpPr>
+            <p:spPr>
+              <a:xfrm>
+                <a:off x="5938291" y="2183975"/>
+                <a:ext cx="2741469" cy="370991"/>
+              </a:xfrm>
+              <a:prstGeom prst="rect">
+                <a:avLst/>
+              </a:prstGeom>
+              <a:noFill/>
+            </p:spPr>
+            <p:txBody>
+              <a:bodyPr wrap="square" rtlCol="0">
+                <a:spAutoFit/>
+              </a:bodyPr>
+              <a:lstStyle/>
+              <a:p>
+                <a:r>
+                  <a:rPr lang="en-US" sz="1200" b="1" i="1" dirty="0">
+                    <a:solidFill>
+                      <a:schemeClr val="bg1"/>
+                    </a:solidFill>
+                    <a:latin typeface="Oxygen" panose="02000503000000000000" pitchFamily="2" charset="0"/>
+                  </a:rPr>
+                  <a:t>Education that enlightens!</a:t>
+                </a:r>
+              </a:p>
+            </p:txBody>
+          </p:sp>
+          <p:sp>
+            <p:nvSpPr>
+              <p:cNvPr id="11" name="Freeform 13">
+                <a:extLst>
+                  <a:ext uri="{FF2B5EF4-FFF2-40B4-BE49-F238E27FC236}">
+                    <a16:creationId xmlns:a16="http://schemas.microsoft.com/office/drawing/2014/main" id="{F26A55DD-F424-F19C-2630-F744E384B5B1}"/>
+                  </a:ext>
+                </a:extLst>
+              </p:cNvPr>
+              <p:cNvSpPr/>
+              <p:nvPr/>
+            </p:nvSpPr>
+            <p:spPr>
+              <a:xfrm>
+                <a:off x="5999251" y="1652587"/>
+                <a:ext cx="576000" cy="576000"/>
+              </a:xfrm>
+              <a:custGeom>
+                <a:avLst/>
+                <a:gdLst>
+                  <a:gd name="connsiteX0" fmla="*/ 1080000 w 2160000"/>
+                  <a:gd name="connsiteY0" fmla="*/ 0 h 2160000"/>
+                  <a:gd name="connsiteX1" fmla="*/ 2154424 w 2160000"/>
+                  <a:gd name="connsiteY1" fmla="*/ 969576 h 2160000"/>
+                  <a:gd name="connsiteX2" fmla="*/ 2157027 w 2160000"/>
+                  <a:gd name="connsiteY2" fmla="*/ 1021127 h 2160000"/>
+                  <a:gd name="connsiteX3" fmla="*/ 2159999 w 2160000"/>
+                  <a:gd name="connsiteY3" fmla="*/ 1021127 h 2160000"/>
+                  <a:gd name="connsiteX4" fmla="*/ 2159999 w 2160000"/>
+                  <a:gd name="connsiteY4" fmla="*/ 1079980 h 2160000"/>
+                  <a:gd name="connsiteX5" fmla="*/ 2160000 w 2160000"/>
+                  <a:gd name="connsiteY5" fmla="*/ 1080000 h 2160000"/>
+                  <a:gd name="connsiteX6" fmla="*/ 2159999 w 2160000"/>
+                  <a:gd name="connsiteY6" fmla="*/ 1080021 h 2160000"/>
+                  <a:gd name="connsiteX7" fmla="*/ 2159999 w 2160000"/>
+                  <a:gd name="connsiteY7" fmla="*/ 1716639 h 2160000"/>
+                  <a:gd name="connsiteX8" fmla="*/ 2157838 w 2160000"/>
+                  <a:gd name="connsiteY8" fmla="*/ 1716639 h 2160000"/>
+                  <a:gd name="connsiteX9" fmla="*/ 2160000 w 2160000"/>
+                  <a:gd name="connsiteY9" fmla="*/ 1738544 h 2160000"/>
+                  <a:gd name="connsiteX10" fmla="*/ 1891921 w 2160000"/>
+                  <a:gd name="connsiteY10" fmla="*/ 2012333 h 2160000"/>
+                  <a:gd name="connsiteX11" fmla="*/ 1623842 w 2160000"/>
+                  <a:gd name="connsiteY11" fmla="*/ 1738544 h 2160000"/>
+                  <a:gd name="connsiteX12" fmla="*/ 1626005 w 2160000"/>
+                  <a:gd name="connsiteY12" fmla="*/ 1716639 h 2160000"/>
+                  <a:gd name="connsiteX13" fmla="*/ 1620298 w 2160000"/>
+                  <a:gd name="connsiteY13" fmla="*/ 1716639 h 2160000"/>
+                  <a:gd name="connsiteX14" fmla="*/ 1620298 w 2160000"/>
+                  <a:gd name="connsiteY14" fmla="*/ 1090950 h 2160000"/>
+                  <a:gd name="connsiteX15" fmla="*/ 1618898 w 2160000"/>
+                  <a:gd name="connsiteY15" fmla="*/ 1090937 h 2160000"/>
+                  <a:gd name="connsiteX16" fmla="*/ 1620000 w 2160000"/>
+                  <a:gd name="connsiteY16" fmla="*/ 1080000 h 2160000"/>
+                  <a:gd name="connsiteX17" fmla="*/ 1080000 w 2160000"/>
+                  <a:gd name="connsiteY17" fmla="*/ 540000 h 2160000"/>
+                  <a:gd name="connsiteX18" fmla="*/ 540000 w 2160000"/>
+                  <a:gd name="connsiteY18" fmla="*/ 1080000 h 2160000"/>
+                  <a:gd name="connsiteX19" fmla="*/ 1080000 w 2160000"/>
+                  <a:gd name="connsiteY19" fmla="*/ 1620000 h 2160000"/>
+                  <a:gd name="connsiteX20" fmla="*/ 1172144 w 2160000"/>
+                  <a:gd name="connsiteY20" fmla="*/ 1610711 h 2160000"/>
+                  <a:gd name="connsiteX21" fmla="*/ 1192722 w 2160000"/>
+                  <a:gd name="connsiteY21" fmla="*/ 1599542 h 2160000"/>
+                  <a:gd name="connsiteX22" fmla="*/ 1205334 w 2160000"/>
+                  <a:gd name="connsiteY22" fmla="*/ 1595627 h 2160000"/>
+                  <a:gd name="connsiteX23" fmla="*/ 1218649 w 2160000"/>
+                  <a:gd name="connsiteY23" fmla="*/ 1594482 h 2160000"/>
+                  <a:gd name="connsiteX24" fmla="*/ 1273176 w 2160000"/>
+                  <a:gd name="connsiteY24" fmla="*/ 1581875 h 2160000"/>
+                  <a:gd name="connsiteX25" fmla="*/ 1277433 w 2160000"/>
+                  <a:gd name="connsiteY25" fmla="*/ 1580379 h 2160000"/>
+                  <a:gd name="connsiteX26" fmla="*/ 1297818 w 2160000"/>
+                  <a:gd name="connsiteY26" fmla="*/ 1578324 h 2160000"/>
+                  <a:gd name="connsiteX27" fmla="*/ 1567818 w 2160000"/>
+                  <a:gd name="connsiteY27" fmla="*/ 1848324 h 2160000"/>
+                  <a:gd name="connsiteX28" fmla="*/ 1469563 w 2160000"/>
+                  <a:gd name="connsiteY28" fmla="*/ 2056669 h 2160000"/>
+                  <a:gd name="connsiteX29" fmla="*/ 1412948 w 2160000"/>
+                  <a:gd name="connsiteY29" fmla="*/ 2091019 h 2160000"/>
+                  <a:gd name="connsiteX30" fmla="*/ 1398272 w 2160000"/>
+                  <a:gd name="connsiteY30" fmla="*/ 2101498 h 2160000"/>
+                  <a:gd name="connsiteX31" fmla="*/ 1374464 w 2160000"/>
+                  <a:gd name="connsiteY31" fmla="*/ 2110955 h 2160000"/>
+                  <a:gd name="connsiteX32" fmla="*/ 1376211 w 2160000"/>
+                  <a:gd name="connsiteY32" fmla="*/ 2117860 h 2160000"/>
+                  <a:gd name="connsiteX33" fmla="*/ 1321962 w 2160000"/>
+                  <a:gd name="connsiteY33" fmla="*/ 2131809 h 2160000"/>
+                  <a:gd name="connsiteX34" fmla="*/ 1306247 w 2160000"/>
+                  <a:gd name="connsiteY34" fmla="*/ 2138051 h 2160000"/>
+                  <a:gd name="connsiteX35" fmla="*/ 1267530 w 2160000"/>
+                  <a:gd name="connsiteY35" fmla="*/ 2142656 h 2160000"/>
+                  <a:gd name="connsiteX36" fmla="*/ 1190424 w 2160000"/>
+                  <a:gd name="connsiteY36" fmla="*/ 2154424 h 2160000"/>
+                  <a:gd name="connsiteX37" fmla="*/ 1080000 w 2160000"/>
+                  <a:gd name="connsiteY37" fmla="*/ 2160000 h 2160000"/>
+                  <a:gd name="connsiteX38" fmla="*/ 0 w 2160000"/>
+                  <a:gd name="connsiteY38" fmla="*/ 1080000 h 2160000"/>
+                  <a:gd name="connsiteX39" fmla="*/ 1080000 w 2160000"/>
+                  <a:gd name="connsiteY39" fmla="*/ 0 h 2160000"/>
+                </a:gdLst>
+                <a:ahLst/>
+                <a:cxnLst>
+                  <a:cxn ang="0">
+                    <a:pos x="connsiteX0" y="connsiteY0"/>
+                  </a:cxn>
+                  <a:cxn ang="0">
+                    <a:pos x="connsiteX1" y="connsiteY1"/>
+                  </a:cxn>
+                  <a:cxn ang="0">
+                    <a:pos x="connsiteX2" y="connsiteY2"/>
+                  </a:cxn>
+                  <a:cxn ang="0">
+                    <a:pos x="connsiteX3" y="connsiteY3"/>
+                  </a:cxn>
+                  <a:cxn ang="0">
+                    <a:pos x="connsiteX4" y="connsiteY4"/>
+                  </a:cxn>
+                  <a:cxn ang="0">
+                    <a:pos x="connsiteX5" y="connsiteY5"/>
+                  </a:cxn>
+                  <a:cxn ang="0">
+                    <a:pos x="connsiteX6" y="connsiteY6"/>
+                  </a:cxn>
+                  <a:cxn ang="0">
+                    <a:pos x="connsiteX7" y="connsiteY7"/>
+                  </a:cxn>
+                  <a:cxn ang="0">
+                    <a:pos x="connsiteX8" y="connsiteY8"/>
+                  </a:cxn>
+                  <a:cxn ang="0">
+                    <a:pos x="connsiteX9" y="connsiteY9"/>
+                  </a:cxn>
+                  <a:cxn ang="0">
+                    <a:pos x="connsiteX10" y="connsiteY10"/>
+                  </a:cxn>
+                  <a:cxn ang="0">
+                    <a:pos x="connsiteX11" y="connsiteY11"/>
+                  </a:cxn>
+                  <a:cxn ang="0">
+                    <a:pos x="connsiteX12" y="connsiteY12"/>
+                  </a:cxn>
+                  <a:cxn ang="0">
+                    <a:pos x="connsiteX13" y="connsiteY13"/>
+                  </a:cxn>
+                  <a:cxn ang="0">
+                    <a:pos x="connsiteX14" y="connsiteY14"/>
+                  </a:cxn>
+                  <a:cxn ang="0">
+                    <a:pos x="connsiteX15" y="connsiteY15"/>
+                  </a:cxn>
+                  <a:cxn ang="0">
+                    <a:pos x="connsiteX16" y="connsiteY16"/>
+                  </a:cxn>
+                  <a:cxn ang="0">
+                    <a:pos x="connsiteX17" y="connsiteY17"/>
+                  </a:cxn>
+                  <a:cxn ang="0">
+                    <a:pos x="connsiteX18" y="connsiteY18"/>
+                  </a:cxn>
+                  <a:cxn ang="0">
+                    <a:pos x="connsiteX19" y="connsiteY19"/>
+                  </a:cxn>
+                  <a:cxn ang="0">
+                    <a:pos x="connsiteX20" y="connsiteY20"/>
+                  </a:cxn>
+                  <a:cxn ang="0">
+                    <a:pos x="connsiteX21" y="connsiteY21"/>
+                  </a:cxn>
+                  <a:cxn ang="0">
+                    <a:pos x="connsiteX22" y="connsiteY22"/>
+                  </a:cxn>
+                  <a:cxn ang="0">
+                    <a:pos x="connsiteX23" y="connsiteY23"/>
+                  </a:cxn>
+                  <a:cxn ang="0">
+                    <a:pos x="connsiteX24" y="connsiteY24"/>
+                  </a:cxn>
+                  <a:cxn ang="0">
+                    <a:pos x="connsiteX25" y="connsiteY25"/>
+                  </a:cxn>
+                  <a:cxn ang="0">
+                    <a:pos x="connsiteX26" y="connsiteY26"/>
+                  </a:cxn>
+                  <a:cxn ang="0">
+                    <a:pos x="connsiteX27" y="connsiteY27"/>
+                  </a:cxn>
+                  <a:cxn ang="0">
+                    <a:pos x="connsiteX28" y="connsiteY28"/>
+                  </a:cxn>
+                  <a:cxn ang="0">
+                    <a:pos x="connsiteX29" y="connsiteY29"/>
+                  </a:cxn>
+                  <a:cxn ang="0">
+                    <a:pos x="connsiteX30" y="connsiteY30"/>
+                  </a:cxn>
+                  <a:cxn ang="0">
+                    <a:pos x="connsiteX31" y="connsiteY31"/>
+                  </a:cxn>
+                  <a:cxn ang="0">
+                    <a:pos x="connsiteX32" y="connsiteY32"/>
+                  </a:cxn>
+                  <a:cxn ang="0">
+                    <a:pos x="connsiteX33" y="connsiteY33"/>
+                  </a:cxn>
+                  <a:cxn ang="0">
+                    <a:pos x="connsiteX34" y="connsiteY34"/>
+                  </a:cxn>
+                  <a:cxn ang="0">
+                    <a:pos x="connsiteX35" y="connsiteY35"/>
+                  </a:cxn>
+                  <a:cxn ang="0">
+                    <a:pos x="connsiteX36" y="connsiteY36"/>
+                  </a:cxn>
+                  <a:cxn ang="0">
+                    <a:pos x="connsiteX37" y="connsiteY37"/>
+                  </a:cxn>
+                  <a:cxn ang="0">
+                    <a:pos x="connsiteX38" y="connsiteY38"/>
+                  </a:cxn>
+                  <a:cxn ang="0">
+                    <a:pos x="connsiteX39" y="connsiteY39"/>
+                  </a:cxn>
+                </a:cxnLst>
+                <a:rect l="l" t="t" r="r" b="b"/>
+                <a:pathLst>
+                  <a:path w="2160000" h="2160000">
+                    <a:moveTo>
+                      <a:pt x="1080000" y="0"/>
+                    </a:moveTo>
+                    <a:cubicBezTo>
+                      <a:pt x="1639189" y="0"/>
+                      <a:pt x="2099117" y="424979"/>
+                      <a:pt x="2154424" y="969576"/>
+                    </a:cubicBezTo>
+                    <a:lnTo>
+                      <a:pt x="2157027" y="1021127"/>
+                    </a:lnTo>
+                    <a:lnTo>
+                      <a:pt x="2159999" y="1021127"/>
+                    </a:lnTo>
+                    <a:lnTo>
+                      <a:pt x="2159999" y="1079980"/>
+                    </a:lnTo>
+                    <a:lnTo>
+                      <a:pt x="2160000" y="1080000"/>
+                    </a:lnTo>
+                    <a:lnTo>
+                      <a:pt x="2159999" y="1080021"/>
+                    </a:lnTo>
+                    <a:lnTo>
+                      <a:pt x="2159999" y="1716639"/>
+                    </a:lnTo>
+                    <a:lnTo>
+                      <a:pt x="2157838" y="1716639"/>
+                    </a:lnTo>
+                    <a:lnTo>
+                      <a:pt x="2160000" y="1738544"/>
+                    </a:lnTo>
+                    <a:cubicBezTo>
+                      <a:pt x="2160000" y="1889753"/>
+                      <a:pt x="2039977" y="2012333"/>
+                      <a:pt x="1891921" y="2012333"/>
+                    </a:cubicBezTo>
+                    <a:cubicBezTo>
+                      <a:pt x="1743865" y="2012333"/>
+                      <a:pt x="1623842" y="1889753"/>
+                      <a:pt x="1623842" y="1738544"/>
+                    </a:cubicBezTo>
+                    <a:lnTo>
+                      <a:pt x="1626005" y="1716639"/>
+                    </a:lnTo>
+                    <a:lnTo>
+                      <a:pt x="1620298" y="1716639"/>
+                    </a:lnTo>
+                    <a:lnTo>
+                      <a:pt x="1620298" y="1090950"/>
+                    </a:lnTo>
+                    <a:lnTo>
+                      <a:pt x="1618898" y="1090937"/>
+                    </a:lnTo>
+                    <a:lnTo>
+                      <a:pt x="1620000" y="1080000"/>
+                    </a:lnTo>
+                    <a:cubicBezTo>
+                      <a:pt x="1620000" y="781766"/>
+                      <a:pt x="1378234" y="540000"/>
+                      <a:pt x="1080000" y="540000"/>
+                    </a:cubicBezTo>
+                    <a:cubicBezTo>
+                      <a:pt x="781766" y="540000"/>
+                      <a:pt x="540000" y="781766"/>
+                      <a:pt x="540000" y="1080000"/>
+                    </a:cubicBezTo>
+                    <a:cubicBezTo>
+                      <a:pt x="540000" y="1378234"/>
+                      <a:pt x="781766" y="1620000"/>
+                      <a:pt x="1080000" y="1620000"/>
+                    </a:cubicBezTo>
+                    <a:lnTo>
+                      <a:pt x="1172144" y="1610711"/>
+                    </a:lnTo>
+                    <a:lnTo>
+                      <a:pt x="1192722" y="1599542"/>
+                    </a:lnTo>
+                    <a:lnTo>
+                      <a:pt x="1205334" y="1595627"/>
+                    </a:lnTo>
+                    <a:lnTo>
+                      <a:pt x="1218649" y="1594482"/>
+                    </a:lnTo>
+                    <a:cubicBezTo>
+                      <a:pt x="1237851" y="1591023"/>
+                      <a:pt x="1256099" y="1586790"/>
+                      <a:pt x="1273176" y="1581875"/>
+                    </a:cubicBezTo>
+                    <a:lnTo>
+                      <a:pt x="1277433" y="1580379"/>
+                    </a:lnTo>
+                    <a:lnTo>
+                      <a:pt x="1297818" y="1578324"/>
+                    </a:lnTo>
+                    <a:cubicBezTo>
+                      <a:pt x="1446935" y="1578324"/>
+                      <a:pt x="1567818" y="1699207"/>
+                      <a:pt x="1567818" y="1848324"/>
+                    </a:cubicBezTo>
+                    <a:cubicBezTo>
+                      <a:pt x="1567818" y="1932202"/>
+                      <a:pt x="1529570" y="2007147"/>
+                      <a:pt x="1469563" y="2056669"/>
+                    </a:cubicBezTo>
+                    <a:lnTo>
+                      <a:pt x="1412948" y="2091019"/>
+                    </a:lnTo>
+                    <a:lnTo>
+                      <a:pt x="1398272" y="2101498"/>
+                    </a:lnTo>
+                    <a:lnTo>
+                      <a:pt x="1374464" y="2110955"/>
+                    </a:lnTo>
+                    <a:lnTo>
+                      <a:pt x="1376211" y="2117860"/>
+                    </a:lnTo>
+                    <a:lnTo>
+                      <a:pt x="1321962" y="2131809"/>
+                    </a:lnTo>
+                    <a:lnTo>
+                      <a:pt x="1306247" y="2138051"/>
+                    </a:lnTo>
+                    <a:lnTo>
+                      <a:pt x="1267530" y="2142656"/>
+                    </a:lnTo>
+                    <a:lnTo>
+                      <a:pt x="1190424" y="2154424"/>
+                    </a:lnTo>
+                    <a:cubicBezTo>
+                      <a:pt x="1154118" y="2158111"/>
+                      <a:pt x="1117280" y="2160000"/>
+                      <a:pt x="1080000" y="2160000"/>
+                    </a:cubicBezTo>
+                    <a:cubicBezTo>
+                      <a:pt x="483532" y="2160000"/>
+                      <a:pt x="0" y="1676468"/>
+                      <a:pt x="0" y="1080000"/>
+                    </a:cubicBezTo>
+                    <a:cubicBezTo>
+                      <a:pt x="0" y="483532"/>
+                      <a:pt x="483532" y="0"/>
+                      <a:pt x="1080000" y="0"/>
+                    </a:cubicBezTo>
+                    <a:close/>
+                  </a:path>
+                </a:pathLst>
+              </a:custGeom>
+              <a:solidFill>
+                <a:schemeClr val="bg1"/>
+              </a:solidFill>
+              <a:ln>
+                <a:solidFill>
+                  <a:schemeClr val="bg1"/>
+                </a:solidFill>
+              </a:ln>
+            </p:spPr>
+            <p:style>
+              <a:lnRef idx="2">
+                <a:schemeClr val="accent1">
+                  <a:shade val="50000"/>
+                </a:schemeClr>
+              </a:lnRef>
+              <a:fillRef idx="1">
+                <a:schemeClr val="accent1"/>
+              </a:fillRef>
+              <a:effectRef idx="0">
+                <a:schemeClr val="accent1"/>
+              </a:effectRef>
+              <a:fontRef idx="minor">
+                <a:schemeClr val="lt1"/>
+              </a:fontRef>
+            </p:style>
+            <p:txBody>
+              <a:bodyPr rtlCol="0" anchor="ctr"/>
+              <a:lstStyle/>
+              <a:p>
+                <a:pPr marL="285750" indent="-285750" algn="ctr">
+                  <a:buFont typeface="Arial" panose="020B0604020202020204" pitchFamily="34" charset="0"/>
+                  <a:buChar char="•"/>
+                </a:pPr>
+                <a:endParaRPr lang="en-AU" sz="1796">
+                  <a:latin typeface="Oxygen" panose="02000503000000000000" pitchFamily="2" charset="0"/>
+                </a:endParaRPr>
+              </a:p>
+            </p:txBody>
+          </p:sp>
+        </p:grpSp>
+      </p:grpSp>
+      <p:sp>
+        <p:nvSpPr>
+          <p:cNvPr id="12" name="TextBox 11">
+            <a:extLst>
+              <a:ext uri="{FF2B5EF4-FFF2-40B4-BE49-F238E27FC236}">
+                <a16:creationId xmlns:a16="http://schemas.microsoft.com/office/drawing/2014/main" id="{DCE77697-0499-322D-8A01-EA63EAED79E1}"/>
+              </a:ext>
+            </a:extLst>
+          </p:cNvPr>
+          <p:cNvSpPr txBox="1"/>
+          <p:nvPr/>
+        </p:nvSpPr>
+        <p:spPr>
+          <a:xfrm>
+            <a:off x="-45720" y="265176"/>
+            <a:ext cx="6840538" cy="523220"/>
+          </a:xfrm>
+          <a:prstGeom prst="rect">
+            <a:avLst/>
+          </a:prstGeom>
+          <a:noFill/>
+        </p:spPr>
+        <p:txBody>
+          <a:bodyPr wrap="square" rtlCol="0">
+            <a:spAutoFit/>
+          </a:bodyPr>
+          <a:lstStyle/>
+          <a:p>
+            <a:pPr algn="ctr"/>
+            <a:endParaRPr lang="en-US" sz="1400" dirty="0">
+              <a:solidFill>
+                <a:schemeClr val="bg1"/>
+              </a:solidFill>
+              <a:latin typeface="Oxygen" panose="02000503000000000000" pitchFamily="2" charset="0"/>
+            </a:endParaRPr>
+          </a:p>
+          <a:p>
+            <a:endParaRPr lang="en-US" sz="1400" b="1" dirty="0">
+              <a:solidFill>
+                <a:schemeClr val="bg1"/>
+              </a:solidFill>
+              <a:latin typeface="Oxygen" panose="02000503000000000000" pitchFamily="2" charset="0"/>
+            </a:endParaRPr>
+          </a:p>
+        </p:txBody>
+      </p:sp>
+      <p:sp>
+        <p:nvSpPr>
+          <p:cNvPr id="16" name="TextBox 15">
+            <a:extLst>
+              <a:ext uri="{FF2B5EF4-FFF2-40B4-BE49-F238E27FC236}">
+                <a16:creationId xmlns:a16="http://schemas.microsoft.com/office/drawing/2014/main" id="{C1078C45-68C2-5CDF-A615-357BDDC0F711}"/>
+              </a:ext>
+            </a:extLst>
+          </p:cNvPr>
+          <p:cNvSpPr txBox="1"/>
+          <p:nvPr/>
+        </p:nvSpPr>
+        <p:spPr>
+          <a:xfrm>
+            <a:off x="2825259" y="4570571"/>
+            <a:ext cx="3871613" cy="1661993"/>
+          </a:xfrm>
+          <a:prstGeom prst="rect">
+            <a:avLst/>
+          </a:prstGeom>
+          <a:noFill/>
+        </p:spPr>
+        <p:txBody>
+          <a:bodyPr wrap="square" rtlCol="0">
+            <a:spAutoFit/>
+          </a:bodyPr>
+          <a:lstStyle/>
+          <a:p>
+            <a:pPr algn="ctr"/>
+            <a:r>
+              <a:rPr lang="en-US" sz="2400" b="1" u="sng" dirty="0">
+                <a:solidFill>
+                  <a:schemeClr val="bg1"/>
+                </a:solidFill>
+                <a:latin typeface="Oxygen" panose="02000503000000000000" pitchFamily="2" charset="0"/>
+                <a:hlinkClick r:id="rId3"/>
+              </a:rPr>
+              <a:t>anirban@anodiam.com</a:t>
+            </a:r>
+            <a:endParaRPr lang="en-US" sz="2400" b="1" u="sng" dirty="0">
+              <a:solidFill>
+                <a:schemeClr val="bg1"/>
+              </a:solidFill>
+              <a:latin typeface="Oxygen" panose="02000503000000000000" pitchFamily="2" charset="0"/>
+            </a:endParaRPr>
+          </a:p>
+          <a:p>
+            <a:pPr algn="ctr"/>
+            <a:endParaRPr lang="en-US" sz="600" b="1" dirty="0">
+              <a:solidFill>
+                <a:schemeClr val="bg1"/>
+              </a:solidFill>
+              <a:latin typeface="Oxygen" panose="02000503000000000000" pitchFamily="2" charset="0"/>
+            </a:endParaRPr>
+          </a:p>
+          <a:p>
+            <a:pPr algn="ctr"/>
+            <a:r>
+              <a:rPr lang="en-US" sz="2400" b="1" dirty="0">
+                <a:solidFill>
+                  <a:schemeClr val="bg1"/>
+                </a:solidFill>
+                <a:latin typeface="Oxygen" panose="02000503000000000000" pitchFamily="2" charset="0"/>
+              </a:rPr>
+              <a:t>or call 9073700094</a:t>
+            </a:r>
+          </a:p>
+          <a:p>
+            <a:pPr algn="ctr"/>
+            <a:endParaRPr lang="en-US" sz="2400" b="1" dirty="0">
+              <a:solidFill>
+                <a:schemeClr val="bg1"/>
+              </a:solidFill>
+              <a:latin typeface="Oxygen" panose="02000503000000000000" pitchFamily="2" charset="0"/>
+            </a:endParaRPr>
+          </a:p>
+          <a:p>
+            <a:pPr algn="ctr"/>
+            <a:r>
+              <a:rPr lang="en-US" sz="2400" b="1" dirty="0">
+                <a:solidFill>
+                  <a:schemeClr val="bg1"/>
+                </a:solidFill>
+                <a:highlight>
+                  <a:srgbClr val="000080"/>
+                </a:highlight>
+                <a:latin typeface="Oxygen" panose="02000503000000000000" pitchFamily="2" charset="0"/>
+              </a:rPr>
+              <a:t>Edtech @Patuli,Kol-94</a:t>
+            </a:r>
+            <a:endParaRPr lang="en-AU" sz="2400" b="1" dirty="0">
+              <a:solidFill>
+                <a:schemeClr val="bg1"/>
+              </a:solidFill>
+              <a:highlight>
+                <a:srgbClr val="000080"/>
+              </a:highlight>
+              <a:latin typeface="Oxygen" panose="02000503000000000000" pitchFamily="2" charset="0"/>
+            </a:endParaRPr>
+          </a:p>
+        </p:txBody>
+      </p:sp>
+      <p:pic>
+        <p:nvPicPr>
+          <p:cNvPr id="18" name="Picture 17">
+            <a:extLst>
+              <a:ext uri="{FF2B5EF4-FFF2-40B4-BE49-F238E27FC236}">
+                <a16:creationId xmlns:a16="http://schemas.microsoft.com/office/drawing/2014/main" id="{607CE8BE-C5FF-E951-9BF6-E7C915734AC1}"/>
+              </a:ext>
+            </a:extLst>
+          </p:cNvPr>
+          <p:cNvPicPr>
+            <a:picLocks noChangeAspect="1"/>
+          </p:cNvPicPr>
+          <p:nvPr/>
+        </p:nvPicPr>
+        <p:blipFill>
+          <a:blip r:embed="rId4"/>
+          <a:stretch>
+            <a:fillRect/>
+          </a:stretch>
+        </p:blipFill>
+        <p:spPr>
+          <a:xfrm>
+            <a:off x="159095" y="126080"/>
+            <a:ext cx="3627610" cy="820385"/>
+          </a:xfrm>
+          <a:prstGeom prst="rect">
+            <a:avLst/>
+          </a:prstGeom>
+        </p:spPr>
+      </p:pic>
+      <p:sp>
+        <p:nvSpPr>
+          <p:cNvPr id="20" name="TextBox 19">
+            <a:extLst>
+              <a:ext uri="{FF2B5EF4-FFF2-40B4-BE49-F238E27FC236}">
+                <a16:creationId xmlns:a16="http://schemas.microsoft.com/office/drawing/2014/main" id="{68371C59-14C1-4784-5915-9486901099F5}"/>
+              </a:ext>
+            </a:extLst>
+          </p:cNvPr>
+          <p:cNvSpPr txBox="1"/>
+          <p:nvPr/>
+        </p:nvSpPr>
+        <p:spPr>
+          <a:xfrm>
+            <a:off x="216310" y="1162078"/>
+            <a:ext cx="6407918" cy="400110"/>
+          </a:xfrm>
+          <a:prstGeom prst="rect">
+            <a:avLst/>
+          </a:prstGeom>
+          <a:noFill/>
+        </p:spPr>
+        <p:txBody>
+          <a:bodyPr wrap="square" rtlCol="0">
+            <a:spAutoFit/>
+          </a:bodyPr>
+          <a:lstStyle/>
+          <a:p>
+            <a:r>
+              <a:rPr lang="en-US" sz="2000" b="1" dirty="0">
+                <a:solidFill>
+                  <a:srgbClr val="FFFF00"/>
+                </a:solidFill>
+                <a:highlight>
+                  <a:srgbClr val="000080"/>
+                </a:highlight>
+                <a:latin typeface="Oxygen" panose="02000503000000000000" pitchFamily="2" charset="0"/>
+              </a:rPr>
+              <a:t>Passionate Teachers for enlightening our students</a:t>
+            </a:r>
+            <a:endParaRPr lang="en-IN" sz="2000" b="1" dirty="0">
+              <a:solidFill>
+                <a:srgbClr val="FFFF00"/>
+              </a:solidFill>
+              <a:highlight>
+                <a:srgbClr val="000080"/>
+              </a:highlight>
+              <a:latin typeface="Oxygen" panose="02000503000000000000" pitchFamily="2" charset="0"/>
+            </a:endParaRPr>
+          </a:p>
+        </p:txBody>
+      </p:sp>
+      <p:sp>
+        <p:nvSpPr>
+          <p:cNvPr id="26" name="TextBox 25">
+            <a:extLst>
+              <a:ext uri="{FF2B5EF4-FFF2-40B4-BE49-F238E27FC236}">
+                <a16:creationId xmlns:a16="http://schemas.microsoft.com/office/drawing/2014/main" id="{F96659F9-C473-8A59-7C2E-AA805DFC1E2C}"/>
+              </a:ext>
+            </a:extLst>
+          </p:cNvPr>
+          <p:cNvSpPr txBox="1"/>
+          <p:nvPr/>
+        </p:nvSpPr>
+        <p:spPr>
+          <a:xfrm>
+            <a:off x="216310" y="1728358"/>
+            <a:ext cx="5535561" cy="4893647"/>
+          </a:xfrm>
+          <a:prstGeom prst="rect">
+            <a:avLst/>
+          </a:prstGeom>
+          <a:noFill/>
+        </p:spPr>
+        <p:txBody>
+          <a:bodyPr wrap="square" rtlCol="0">
+            <a:spAutoFit/>
+          </a:bodyPr>
+          <a:lstStyle/>
+          <a:p>
+            <a:pPr marL="285750" indent="-285750">
+              <a:buFontTx/>
+              <a:buChar char="-"/>
+            </a:pPr>
+            <a:r>
+              <a:rPr lang="en-US" sz="2400" b="1" dirty="0">
+                <a:latin typeface="Oxygen" panose="02000503000000000000" pitchFamily="2" charset="0"/>
+              </a:rPr>
+              <a:t>English,Bengali,Geography</a:t>
+            </a:r>
+          </a:p>
+          <a:p>
+            <a:pPr marL="285750" indent="-285750">
+              <a:buFontTx/>
+              <a:buChar char="-"/>
+            </a:pPr>
+            <a:r>
+              <a:rPr lang="en-IN" sz="2400" b="1" dirty="0" err="1">
+                <a:latin typeface="Oxygen" panose="02000503000000000000" pitchFamily="2" charset="0"/>
+              </a:rPr>
+              <a:t>Sociology,Psychology,Philosophy</a:t>
+            </a:r>
+            <a:endParaRPr lang="en-IN" sz="2400" b="1" dirty="0">
+              <a:latin typeface="Oxygen" panose="02000503000000000000" pitchFamily="2" charset="0"/>
+            </a:endParaRPr>
+          </a:p>
+          <a:p>
+            <a:pPr marL="285750" indent="-285750">
+              <a:buFontTx/>
+              <a:buChar char="-"/>
+            </a:pPr>
+            <a:r>
+              <a:rPr lang="en-US" sz="2400" b="1" dirty="0">
+                <a:latin typeface="Oxygen" panose="02000503000000000000" pitchFamily="2" charset="0"/>
+              </a:rPr>
+              <a:t>IIT Mains Advanced &amp; NEET </a:t>
+            </a:r>
+          </a:p>
+          <a:p>
+            <a:pPr marL="285750" indent="-285750">
+              <a:buFontTx/>
+              <a:buChar char="-"/>
+            </a:pPr>
+            <a:r>
+              <a:rPr lang="en-US" sz="2400" b="1" dirty="0">
+                <a:latin typeface="Oxygen" panose="02000503000000000000" pitchFamily="2" charset="0"/>
+              </a:rPr>
+              <a:t>(</a:t>
+            </a:r>
+            <a:r>
+              <a:rPr lang="en-US" sz="2400" b="1" dirty="0" err="1">
+                <a:latin typeface="Oxygen" panose="02000503000000000000" pitchFamily="2" charset="0"/>
+              </a:rPr>
+              <a:t>Physics,Chemistry</a:t>
+            </a:r>
+            <a:r>
+              <a:rPr lang="en-US" sz="2400" b="1" dirty="0">
+                <a:latin typeface="Oxygen" panose="02000503000000000000" pitchFamily="2" charset="0"/>
+              </a:rPr>
+              <a:t> &amp; Biology)</a:t>
+            </a:r>
+          </a:p>
+          <a:p>
+            <a:pPr marL="285750" indent="-285750">
+              <a:buFontTx/>
+              <a:buChar char="-"/>
+            </a:pPr>
+            <a:r>
+              <a:rPr lang="en-US" sz="2400" b="1" dirty="0">
+                <a:latin typeface="Oxygen" panose="02000503000000000000" pitchFamily="2" charset="0"/>
+              </a:rPr>
+              <a:t>Python, Artificial Intelligence</a:t>
+            </a:r>
+          </a:p>
+          <a:p>
+            <a:pPr marL="285750" indent="-285750">
+              <a:buFontTx/>
+              <a:buChar char="-"/>
+            </a:pPr>
+            <a:r>
+              <a:rPr lang="en-US" sz="2400" b="1" dirty="0">
+                <a:latin typeface="Oxygen" panose="02000503000000000000" pitchFamily="2" charset="0"/>
+              </a:rPr>
+              <a:t>C, C++</a:t>
+            </a:r>
+          </a:p>
+          <a:p>
+            <a:pPr marL="285750" indent="-285750">
+              <a:buFontTx/>
+              <a:buChar char="-"/>
+            </a:pPr>
+            <a:r>
+              <a:rPr lang="en-US" sz="2400" b="1" dirty="0">
+                <a:latin typeface="Oxygen" panose="02000503000000000000" pitchFamily="2" charset="0"/>
+              </a:rPr>
+              <a:t>Java, Advanced Java</a:t>
+            </a:r>
+          </a:p>
+          <a:p>
+            <a:pPr marL="285750" indent="-285750">
+              <a:buFontTx/>
+              <a:buChar char="-"/>
+            </a:pPr>
+            <a:r>
+              <a:rPr lang="en-US" sz="2400" b="1" dirty="0">
+                <a:latin typeface="Oxygen" panose="02000503000000000000" pitchFamily="2" charset="0"/>
+              </a:rPr>
+              <a:t>.NET (C#,VB.NET)</a:t>
+            </a:r>
+          </a:p>
+          <a:p>
+            <a:pPr marL="285750" indent="-285750">
+              <a:buFontTx/>
+              <a:buChar char="-"/>
+            </a:pPr>
+            <a:r>
+              <a:rPr lang="en-US" sz="2400" b="1" dirty="0">
+                <a:latin typeface="Oxygen" panose="02000503000000000000" pitchFamily="2" charset="0"/>
+              </a:rPr>
+              <a:t>React JS (MUI)</a:t>
+            </a:r>
+          </a:p>
+          <a:p>
+            <a:pPr marL="285750" indent="-285750">
+              <a:buFontTx/>
+              <a:buChar char="-"/>
+            </a:pPr>
+            <a:r>
+              <a:rPr lang="en-US" sz="2400" b="1" dirty="0">
+                <a:latin typeface="Oxygen" panose="02000503000000000000" pitchFamily="2" charset="0"/>
+              </a:rPr>
+              <a:t>React Native</a:t>
+            </a:r>
+          </a:p>
+          <a:p>
+            <a:pPr marL="285750" indent="-285750">
+              <a:buFontTx/>
+              <a:buChar char="-"/>
+            </a:pPr>
+            <a:r>
+              <a:rPr lang="en-US" sz="2400" b="1" dirty="0">
+                <a:latin typeface="Oxygen" panose="02000503000000000000" pitchFamily="2" charset="0"/>
+              </a:rPr>
+              <a:t>MYSQL, SQL Server</a:t>
+            </a:r>
+          </a:p>
+          <a:p>
+            <a:pPr marL="285750" indent="-285750">
+              <a:buFontTx/>
+              <a:buChar char="-"/>
+            </a:pPr>
+            <a:r>
+              <a:rPr lang="en-US" sz="2400" b="1" dirty="0">
+                <a:latin typeface="Oxygen" panose="02000503000000000000" pitchFamily="2" charset="0"/>
+              </a:rPr>
+              <a:t>Oracle, Firebase</a:t>
+            </a:r>
+          </a:p>
+          <a:p>
+            <a:pPr marL="285750" indent="-285750">
+              <a:buFontTx/>
+              <a:buChar char="-"/>
+            </a:pPr>
+            <a:r>
+              <a:rPr lang="en-US" sz="2400" b="1" dirty="0">
+                <a:latin typeface="Oxygen" panose="02000503000000000000" pitchFamily="2" charset="0"/>
+              </a:rPr>
+              <a:t>Prince2, Agile Scrum</a:t>
+            </a:r>
+            <a:endParaRPr lang="en-IN" sz="2400" dirty="0">
+              <a:latin typeface="Oxygen" panose="02000503000000000000" pitchFamily="2" charset="0"/>
+            </a:endParaRPr>
+          </a:p>
+        </p:txBody>
+      </p:sp>
+      <p:pic>
+        <p:nvPicPr>
+          <p:cNvPr id="3" name="Picture 2">
+            <a:extLst>
+              <a:ext uri="{FF2B5EF4-FFF2-40B4-BE49-F238E27FC236}">
+                <a16:creationId xmlns:a16="http://schemas.microsoft.com/office/drawing/2014/main" id="{C811E145-8787-DA3C-10D3-D4969793D441}"/>
+              </a:ext>
+            </a:extLst>
+          </p:cNvPr>
+          <p:cNvPicPr>
+            <a:picLocks noChangeAspect="1"/>
+          </p:cNvPicPr>
+          <p:nvPr/>
+        </p:nvPicPr>
+        <p:blipFill>
+          <a:blip r:embed="rId5"/>
+          <a:stretch>
+            <a:fillRect/>
+          </a:stretch>
+        </p:blipFill>
+        <p:spPr>
+          <a:xfrm>
+            <a:off x="4377901" y="3681293"/>
+            <a:ext cx="2295525" cy="741083"/>
+          </a:xfrm>
+          <a:prstGeom prst="rect">
+            <a:avLst/>
+          </a:prstGeom>
+        </p:spPr>
+      </p:pic>
+      <p:pic>
+        <p:nvPicPr>
+          <p:cNvPr id="13" name="Picture 12">
+            <a:extLst>
+              <a:ext uri="{FF2B5EF4-FFF2-40B4-BE49-F238E27FC236}">
+                <a16:creationId xmlns:a16="http://schemas.microsoft.com/office/drawing/2014/main" id="{C2BCF667-0B7E-0EED-0350-07085D81A422}"/>
+              </a:ext>
+            </a:extLst>
+          </p:cNvPr>
+          <p:cNvPicPr>
+            <a:picLocks noChangeAspect="1"/>
+          </p:cNvPicPr>
+          <p:nvPr/>
+        </p:nvPicPr>
+        <p:blipFill>
+          <a:blip r:embed="rId6">
+            <a:extLst>
+              <a:ext uri="{28A0092B-C50C-407E-A947-70E740481C1C}">
+                <a14:useLocalDpi xmlns:a14="http://schemas.microsoft.com/office/drawing/2010/main" val="0"/>
+              </a:ext>
+            </a:extLst>
+          </a:blip>
+          <a:stretch>
+            <a:fillRect/>
+          </a:stretch>
+        </p:blipFill>
+        <p:spPr>
+          <a:xfrm>
+            <a:off x="4981825" y="864226"/>
+            <a:ext cx="1804261" cy="2244132"/>
+          </a:xfrm>
+          <a:prstGeom prst="rect">
+            <a:avLst/>
+          </a:prstGeom>
+        </p:spPr>
+      </p:pic>
+    </p:spTree>
+    <p:extLst>
+      <p:ext uri="{BB962C8B-B14F-4D97-AF65-F5344CB8AC3E}">
+        <p14:creationId xmlns:p14="http://schemas.microsoft.com/office/powerpoint/2010/main" val="2343866674"/>
+      </p:ext>
+    </p:extLst>
+  </p:cSld>
+  <p:clrMapOvr>
+    <a:masterClrMapping/>
+  </p:clrMapOvr>
+</p:sld>
+</file>
+
 <file path=ppt/theme/theme1.xml><?xml version="1.0" encoding="utf-8"?>
 <a:theme xmlns:a="http://schemas.openxmlformats.org/drawingml/2006/main" name="Office Theme">
   <a:themeElements>
@@ -13410,4 +16520,299 @@
     </a:ext>
   </a:extLst>
 </a:theme>
+</file>
+
+<file path=ppt/theme/theme2.xml><?xml version="1.0" encoding="utf-8"?>
+<a:theme xmlns:a="http://schemas.openxmlformats.org/drawingml/2006/main" name="Office Theme">
+  <a:themeElements>
+    <a:clrScheme name="Office">
+      <a:dk1>
+        <a:sysClr val="windowText" lastClr="000000"/>
+      </a:dk1>
+      <a:lt1>
+        <a:sysClr val="window" lastClr="FFFFFF"/>
+      </a:lt1>
+      <a:dk2>
+        <a:srgbClr val="44546A"/>
+      </a:dk2>
+      <a:lt2>
+        <a:srgbClr val="E7E6E6"/>
+      </a:lt2>
+      <a:accent1>
+        <a:srgbClr val="4472C4"/>
+      </a:accent1>
+      <a:accent2>
+        <a:srgbClr val="ED7D31"/>
+      </a:accent2>
+      <a:accent3>
+        <a:srgbClr val="A5A5A5"/>
+      </a:accent3>
+      <a:accent4>
+        <a:srgbClr val="FFC000"/>
+      </a:accent4>
+      <a:accent5>
+        <a:srgbClr val="5B9BD5"/>
+      </a:accent5>
+      <a:accent6>
+        <a:srgbClr val="70AD47"/>
+      </a:accent6>
+      <a:hlink>
+        <a:srgbClr val="0563C1"/>
+      </a:hlink>
+      <a:folHlink>
+        <a:srgbClr val="954F72"/>
+      </a:folHlink>
+    </a:clrScheme>
+    <a:fontScheme name="Office">
+      <a:majorFont>
+        <a:latin typeface="Calibri Light" panose="020F0302020204030204"/>
+        <a:ea typeface=""/>
+        <a:cs typeface=""/>
+        <a:font script="Jpan" typeface="游ゴシック Light"/>
+        <a:font script="Hang" typeface="맑은 고딕"/>
+        <a:font script="Hans" typeface="等线 Light"/>
+        <a:font script="Hant" typeface="新細明體"/>
+        <a:font script="Arab" typeface="Times New Roman"/>
+        <a:font script="Hebr" typeface="Times New Roman"/>
+        <a:font script="Thai" typeface="Angsana New"/>
+        <a:font script="Ethi" typeface="Nyala"/>
+        <a:font script="Beng" typeface="Vrinda"/>
+        <a:font script="Gujr" typeface="Shruti"/>
+        <a:font script="Khmr" typeface="MoolBoran"/>
+        <a:font script="Knda" typeface="Tunga"/>
+        <a:font script="Guru" typeface="Raavi"/>
+        <a:font script="Cans" typeface="Euphemia"/>
+        <a:font script="Cher" typeface="Plantagenet Cherokee"/>
+        <a:font script="Yiii" typeface="Microsoft Yi Baiti"/>
+        <a:font script="Tibt" typeface="Microsoft Himalaya"/>
+        <a:font script="Thaa" typeface="MV Boli"/>
+        <a:font script="Deva" typeface="Mangal"/>
+        <a:font script="Telu" typeface="Gautami"/>
+        <a:font script="Taml" typeface="Latha"/>
+        <a:font script="Syrc" typeface="Estrangelo Edessa"/>
+        <a:font script="Orya" typeface="Kalinga"/>
+        <a:font script="Mlym" typeface="Kartika"/>
+        <a:font script="Laoo" typeface="DokChampa"/>
+        <a:font script="Sinh" typeface="Iskoola Pota"/>
+        <a:font script="Mong" typeface="Mongolian Baiti"/>
+        <a:font script="Viet" typeface="Times New Roman"/>
+        <a:font script="Uigh" typeface="Microsoft Uighur"/>
+        <a:font script="Geor" typeface="Sylfaen"/>
+        <a:font script="Armn" typeface="Arial"/>
+        <a:font script="Bugi" typeface="Leelawadee UI"/>
+        <a:font script="Bopo" typeface="Microsoft JhengHei"/>
+        <a:font script="Java" typeface="Javanese Text"/>
+        <a:font script="Lisu" typeface="Segoe UI"/>
+        <a:font script="Mymr" typeface="Myanmar Text"/>
+        <a:font script="Nkoo" typeface="Ebrima"/>
+        <a:font script="Olck" typeface="Nirmala UI"/>
+        <a:font script="Osma" typeface="Ebrima"/>
+        <a:font script="Phag" typeface="Phagspa"/>
+        <a:font script="Syrn" typeface="Estrangelo Edessa"/>
+        <a:font script="Syrj" typeface="Estrangelo Edessa"/>
+        <a:font script="Syre" typeface="Estrangelo Edessa"/>
+        <a:font script="Sora" typeface="Nirmala UI"/>
+        <a:font script="Tale" typeface="Microsoft Tai Le"/>
+        <a:font script="Talu" typeface="Microsoft New Tai Lue"/>
+        <a:font script="Tfng" typeface="Ebrima"/>
+      </a:majorFont>
+      <a:minorFont>
+        <a:latin typeface="Calibri" panose="020F0502020204030204"/>
+        <a:ea typeface=""/>
+        <a:cs typeface=""/>
+        <a:font script="Jpan" typeface="游ゴシック"/>
+        <a:font script="Hang" typeface="맑은 고딕"/>
+        <a:font script="Hans" typeface="等线"/>
+        <a:font script="Hant" typeface="新細明體"/>
+        <a:font script="Arab" typeface="Arial"/>
+        <a:font script="Hebr" typeface="Arial"/>
+        <a:font script="Thai" typeface="Cordia New"/>
+        <a:font script="Ethi" typeface="Nyala"/>
+        <a:font script="Beng" typeface="Vrinda"/>
+        <a:font script="Gujr" typeface="Shruti"/>
+        <a:font script="Khmr" typeface="DaunPenh"/>
+        <a:font script="Knda" typeface="Tunga"/>
+        <a:font script="Guru" typeface="Raavi"/>
+        <a:font script="Cans" typeface="Euphemia"/>
+        <a:font script="Cher" typeface="Plantagenet Cherokee"/>
+        <a:font script="Yiii" typeface="Microsoft Yi Baiti"/>
+        <a:font script="Tibt" typeface="Microsoft Himalaya"/>
+        <a:font script="Thaa" typeface="MV Boli"/>
+        <a:font script="Deva" typeface="Mangal"/>
+        <a:font script="Telu" typeface="Gautami"/>
+        <a:font script="Taml" typeface="Latha"/>
+        <a:font script="Syrc" typeface="Estrangelo Edessa"/>
+        <a:font script="Orya" typeface="Kalinga"/>
+        <a:font script="Mlym" typeface="Kartika"/>
+        <a:font script="Laoo" typeface="DokChampa"/>
+        <a:font script="Sinh" typeface="Iskoola Pota"/>
+        <a:font script="Mong" typeface="Mongolian Baiti"/>
+        <a:font script="Viet" typeface="Arial"/>
+        <a:font script="Uigh" typeface="Microsoft Uighur"/>
+        <a:font script="Geor" typeface="Sylfaen"/>
+        <a:font script="Armn" typeface="Arial"/>
+        <a:font script="Bugi" typeface="Leelawadee UI"/>
+        <a:font script="Bopo" typeface="Microsoft JhengHei"/>
+        <a:font script="Java" typeface="Javanese Text"/>
+        <a:font script="Lisu" typeface="Segoe UI"/>
+        <a:font script="Mymr" typeface="Myanmar Text"/>
+        <a:font script="Nkoo" typeface="Ebrima"/>
+        <a:font script="Olck" typeface="Nirmala UI"/>
+        <a:font script="Osma" typeface="Ebrima"/>
+        <a:font script="Phag" typeface="Phagspa"/>
+        <a:font script="Syrn" typeface="Estrangelo Edessa"/>
+        <a:font script="Syrj" typeface="Estrangelo Edessa"/>
+        <a:font script="Syre" typeface="Estrangelo Edessa"/>
+        <a:font script="Sora" typeface="Nirmala UI"/>
+        <a:font script="Tale" typeface="Microsoft Tai Le"/>
+        <a:font script="Talu" typeface="Microsoft New Tai Lue"/>
+        <a:font script="Tfng" typeface="Ebrima"/>
+      </a:minorFont>
+    </a:fontScheme>
+    <a:fmtScheme name="Office">
+      <a:fillStyleLst>
+        <a:solidFill>
+          <a:schemeClr val="phClr"/>
+        </a:solidFill>
+        <a:gradFill rotWithShape="1">
+          <a:gsLst>
+            <a:gs pos="0">
+              <a:schemeClr val="phClr">
+                <a:lumMod val="110000"/>
+                <a:satMod val="105000"/>
+                <a:tint val="67000"/>
+              </a:schemeClr>
+            </a:gs>
+            <a:gs pos="50000">
+              <a:schemeClr val="phClr">
+                <a:lumMod val="105000"/>
+                <a:satMod val="103000"/>
+                <a:tint val="73000"/>
+              </a:schemeClr>
+            </a:gs>
+            <a:gs pos="100000">
+              <a:schemeClr val="phClr">
+                <a:lumMod val="105000"/>
+                <a:satMod val="109000"/>
+                <a:tint val="81000"/>
+              </a:schemeClr>
+            </a:gs>
+          </a:gsLst>
+          <a:lin ang="5400000" scaled="0"/>
+        </a:gradFill>
+        <a:gradFill rotWithShape="1">
+          <a:gsLst>
+            <a:gs pos="0">
+              <a:schemeClr val="phClr">
+                <a:satMod val="103000"/>
+                <a:lumMod val="102000"/>
+                <a:tint val="94000"/>
+              </a:schemeClr>
+            </a:gs>
+            <a:gs pos="50000">
+              <a:schemeClr val="phClr">
+                <a:satMod val="110000"/>
+                <a:lumMod val="100000"/>
+                <a:shade val="100000"/>
+              </a:schemeClr>
+            </a:gs>
+            <a:gs pos="100000">
+              <a:schemeClr val="phClr">
+                <a:lumMod val="99000"/>
+                <a:satMod val="120000"/>
+                <a:shade val="78000"/>
+              </a:schemeClr>
+            </a:gs>
+          </a:gsLst>
+          <a:lin ang="5400000" scaled="0"/>
+        </a:gradFill>
+      </a:fillStyleLst>
+      <a:lnStyleLst>
+        <a:ln w="6350" cap="flat" cmpd="sng" algn="ctr">
+          <a:solidFill>
+            <a:schemeClr val="phClr"/>
+          </a:solidFill>
+          <a:prstDash val="solid"/>
+          <a:miter lim="800000"/>
+        </a:ln>
+        <a:ln w="12700" cap="flat" cmpd="sng" algn="ctr">
+          <a:solidFill>
+            <a:schemeClr val="phClr"/>
+          </a:solidFill>
+          <a:prstDash val="solid"/>
+          <a:miter lim="800000"/>
+        </a:ln>
+        <a:ln w="19050" cap="flat" cmpd="sng" algn="ctr">
+          <a:solidFill>
+            <a:schemeClr val="phClr"/>
+          </a:solidFill>
+          <a:prstDash val="solid"/>
+          <a:miter lim="800000"/>
+        </a:ln>
+      </a:lnStyleLst>
+      <a:effectStyleLst>
+        <a:effectStyle>
+          <a:effectLst/>
+        </a:effectStyle>
+        <a:effectStyle>
+          <a:effectLst/>
+        </a:effectStyle>
+        <a:effectStyle>
+          <a:effectLst>
+            <a:outerShdw blurRad="57150" dist="19050" dir="5400000" algn="ctr" rotWithShape="0">
+              <a:srgbClr val="000000">
+                <a:alpha val="63000"/>
+              </a:srgbClr>
+            </a:outerShdw>
+          </a:effectLst>
+        </a:effectStyle>
+      </a:effectStyleLst>
+      <a:bgFillStyleLst>
+        <a:solidFill>
+          <a:schemeClr val="phClr"/>
+        </a:solidFill>
+        <a:solidFill>
+          <a:schemeClr val="phClr">
+            <a:tint val="95000"/>
+            <a:satMod val="170000"/>
+          </a:schemeClr>
+        </a:solidFill>
+        <a:gradFill rotWithShape="1">
+          <a:gsLst>
+            <a:gs pos="0">
+              <a:schemeClr val="phClr">
+                <a:tint val="93000"/>
+                <a:satMod val="150000"/>
+                <a:shade val="98000"/>
+                <a:lumMod val="102000"/>
+              </a:schemeClr>
+            </a:gs>
+            <a:gs pos="50000">
+              <a:schemeClr val="phClr">
+                <a:tint val="98000"/>
+                <a:satMod val="130000"/>
+                <a:shade val="90000"/>
+                <a:lumMod val="103000"/>
+              </a:schemeClr>
+            </a:gs>
+            <a:gs pos="100000">
+              <a:schemeClr val="phClr">
+                <a:shade val="63000"/>
+                <a:satMod val="120000"/>
+              </a:schemeClr>
+            </a:gs>
+          </a:gsLst>
+          <a:lin ang="5400000" scaled="0"/>
+        </a:gradFill>
+      </a:bgFillStyleLst>
+    </a:fmtScheme>
+  </a:themeElements>
+  <a:objectDefaults/>
+  <a:extraClrSchemeLst/>
+  <a:extLst>
+    <a:ext uri="{05A4C25C-085E-4340-85A3-A5531E510DB2}">
+      <thm15:themeFamily xmlns:thm15="http://schemas.microsoft.com/office/thememl/2012/main" name="Office Theme" id="{62F939B6-93AF-4DB8-9C6B-D6C7DFDC589F}" vid="{4A3C46E8-61CC-4603-A589-7422A47A8E4A}"/>
+    </a:ext>
+  </a:extLst>
+</a:theme>
 </file>
</xml_diff>